<commit_message>
Editing pass through deployment guide
</commit_message>
<xml_diff>
--- a/docs/deployment_guide/images/SIOS DataKeeper architecture.pptx
+++ b/docs/deployment_guide/images/SIOS DataKeeper architecture.pptx
@@ -6,6 +6,7 @@
   </p:sldMasterIdLst>
   <p:sldIdLst>
     <p:sldId id="261" r:id="rId2"/>
+    <p:sldId id="262" r:id="rId3"/>
   </p:sldIdLst>
   <p:sldSz cx="12192000" cy="6858000"/>
   <p:notesSz cx="6858000" cy="9144000"/>
@@ -105,6 +106,20 @@
     </a:lvl9pPr>
   </p:defaultTextStyle>
   <p:extLst>
+    <p:ext uri="{521415D9-36F7-43E2-AB2F-B90AF26B5E84}">
+      <p14:sectionLst xmlns:p14="http://schemas.microsoft.com/office/powerpoint/2010/main">
+        <p14:section name="Default Section" id="{F6A308BA-E809-4CCB-A8A1-A1314182D7A3}">
+          <p14:sldIdLst>
+            <p14:sldId id="261"/>
+          </p14:sldIdLst>
+        </p14:section>
+        <p14:section name="OLD - Do not use" id="{3CA19DAC-AEFA-45FA-84EB-68CA044D5DE1}">
+          <p14:sldIdLst>
+            <p14:sldId id="262"/>
+          </p14:sldIdLst>
+        </p14:section>
+      </p14:sectionLst>
+    </p:ext>
     <p:ext uri="{EFAFB233-063F-42B5-8137-9DF3F51BA10A}">
       <p15:sldGuideLst xmlns:p15="http://schemas.microsoft.com/office/powerpoint/2012/main"/>
     </p:ext>
@@ -261,7 +276,7 @@
               <a:rPr lang="en-US" smtClean="0"/>
               <a:t>9/16/2022</a:t>
             </a:fld>
-            <a:endParaRPr lang="en-US"/>
+            <a:endParaRPr lang="en-US" dirty="0"/>
           </a:p>
         </p:txBody>
       </p:sp>
@@ -286,7 +301,7 @@
           <a:bodyPr/>
           <a:lstStyle/>
           <a:p>
-            <a:endParaRPr lang="en-US"/>
+            <a:endParaRPr lang="en-US" dirty="0"/>
           </a:p>
         </p:txBody>
       </p:sp>
@@ -315,7 +330,7 @@
               <a:rPr lang="en-US" smtClean="0"/>
               <a:t>‹#›</a:t>
             </a:fld>
-            <a:endParaRPr lang="en-US"/>
+            <a:endParaRPr lang="en-US" dirty="0"/>
           </a:p>
         </p:txBody>
       </p:sp>
@@ -459,7 +474,7 @@
               <a:rPr lang="en-US" smtClean="0"/>
               <a:t>9/16/2022</a:t>
             </a:fld>
-            <a:endParaRPr lang="en-US"/>
+            <a:endParaRPr lang="en-US" dirty="0"/>
           </a:p>
         </p:txBody>
       </p:sp>
@@ -484,7 +499,7 @@
           <a:bodyPr/>
           <a:lstStyle/>
           <a:p>
-            <a:endParaRPr lang="en-US"/>
+            <a:endParaRPr lang="en-US" dirty="0"/>
           </a:p>
         </p:txBody>
       </p:sp>
@@ -513,7 +528,7 @@
               <a:rPr lang="en-US" smtClean="0"/>
               <a:t>‹#›</a:t>
             </a:fld>
-            <a:endParaRPr lang="en-US"/>
+            <a:endParaRPr lang="en-US" dirty="0"/>
           </a:p>
         </p:txBody>
       </p:sp>
@@ -667,7 +682,7 @@
               <a:rPr lang="en-US" smtClean="0"/>
               <a:t>9/16/2022</a:t>
             </a:fld>
-            <a:endParaRPr lang="en-US"/>
+            <a:endParaRPr lang="en-US" dirty="0"/>
           </a:p>
         </p:txBody>
       </p:sp>
@@ -692,7 +707,7 @@
           <a:bodyPr/>
           <a:lstStyle/>
           <a:p>
-            <a:endParaRPr lang="en-US"/>
+            <a:endParaRPr lang="en-US" dirty="0"/>
           </a:p>
         </p:txBody>
       </p:sp>
@@ -721,7 +736,7 @@
               <a:rPr lang="en-US" smtClean="0"/>
               <a:t>‹#›</a:t>
             </a:fld>
-            <a:endParaRPr lang="en-US"/>
+            <a:endParaRPr lang="en-US" dirty="0"/>
           </a:p>
         </p:txBody>
       </p:sp>
@@ -865,7 +880,7 @@
               <a:rPr lang="en-US" smtClean="0"/>
               <a:t>9/16/2022</a:t>
             </a:fld>
-            <a:endParaRPr lang="en-US"/>
+            <a:endParaRPr lang="en-US" dirty="0"/>
           </a:p>
         </p:txBody>
       </p:sp>
@@ -890,7 +905,7 @@
           <a:bodyPr/>
           <a:lstStyle/>
           <a:p>
-            <a:endParaRPr lang="en-US"/>
+            <a:endParaRPr lang="en-US" dirty="0"/>
           </a:p>
         </p:txBody>
       </p:sp>
@@ -919,7 +934,7 @@
               <a:rPr lang="en-US" smtClean="0"/>
               <a:t>‹#›</a:t>
             </a:fld>
-            <a:endParaRPr lang="en-US"/>
+            <a:endParaRPr lang="en-US" dirty="0"/>
           </a:p>
         </p:txBody>
       </p:sp>
@@ -1140,7 +1155,7 @@
               <a:rPr lang="en-US" smtClean="0"/>
               <a:t>9/16/2022</a:t>
             </a:fld>
-            <a:endParaRPr lang="en-US"/>
+            <a:endParaRPr lang="en-US" dirty="0"/>
           </a:p>
         </p:txBody>
       </p:sp>
@@ -1165,7 +1180,7 @@
           <a:bodyPr/>
           <a:lstStyle/>
           <a:p>
-            <a:endParaRPr lang="en-US"/>
+            <a:endParaRPr lang="en-US" dirty="0"/>
           </a:p>
         </p:txBody>
       </p:sp>
@@ -1194,7 +1209,7 @@
               <a:rPr lang="en-US" smtClean="0"/>
               <a:t>‹#›</a:t>
             </a:fld>
-            <a:endParaRPr lang="en-US"/>
+            <a:endParaRPr lang="en-US" dirty="0"/>
           </a:p>
         </p:txBody>
       </p:sp>
@@ -1405,7 +1420,7 @@
               <a:rPr lang="en-US" smtClean="0"/>
               <a:t>9/16/2022</a:t>
             </a:fld>
-            <a:endParaRPr lang="en-US"/>
+            <a:endParaRPr lang="en-US" dirty="0"/>
           </a:p>
         </p:txBody>
       </p:sp>
@@ -1430,7 +1445,7 @@
           <a:bodyPr/>
           <a:lstStyle/>
           <a:p>
-            <a:endParaRPr lang="en-US"/>
+            <a:endParaRPr lang="en-US" dirty="0"/>
           </a:p>
         </p:txBody>
       </p:sp>
@@ -1459,7 +1474,7 @@
               <a:rPr lang="en-US" smtClean="0"/>
               <a:t>‹#›</a:t>
             </a:fld>
-            <a:endParaRPr lang="en-US"/>
+            <a:endParaRPr lang="en-US" dirty="0"/>
           </a:p>
         </p:txBody>
       </p:sp>
@@ -1817,7 +1832,7 @@
               <a:rPr lang="en-US" smtClean="0"/>
               <a:t>9/16/2022</a:t>
             </a:fld>
-            <a:endParaRPr lang="en-US"/>
+            <a:endParaRPr lang="en-US" dirty="0"/>
           </a:p>
         </p:txBody>
       </p:sp>
@@ -1842,7 +1857,7 @@
           <a:bodyPr/>
           <a:lstStyle/>
           <a:p>
-            <a:endParaRPr lang="en-US"/>
+            <a:endParaRPr lang="en-US" dirty="0"/>
           </a:p>
         </p:txBody>
       </p:sp>
@@ -1871,7 +1886,7 @@
               <a:rPr lang="en-US" smtClean="0"/>
               <a:t>‹#›</a:t>
             </a:fld>
-            <a:endParaRPr lang="en-US"/>
+            <a:endParaRPr lang="en-US" dirty="0"/>
           </a:p>
         </p:txBody>
       </p:sp>
@@ -1958,7 +1973,7 @@
               <a:rPr lang="en-US" smtClean="0"/>
               <a:t>9/16/2022</a:t>
             </a:fld>
-            <a:endParaRPr lang="en-US"/>
+            <a:endParaRPr lang="en-US" dirty="0"/>
           </a:p>
         </p:txBody>
       </p:sp>
@@ -1983,7 +1998,7 @@
           <a:bodyPr/>
           <a:lstStyle/>
           <a:p>
-            <a:endParaRPr lang="en-US"/>
+            <a:endParaRPr lang="en-US" dirty="0"/>
           </a:p>
         </p:txBody>
       </p:sp>
@@ -2012,7 +2027,7 @@
               <a:rPr lang="en-US" smtClean="0"/>
               <a:t>‹#›</a:t>
             </a:fld>
-            <a:endParaRPr lang="en-US"/>
+            <a:endParaRPr lang="en-US" dirty="0"/>
           </a:p>
         </p:txBody>
       </p:sp>
@@ -2071,7 +2086,7 @@
               <a:rPr lang="en-US" smtClean="0"/>
               <a:t>9/16/2022</a:t>
             </a:fld>
-            <a:endParaRPr lang="en-US"/>
+            <a:endParaRPr lang="en-US" dirty="0"/>
           </a:p>
         </p:txBody>
       </p:sp>
@@ -2096,7 +2111,7 @@
           <a:bodyPr/>
           <a:lstStyle/>
           <a:p>
-            <a:endParaRPr lang="en-US"/>
+            <a:endParaRPr lang="en-US" dirty="0"/>
           </a:p>
         </p:txBody>
       </p:sp>
@@ -2125,7 +2140,7 @@
               <a:rPr lang="en-US" smtClean="0"/>
               <a:t>‹#›</a:t>
             </a:fld>
-            <a:endParaRPr lang="en-US"/>
+            <a:endParaRPr lang="en-US" dirty="0"/>
           </a:p>
         </p:txBody>
       </p:sp>
@@ -2382,7 +2397,7 @@
               <a:rPr lang="en-US" smtClean="0"/>
               <a:t>9/16/2022</a:t>
             </a:fld>
-            <a:endParaRPr lang="en-US"/>
+            <a:endParaRPr lang="en-US" dirty="0"/>
           </a:p>
         </p:txBody>
       </p:sp>
@@ -2407,7 +2422,7 @@
           <a:bodyPr/>
           <a:lstStyle/>
           <a:p>
-            <a:endParaRPr lang="en-US"/>
+            <a:endParaRPr lang="en-US" dirty="0"/>
           </a:p>
         </p:txBody>
       </p:sp>
@@ -2436,7 +2451,7 @@
               <a:rPr lang="en-US" smtClean="0"/>
               <a:t>‹#›</a:t>
             </a:fld>
-            <a:endParaRPr lang="en-US"/>
+            <a:endParaRPr lang="en-US" dirty="0"/>
           </a:p>
         </p:txBody>
       </p:sp>
@@ -2570,7 +2585,7 @@
             </a:lvl9pPr>
           </a:lstStyle>
           <a:p>
-            <a:endParaRPr lang="en-US"/>
+            <a:endParaRPr lang="en-US" dirty="0"/>
           </a:p>
         </p:txBody>
       </p:sp>
@@ -2670,7 +2685,7 @@
               <a:rPr lang="en-US" smtClean="0"/>
               <a:t>9/16/2022</a:t>
             </a:fld>
-            <a:endParaRPr lang="en-US"/>
+            <a:endParaRPr lang="en-US" dirty="0"/>
           </a:p>
         </p:txBody>
       </p:sp>
@@ -2695,7 +2710,7 @@
           <a:bodyPr/>
           <a:lstStyle/>
           <a:p>
-            <a:endParaRPr lang="en-US"/>
+            <a:endParaRPr lang="en-US" dirty="0"/>
           </a:p>
         </p:txBody>
       </p:sp>
@@ -2724,7 +2739,7 @@
               <a:rPr lang="en-US" smtClean="0"/>
               <a:t>‹#›</a:t>
             </a:fld>
-            <a:endParaRPr lang="en-US"/>
+            <a:endParaRPr lang="en-US" dirty="0"/>
           </a:p>
         </p:txBody>
       </p:sp>
@@ -2911,7 +2926,7 @@
               <a:rPr lang="en-US" smtClean="0"/>
               <a:t>9/16/2022</a:t>
             </a:fld>
-            <a:endParaRPr lang="en-US"/>
+            <a:endParaRPr lang="en-US" dirty="0"/>
           </a:p>
         </p:txBody>
       </p:sp>
@@ -2954,7 +2969,7 @@
             </a:lvl1pPr>
           </a:lstStyle>
           <a:p>
-            <a:endParaRPr lang="en-US"/>
+            <a:endParaRPr lang="en-US" dirty="0"/>
           </a:p>
         </p:txBody>
       </p:sp>
@@ -3001,7 +3016,7 @@
               <a:rPr lang="en-US" smtClean="0"/>
               <a:t>‹#›</a:t>
             </a:fld>
-            <a:endParaRPr lang="en-US"/>
+            <a:endParaRPr lang="en-US" dirty="0"/>
           </a:p>
         </p:txBody>
       </p:sp>
@@ -3340,8 +3355,8 @@
         </p:nvSpPr>
         <p:spPr>
           <a:xfrm>
-            <a:off x="4507005" y="1355882"/>
-            <a:ext cx="2474928" cy="2065388"/>
+            <a:off x="4190023" y="1355882"/>
+            <a:ext cx="1627632" cy="2065388"/>
           </a:xfrm>
           <a:prstGeom prst="rect">
             <a:avLst/>
@@ -3352,9 +3367,7 @@
             </a:srgbClr>
           </a:solidFill>
           <a:ln w="12700">
-            <a:solidFill>
-              <a:srgbClr val="1E8900"/>
-            </a:solidFill>
+            <a:noFill/>
             <a:prstDash val="solid"/>
           </a:ln>
         </p:spPr>
@@ -3389,6 +3402,8 @@
                 <a:solidFill>
                   <a:srgbClr val="1E8900"/>
                 </a:solidFill>
+                <a:latin typeface="Arial" panose="020B0604020202020204" pitchFamily="34" charset="0"/>
+                <a:cs typeface="Arial" panose="020B0604020202020204" pitchFamily="34" charset="0"/>
               </a:rPr>
               <a:t>Public subnet</a:t>
             </a:r>
@@ -3429,7 +3444,7 @@
         </p:blipFill>
         <p:spPr>
           <a:xfrm>
-            <a:off x="5526898" y="2313355"/>
+            <a:off x="4784635" y="2593812"/>
             <a:ext cx="469900" cy="469900"/>
           </a:xfrm>
           <a:prstGeom prst="rect">
@@ -3454,8 +3469,8 @@
         </p:nvSpPr>
         <p:spPr>
           <a:xfrm>
-            <a:off x="5275295" y="2772137"/>
-            <a:ext cx="973105" cy="276999"/>
+            <a:off x="4517513" y="3063413"/>
+            <a:ext cx="1004144" cy="261610"/>
           </a:xfrm>
           <a:prstGeom prst="rect">
             <a:avLst/>
@@ -3470,8 +3485,11 @@
           <a:p>
             <a:pPr algn="ctr"/>
             <a:r>
-              <a:rPr lang="en-US" sz="1200" dirty="0"/>
-              <a:t>RDGW</a:t>
+              <a:rPr lang="en-US" sz="1100" dirty="0">
+                <a:latin typeface="Arial" panose="020B0604020202020204" pitchFamily="34" charset="0"/>
+                <a:cs typeface="Arial" panose="020B0604020202020204" pitchFamily="34" charset="0"/>
+              </a:rPr>
+              <a:t>RD Gateway</a:t>
             </a:r>
           </a:p>
         </p:txBody>
@@ -3490,8 +3508,8 @@
         </p:nvSpPr>
         <p:spPr>
           <a:xfrm>
-            <a:off x="711488" y="1346092"/>
-            <a:ext cx="2474928" cy="2065388"/>
+            <a:off x="930848" y="1346092"/>
+            <a:ext cx="1625917" cy="2065388"/>
           </a:xfrm>
           <a:prstGeom prst="rect">
             <a:avLst/>
@@ -3502,9 +3520,7 @@
             </a:srgbClr>
           </a:solidFill>
           <a:ln w="12700">
-            <a:solidFill>
-              <a:srgbClr val="1E8900"/>
-            </a:solidFill>
+            <a:noFill/>
             <a:prstDash val="solid"/>
           </a:ln>
         </p:spPr>
@@ -3539,6 +3555,8 @@
                 <a:solidFill>
                   <a:srgbClr val="1E8900"/>
                 </a:solidFill>
+                <a:latin typeface="Arial" panose="020B0604020202020204" pitchFamily="34" charset="0"/>
+                <a:cs typeface="Arial" panose="020B0604020202020204" pitchFamily="34" charset="0"/>
               </a:rPr>
               <a:t>Public subnet</a:t>
             </a:r>
@@ -3559,8 +3577,8 @@
         </p:nvSpPr>
         <p:spPr>
           <a:xfrm>
-            <a:off x="371796" y="978748"/>
-            <a:ext cx="10797699" cy="5266272"/>
+            <a:off x="371797" y="978749"/>
+            <a:ext cx="7891745" cy="5218852"/>
           </a:xfrm>
           <a:prstGeom prst="rect">
             <a:avLst/>
@@ -3604,6 +3622,8 @@
                 <a:solidFill>
                   <a:srgbClr val="1E8900"/>
                 </a:solidFill>
+                <a:latin typeface="Arial" panose="020B0604020202020204" pitchFamily="34" charset="0"/>
+                <a:cs typeface="Arial" panose="020B0604020202020204" pitchFamily="34" charset="0"/>
               </a:rPr>
               <a:t>VPC</a:t>
             </a:r>
@@ -3624,8 +3644,8 @@
         </p:nvSpPr>
         <p:spPr>
           <a:xfrm>
-            <a:off x="715191" y="3562085"/>
-            <a:ext cx="2470969" cy="2564948"/>
+            <a:off x="934551" y="3562086"/>
+            <a:ext cx="1627632" cy="1797904"/>
           </a:xfrm>
           <a:prstGeom prst="rect">
             <a:avLst/>
@@ -3636,9 +3656,7 @@
             </a:srgbClr>
           </a:solidFill>
           <a:ln w="12700">
-            <a:solidFill>
-              <a:srgbClr val="007DBC"/>
-            </a:solidFill>
+            <a:noFill/>
             <a:prstDash val="solid"/>
           </a:ln>
         </p:spPr>
@@ -3673,6 +3691,8 @@
                 <a:solidFill>
                   <a:srgbClr val="007DBC"/>
                 </a:solidFill>
+                <a:latin typeface="Arial" panose="020B0604020202020204" pitchFamily="34" charset="0"/>
+                <a:cs typeface="Arial" panose="020B0604020202020204" pitchFamily="34" charset="0"/>
               </a:rPr>
               <a:t>Private subnet</a:t>
             </a:r>
@@ -3693,8 +3713,8 @@
         </p:nvSpPr>
         <p:spPr>
           <a:xfrm>
-            <a:off x="184009" y="172372"/>
-            <a:ext cx="11833819" cy="6474233"/>
+            <a:off x="184010" y="172373"/>
+            <a:ext cx="9588166" cy="6236894"/>
           </a:xfrm>
           <a:prstGeom prst="rect">
             <a:avLst/>
@@ -3737,6 +3757,8 @@
                 <a:solidFill>
                   <a:sysClr val="windowText" lastClr="000000"/>
                 </a:solidFill>
+                <a:latin typeface="Arial" panose="020B0604020202020204" pitchFamily="34" charset="0"/>
+                <a:cs typeface="Arial" panose="020B0604020202020204" pitchFamily="34" charset="0"/>
               </a:rPr>
               <a:t>AWS Cloud</a:t>
             </a:r>
@@ -3757,8 +3779,8 @@
         </p:nvSpPr>
         <p:spPr>
           <a:xfrm>
-            <a:off x="560063" y="619972"/>
-            <a:ext cx="2782099" cy="5849653"/>
+            <a:off x="779424" y="619973"/>
+            <a:ext cx="1938438" cy="5694838"/>
           </a:xfrm>
           <a:prstGeom prst="rect">
             <a:avLst/>
@@ -3802,6 +3824,8 @@
                 <a:solidFill>
                   <a:srgbClr val="007DBC"/>
                 </a:solidFill>
+                <a:latin typeface="Arial" panose="020B0604020202020204" pitchFamily="34" charset="0"/>
+                <a:cs typeface="Arial" panose="020B0604020202020204" pitchFamily="34" charset="0"/>
               </a:rPr>
               <a:t>Availability Zone 1</a:t>
             </a:r>
@@ -3836,7 +3860,7 @@
         </p:blipFill>
         <p:spPr>
           <a:xfrm>
-            <a:off x="3713193" y="1999794"/>
+            <a:off x="3229309" y="2503942"/>
             <a:ext cx="330200" cy="330200"/>
           </a:xfrm>
           <a:prstGeom prst="rect">
@@ -3944,7 +3968,7 @@
         </p:blipFill>
         <p:spPr>
           <a:xfrm>
-            <a:off x="711488" y="1343733"/>
+            <a:off x="930848" y="1343733"/>
             <a:ext cx="274320" cy="274320"/>
           </a:xfrm>
           <a:prstGeom prst="rect">
@@ -3980,7 +4004,7 @@
         </p:blipFill>
         <p:spPr>
           <a:xfrm>
-            <a:off x="715192" y="3571820"/>
+            <a:off x="934552" y="3571820"/>
             <a:ext cx="274320" cy="274320"/>
           </a:xfrm>
           <a:prstGeom prst="rect">
@@ -4002,8 +4026,8 @@
         </p:nvSpPr>
         <p:spPr>
           <a:xfrm>
-            <a:off x="2318611" y="1439094"/>
-            <a:ext cx="725107" cy="461665"/>
+            <a:off x="1244761" y="2173684"/>
+            <a:ext cx="1035183" cy="261610"/>
           </a:xfrm>
           <a:prstGeom prst="rect">
             <a:avLst/>
@@ -4018,7 +4042,10 @@
           <a:p>
             <a:pPr algn="ctr"/>
             <a:r>
-              <a:rPr lang="en-US" sz="1200" dirty="0"/>
+              <a:rPr lang="en-US" sz="1100" dirty="0">
+                <a:latin typeface="Arial" panose="020B0604020202020204" pitchFamily="34" charset="0"/>
+                <a:cs typeface="Arial" panose="020B0604020202020204" pitchFamily="34" charset="0"/>
+              </a:rPr>
               <a:t>NAT gateway</a:t>
             </a:r>
           </a:p>
@@ -4052,7 +4079,7 @@
         </p:blipFill>
         <p:spPr>
           <a:xfrm>
-            <a:off x="1970745" y="1393677"/>
+            <a:off x="1527402" y="1696278"/>
             <a:ext cx="469900" cy="469900"/>
           </a:xfrm>
           <a:prstGeom prst="rect">
@@ -4088,7 +4115,7 @@
         </p:blipFill>
         <p:spPr>
           <a:xfrm>
-            <a:off x="2244553" y="2264079"/>
+            <a:off x="1527402" y="2593812"/>
             <a:ext cx="469900" cy="469900"/>
           </a:xfrm>
           <a:prstGeom prst="rect">
@@ -4110,8 +4137,8 @@
         </p:nvSpPr>
         <p:spPr>
           <a:xfrm>
-            <a:off x="1992950" y="2722861"/>
-            <a:ext cx="973105" cy="276999"/>
+            <a:off x="1205168" y="3063413"/>
+            <a:ext cx="1140092" cy="266180"/>
           </a:xfrm>
           <a:prstGeom prst="rect">
             <a:avLst/>
@@ -4126,8 +4153,11 @@
           <a:p>
             <a:pPr algn="ctr"/>
             <a:r>
-              <a:rPr lang="en-US" sz="1200" dirty="0"/>
-              <a:t>RDGW</a:t>
+              <a:rPr lang="en-US" sz="1100" dirty="0">
+                <a:latin typeface="Arial" panose="020B0604020202020204" pitchFamily="34" charset="0"/>
+                <a:cs typeface="Arial" panose="020B0604020202020204" pitchFamily="34" charset="0"/>
+              </a:rPr>
+              <a:t>RD Gateway</a:t>
             </a:r>
           </a:p>
         </p:txBody>
@@ -4146,8 +4176,8 @@
         </p:nvSpPr>
         <p:spPr>
           <a:xfrm>
-            <a:off x="4510708" y="3571875"/>
-            <a:ext cx="2470969" cy="2564948"/>
+            <a:off x="4193727" y="3571875"/>
+            <a:ext cx="1627632" cy="1787525"/>
           </a:xfrm>
           <a:prstGeom prst="rect">
             <a:avLst/>
@@ -4158,9 +4188,7 @@
             </a:srgbClr>
           </a:solidFill>
           <a:ln w="12700">
-            <a:solidFill>
-              <a:srgbClr val="007DBC"/>
-            </a:solidFill>
+            <a:noFill/>
             <a:prstDash val="solid"/>
           </a:ln>
         </p:spPr>
@@ -4195,6 +4223,8 @@
                 <a:solidFill>
                   <a:srgbClr val="007DBC"/>
                 </a:solidFill>
+                <a:latin typeface="Arial" panose="020B0604020202020204" pitchFamily="34" charset="0"/>
+                <a:cs typeface="Arial" panose="020B0604020202020204" pitchFamily="34" charset="0"/>
               </a:rPr>
               <a:t>Private subnet</a:t>
             </a:r>
@@ -4215,8 +4245,8 @@
         </p:nvSpPr>
         <p:spPr>
           <a:xfrm>
-            <a:off x="4355580" y="629762"/>
-            <a:ext cx="2782099" cy="5849653"/>
+            <a:off x="4038600" y="629763"/>
+            <a:ext cx="1938438" cy="5694838"/>
           </a:xfrm>
           <a:prstGeom prst="rect">
             <a:avLst/>
@@ -4260,6 +4290,8 @@
                 <a:solidFill>
                   <a:srgbClr val="007DBC"/>
                 </a:solidFill>
+                <a:latin typeface="Arial" panose="020B0604020202020204" pitchFamily="34" charset="0"/>
+                <a:cs typeface="Arial" panose="020B0604020202020204" pitchFamily="34" charset="0"/>
               </a:rPr>
               <a:t>Availability Zone 2</a:t>
             </a:r>
@@ -4294,7 +4326,7 @@
         </p:blipFill>
         <p:spPr>
           <a:xfrm>
-            <a:off x="4507005" y="1353523"/>
+            <a:off x="4190024" y="1353523"/>
             <a:ext cx="274320" cy="274320"/>
           </a:xfrm>
           <a:prstGeom prst="rect">
@@ -4330,7 +4362,7 @@
         </p:blipFill>
         <p:spPr>
           <a:xfrm>
-            <a:off x="4510709" y="3581610"/>
+            <a:off x="4193728" y="3581610"/>
             <a:ext cx="274320" cy="274320"/>
           </a:xfrm>
           <a:prstGeom prst="rect">
@@ -4340,78 +4372,6 @@
       </p:pic>
       <p:sp>
         <p:nvSpPr>
-          <p:cNvPr id="35" name="TextBox 34">
-            <a:extLst>
-              <a:ext uri="{FF2B5EF4-FFF2-40B4-BE49-F238E27FC236}">
-                <a16:creationId xmlns:a16="http://schemas.microsoft.com/office/drawing/2014/main" id="{1CF886C8-1D5E-494C-8004-7362DA77D891}"/>
-              </a:ext>
-            </a:extLst>
-          </p:cNvPr>
-          <p:cNvSpPr txBox="1"/>
-          <p:nvPr/>
-        </p:nvSpPr>
-        <p:spPr>
-          <a:xfrm>
-            <a:off x="6130699" y="1440385"/>
-            <a:ext cx="760401" cy="461665"/>
-          </a:xfrm>
-          <a:prstGeom prst="rect">
-            <a:avLst/>
-          </a:prstGeom>
-          <a:noFill/>
-        </p:spPr>
-        <p:txBody>
-          <a:bodyPr wrap="square" rtlCol="0">
-            <a:spAutoFit/>
-          </a:bodyPr>
-          <a:lstStyle/>
-          <a:p>
-            <a:pPr algn="ctr"/>
-            <a:r>
-              <a:rPr lang="en-US" sz="1200" dirty="0"/>
-              <a:t>NAT gateway</a:t>
-            </a:r>
-          </a:p>
-        </p:txBody>
-      </p:sp>
-      <p:pic>
-        <p:nvPicPr>
-          <p:cNvPr id="36" name="Graphic 35">
-            <a:extLst>
-              <a:ext uri="{FF2B5EF4-FFF2-40B4-BE49-F238E27FC236}">
-                <a16:creationId xmlns:a16="http://schemas.microsoft.com/office/drawing/2014/main" id="{76E8F122-CFD4-394C-98DC-C6D9C4D39481}"/>
-              </a:ext>
-            </a:extLst>
-          </p:cNvPr>
-          <p:cNvPicPr>
-            <a:picLocks noChangeAspect="1"/>
-          </p:cNvPicPr>
-          <p:nvPr/>
-        </p:nvPicPr>
-        <p:blipFill>
-          <a:blip r:embed="rId14">
-            <a:extLst>
-              <a:ext uri="{96DAC541-7B7A-43D3-8B79-37D633B846F1}">
-                <asvg:svgBlip xmlns:asvg="http://schemas.microsoft.com/office/drawing/2016/SVG/main" r:embed="rId15"/>
-              </a:ext>
-            </a:extLst>
-          </a:blip>
-          <a:stretch>
-            <a:fillRect/>
-          </a:stretch>
-        </p:blipFill>
-        <p:spPr>
-          <a:xfrm>
-            <a:off x="5783111" y="1412840"/>
-            <a:ext cx="469900" cy="469900"/>
-          </a:xfrm>
-          <a:prstGeom prst="rect">
-            <a:avLst/>
-          </a:prstGeom>
-        </p:spPr>
-      </p:pic>
-      <p:sp>
-        <p:nvSpPr>
           <p:cNvPr id="45" name="Rectangle 44">
             <a:extLst>
               <a:ext uri="{FF2B5EF4-FFF2-40B4-BE49-F238E27FC236}">
@@ -4424,8 +4384,8 @@
         </p:nvSpPr>
         <p:spPr>
           <a:xfrm>
-            <a:off x="1849679" y="1998198"/>
-            <a:ext cx="7780688" cy="1050938"/>
+            <a:off x="1016000" y="2503942"/>
+            <a:ext cx="6908799" cy="835458"/>
           </a:xfrm>
           <a:prstGeom prst="rect">
             <a:avLst/>
@@ -4464,14 +4424,13 @@
           <a:lstStyle/>
           <a:p>
             <a:pPr algn="ctr"/>
-            <a:r>
-              <a:rPr lang="en-US" sz="1200" dirty="0">
-                <a:solidFill>
-                  <a:srgbClr val="D86613"/>
-                </a:solidFill>
-              </a:rPr>
-              <a:t>Auto Scaling group</a:t>
-            </a:r>
+            <a:endParaRPr lang="en-US" sz="1200" dirty="0">
+              <a:solidFill>
+                <a:srgbClr val="D86613"/>
+              </a:solidFill>
+              <a:latin typeface="Arial" panose="020B0604020202020204" pitchFamily="34" charset="0"/>
+              <a:cs typeface="Arial" panose="020B0604020202020204" pitchFamily="34" charset="0"/>
+            </a:endParaRPr>
           </a:p>
         </p:txBody>
       </p:sp>
@@ -4489,8 +4448,8 @@
         </p:nvSpPr>
         <p:spPr>
           <a:xfrm>
-            <a:off x="1849679" y="3943351"/>
-            <a:ext cx="7780688" cy="1028700"/>
+            <a:off x="1016000" y="4020455"/>
+            <a:ext cx="6908800" cy="1225667"/>
           </a:xfrm>
           <a:prstGeom prst="rect">
             <a:avLst/>
@@ -4520,7 +4479,7 @@
           </a:fontRef>
         </p:style>
         <p:txBody>
-          <a:bodyPr rot="0" spcFirstLastPara="0" vertOverflow="overflow" horzOverflow="overflow" vert="horz" wrap="square" lIns="91440" tIns="91440" rIns="91440" bIns="45720" numCol="1" spcCol="0" rtlCol="0" fromWordArt="0" anchor="t" anchorCtr="0" forceAA="0" compatLnSpc="1">
+          <a:bodyPr rot="0" spcFirstLastPara="0" vertOverflow="overflow" horzOverflow="overflow" vert="horz" wrap="square" lIns="1828800" tIns="91440" rIns="91440" bIns="45720" numCol="1" spcCol="0" rtlCol="0" fromWordArt="0" anchor="t" anchorCtr="0" forceAA="0" compatLnSpc="1">
             <a:prstTxWarp prst="textNoShape">
               <a:avLst/>
             </a:prstTxWarp>
@@ -4528,15 +4487,13 @@
           </a:bodyPr>
           <a:lstStyle/>
           <a:p>
-            <a:pPr algn="ctr"/>
-            <a:r>
-              <a:rPr lang="en-US" sz="1200" dirty="0">
-                <a:solidFill>
-                  <a:srgbClr val="5A6B86"/>
-                </a:solidFill>
-              </a:rPr>
-              <a:t>WSFC with DataKeeper Replication</a:t>
-            </a:r>
+            <a:endParaRPr lang="en-US" sz="1200" dirty="0">
+              <a:solidFill>
+                <a:srgbClr val="5A6B86"/>
+              </a:solidFill>
+              <a:latin typeface="Arial" panose="020B0604020202020204" pitchFamily="34" charset="0"/>
+              <a:cs typeface="Arial" panose="020B0604020202020204" pitchFamily="34" charset="0"/>
+            </a:endParaRPr>
           </a:p>
         </p:txBody>
       </p:sp>
@@ -4568,7 +4525,7 @@
         </p:blipFill>
         <p:spPr>
           <a:xfrm>
-            <a:off x="2469975" y="4296371"/>
+            <a:off x="1475481" y="4112134"/>
             <a:ext cx="573743" cy="573743"/>
           </a:xfrm>
           <a:prstGeom prst="rect">
@@ -4604,7 +4561,7 @@
         </p:blipFill>
         <p:spPr>
           <a:xfrm>
-            <a:off x="5380871" y="4325059"/>
+            <a:off x="4732714" y="4112134"/>
             <a:ext cx="573743" cy="573743"/>
           </a:xfrm>
           <a:prstGeom prst="rect">
@@ -4626,8 +4583,8 @@
         </p:nvSpPr>
         <p:spPr>
           <a:xfrm>
-            <a:off x="1849679" y="4326584"/>
-            <a:ext cx="674262" cy="461665"/>
+            <a:off x="986972" y="4691390"/>
+            <a:ext cx="1519549" cy="430887"/>
           </a:xfrm>
           <a:prstGeom prst="rect">
             <a:avLst/>
@@ -4640,17 +4597,26 @@
           </a:bodyPr>
           <a:lstStyle/>
           <a:p>
-            <a:pPr algn="r"/>
-            <a:r>
-              <a:rPr lang="en-US" sz="1200" dirty="0"/>
-              <a:t>Primary </a:t>
-            </a:r>
-          </a:p>
-          <a:p>
-            <a:pPr algn="r"/>
-            <a:r>
-              <a:rPr lang="en-US" sz="1200" dirty="0"/>
-              <a:t>replica</a:t>
+            <a:pPr algn="ctr"/>
+            <a:r>
+              <a:rPr lang="en-US" sz="1100" dirty="0">
+                <a:latin typeface="Arial" panose="020B0604020202020204" pitchFamily="34" charset="0"/>
+                <a:cs typeface="Arial" panose="020B0604020202020204" pitchFamily="34" charset="0"/>
+              </a:rPr>
+              <a:t>SQL Server node 1 </a:t>
+            </a:r>
+            <a:br>
+              <a:rPr lang="en-US" sz="1100" dirty="0">
+                <a:latin typeface="Arial" panose="020B0604020202020204" pitchFamily="34" charset="0"/>
+                <a:cs typeface="Arial" panose="020B0604020202020204" pitchFamily="34" charset="0"/>
+              </a:rPr>
+            </a:br>
+            <a:r>
+              <a:rPr lang="en-US" sz="1100" dirty="0">
+                <a:latin typeface="Arial" panose="020B0604020202020204" pitchFamily="34" charset="0"/>
+                <a:cs typeface="Arial" panose="020B0604020202020204" pitchFamily="34" charset="0"/>
+              </a:rPr>
+              <a:t>with replica</a:t>
             </a:r>
           </a:p>
         </p:txBody>
@@ -4669,8 +4635,8 @@
         </p:nvSpPr>
         <p:spPr>
           <a:xfrm>
-            <a:off x="5968611" y="4345947"/>
-            <a:ext cx="922489" cy="461665"/>
+            <a:off x="4210418" y="4691390"/>
+            <a:ext cx="1589803" cy="430887"/>
           </a:xfrm>
           <a:prstGeom prst="rect">
             <a:avLst/>
@@ -4683,15 +4649,26 @@
           </a:bodyPr>
           <a:lstStyle/>
           <a:p>
-            <a:r>
-              <a:rPr lang="en-US" sz="1200" dirty="0"/>
-              <a:t>Secondary </a:t>
-            </a:r>
-          </a:p>
-          <a:p>
-            <a:r>
-              <a:rPr lang="en-US" sz="1200" dirty="0"/>
-              <a:t>replica</a:t>
+            <a:pPr algn="ctr"/>
+            <a:r>
+              <a:rPr lang="en-US" sz="1100" dirty="0">
+                <a:latin typeface="Arial" panose="020B0604020202020204" pitchFamily="34" charset="0"/>
+                <a:cs typeface="Arial" panose="020B0604020202020204" pitchFamily="34" charset="0"/>
+              </a:rPr>
+              <a:t>SQL Server node 2</a:t>
+            </a:r>
+            <a:br>
+              <a:rPr lang="en-US" sz="1100" dirty="0">
+                <a:latin typeface="Arial" panose="020B0604020202020204" pitchFamily="34" charset="0"/>
+                <a:cs typeface="Arial" panose="020B0604020202020204" pitchFamily="34" charset="0"/>
+              </a:rPr>
+            </a:br>
+            <a:r>
+              <a:rPr lang="en-US" sz="1100" dirty="0">
+                <a:latin typeface="Arial" panose="020B0604020202020204" pitchFamily="34" charset="0"/>
+                <a:cs typeface="Arial" panose="020B0604020202020204" pitchFamily="34" charset="0"/>
+              </a:rPr>
+              <a:t>with replica</a:t>
             </a:r>
           </a:p>
         </p:txBody>
@@ -4710,8 +4687,8 @@
         </p:nvSpPr>
         <p:spPr>
           <a:xfrm>
-            <a:off x="8278957" y="1355882"/>
-            <a:ext cx="2474928" cy="2065388"/>
+            <a:off x="6387644" y="1355882"/>
+            <a:ext cx="1627632" cy="2065388"/>
           </a:xfrm>
           <a:prstGeom prst="rect">
             <a:avLst/>
@@ -4722,9 +4699,7 @@
             </a:srgbClr>
           </a:solidFill>
           <a:ln w="12700">
-            <a:solidFill>
-              <a:srgbClr val="1E8900"/>
-            </a:solidFill>
+            <a:noFill/>
             <a:prstDash val="solid"/>
           </a:ln>
         </p:spPr>
@@ -4759,6 +4734,8 @@
                 <a:solidFill>
                   <a:srgbClr val="1E8900"/>
                 </a:solidFill>
+                <a:latin typeface="Arial" panose="020B0604020202020204" pitchFamily="34" charset="0"/>
+                <a:cs typeface="Arial" panose="020B0604020202020204" pitchFamily="34" charset="0"/>
               </a:rPr>
               <a:t>Public subnet</a:t>
             </a:r>
@@ -4799,7 +4776,7 @@
         </p:blipFill>
         <p:spPr>
           <a:xfrm>
-            <a:off x="8720746" y="2293965"/>
+            <a:off x="6966979" y="2593812"/>
             <a:ext cx="469900" cy="469900"/>
           </a:xfrm>
           <a:prstGeom prst="rect">
@@ -4824,8 +4801,8 @@
         </p:nvSpPr>
         <p:spPr>
           <a:xfrm>
-            <a:off x="8282660" y="3571875"/>
-            <a:ext cx="2470969" cy="2564948"/>
+            <a:off x="6391347" y="3571875"/>
+            <a:ext cx="1627632" cy="1787525"/>
           </a:xfrm>
           <a:prstGeom prst="rect">
             <a:avLst/>
@@ -4836,9 +4813,7 @@
             </a:srgbClr>
           </a:solidFill>
           <a:ln w="12700">
-            <a:solidFill>
-              <a:srgbClr val="007DBC"/>
-            </a:solidFill>
+            <a:noFill/>
             <a:prstDash val="solid"/>
           </a:ln>
         </p:spPr>
@@ -4873,6 +4848,8 @@
                 <a:solidFill>
                   <a:srgbClr val="007DBC"/>
                 </a:solidFill>
+                <a:latin typeface="Arial" panose="020B0604020202020204" pitchFamily="34" charset="0"/>
+                <a:cs typeface="Arial" panose="020B0604020202020204" pitchFamily="34" charset="0"/>
               </a:rPr>
               <a:t>Private subnet</a:t>
             </a:r>
@@ -4893,8 +4870,8 @@
         </p:nvSpPr>
         <p:spPr>
           <a:xfrm>
-            <a:off x="8127532" y="629762"/>
-            <a:ext cx="2782099" cy="5849653"/>
+            <a:off x="6236220" y="629763"/>
+            <a:ext cx="1933746" cy="5694838"/>
           </a:xfrm>
           <a:prstGeom prst="rect">
             <a:avLst/>
@@ -4938,6 +4915,3271 @@
                 <a:solidFill>
                   <a:srgbClr val="007DBC"/>
                 </a:solidFill>
+                <a:latin typeface="Arial" panose="020B0604020202020204" pitchFamily="34" charset="0"/>
+                <a:cs typeface="Arial" panose="020B0604020202020204" pitchFamily="34" charset="0"/>
+              </a:rPr>
+              <a:t>Availability Zone 3</a:t>
+            </a:r>
+          </a:p>
+        </p:txBody>
+      </p:sp>
+      <p:pic>
+        <p:nvPicPr>
+          <p:cNvPr id="48" name="Graphic 47">
+            <a:extLst>
+              <a:ext uri="{FF2B5EF4-FFF2-40B4-BE49-F238E27FC236}">
+                <a16:creationId xmlns:a16="http://schemas.microsoft.com/office/drawing/2014/main" id="{80C740EE-E304-EB4F-8F4F-655107822FCD}"/>
+              </a:ext>
+            </a:extLst>
+          </p:cNvPr>
+          <p:cNvPicPr>
+            <a:picLocks noChangeAspect="1"/>
+          </p:cNvPicPr>
+          <p:nvPr/>
+        </p:nvPicPr>
+        <p:blipFill>
+          <a:blip r:embed="rId10">
+            <a:extLst>
+              <a:ext uri="{96DAC541-7B7A-43D3-8B79-37D633B846F1}">
+                <asvg:svgBlip xmlns:asvg="http://schemas.microsoft.com/office/drawing/2016/SVG/main" r:embed="rId11"/>
+              </a:ext>
+            </a:extLst>
+          </a:blip>
+          <a:stretch>
+            <a:fillRect/>
+          </a:stretch>
+        </p:blipFill>
+        <p:spPr>
+          <a:xfrm>
+            <a:off x="6387644" y="1353523"/>
+            <a:ext cx="274320" cy="274320"/>
+          </a:xfrm>
+          <a:prstGeom prst="rect">
+            <a:avLst/>
+          </a:prstGeom>
+        </p:spPr>
+      </p:pic>
+      <p:pic>
+        <p:nvPicPr>
+          <p:cNvPr id="57" name="Graphic 56">
+            <a:extLst>
+              <a:ext uri="{FF2B5EF4-FFF2-40B4-BE49-F238E27FC236}">
+                <a16:creationId xmlns:a16="http://schemas.microsoft.com/office/drawing/2014/main" id="{6756DE6B-8CEF-3C4D-A926-0B3C425D64AD}"/>
+              </a:ext>
+            </a:extLst>
+          </p:cNvPr>
+          <p:cNvPicPr>
+            <a:picLocks noChangeAspect="1"/>
+          </p:cNvPicPr>
+          <p:nvPr/>
+        </p:nvPicPr>
+        <p:blipFill>
+          <a:blip r:embed="rId12">
+            <a:extLst>
+              <a:ext uri="{96DAC541-7B7A-43D3-8B79-37D633B846F1}">
+                <asvg:svgBlip xmlns:asvg="http://schemas.microsoft.com/office/drawing/2016/SVG/main" r:embed="rId13"/>
+              </a:ext>
+            </a:extLst>
+          </a:blip>
+          <a:stretch>
+            <a:fillRect/>
+          </a:stretch>
+        </p:blipFill>
+        <p:spPr>
+          <a:xfrm>
+            <a:off x="6391348" y="3581610"/>
+            <a:ext cx="274320" cy="274320"/>
+          </a:xfrm>
+          <a:prstGeom prst="rect">
+            <a:avLst/>
+          </a:prstGeom>
+        </p:spPr>
+      </p:pic>
+      <p:pic>
+        <p:nvPicPr>
+          <p:cNvPr id="62" name="Graphic 61">
+            <a:extLst>
+              <a:ext uri="{FF2B5EF4-FFF2-40B4-BE49-F238E27FC236}">
+                <a16:creationId xmlns:a16="http://schemas.microsoft.com/office/drawing/2014/main" id="{5C134F55-C14C-494E-9720-DA08A9B04B6E}"/>
+              </a:ext>
+            </a:extLst>
+          </p:cNvPr>
+          <p:cNvPicPr>
+            <a:picLocks noChangeAspect="1"/>
+          </p:cNvPicPr>
+          <p:nvPr/>
+        </p:nvPicPr>
+        <p:blipFill>
+          <a:blip r:embed="rId18">
+            <a:extLst>
+              <a:ext uri="{96DAC541-7B7A-43D3-8B79-37D633B846F1}">
+                <asvg:svgBlip xmlns:asvg="http://schemas.microsoft.com/office/drawing/2016/SVG/main" r:embed="rId19"/>
+              </a:ext>
+            </a:extLst>
+          </a:blip>
+          <a:stretch>
+            <a:fillRect/>
+          </a:stretch>
+        </p:blipFill>
+        <p:spPr>
+          <a:xfrm>
+            <a:off x="6915058" y="4112134"/>
+            <a:ext cx="573743" cy="573743"/>
+          </a:xfrm>
+          <a:prstGeom prst="rect">
+            <a:avLst/>
+          </a:prstGeom>
+          <a:effectLst>
+            <a:softEdge rad="0"/>
+          </a:effectLst>
+        </p:spPr>
+      </p:pic>
+      <p:sp>
+        <p:nvSpPr>
+          <p:cNvPr id="64" name="TextBox 63">
+            <a:extLst>
+              <a:ext uri="{FF2B5EF4-FFF2-40B4-BE49-F238E27FC236}">
+                <a16:creationId xmlns:a16="http://schemas.microsoft.com/office/drawing/2014/main" id="{A376846E-941B-D04E-A9D1-6BB5A5ADC4A9}"/>
+              </a:ext>
+            </a:extLst>
+          </p:cNvPr>
+          <p:cNvSpPr txBox="1"/>
+          <p:nvPr/>
+        </p:nvSpPr>
+        <p:spPr>
+          <a:xfrm>
+            <a:off x="6679531" y="3119735"/>
+            <a:ext cx="1044797" cy="446276"/>
+          </a:xfrm>
+          <a:prstGeom prst="rect">
+            <a:avLst/>
+          </a:prstGeom>
+          <a:noFill/>
+        </p:spPr>
+        <p:txBody>
+          <a:bodyPr wrap="square" rtlCol="0">
+            <a:spAutoFit/>
+          </a:bodyPr>
+          <a:lstStyle/>
+          <a:p>
+            <a:pPr algn="ctr"/>
+            <a:r>
+              <a:rPr lang="en-US" sz="1100" dirty="0">
+                <a:latin typeface="Arial" panose="020B0604020202020204" pitchFamily="34" charset="0"/>
+                <a:cs typeface="Arial" panose="020B0604020202020204" pitchFamily="34" charset="0"/>
+              </a:rPr>
+              <a:t>RD Gateway</a:t>
+            </a:r>
+          </a:p>
+          <a:p>
+            <a:pPr algn="ctr"/>
+            <a:endParaRPr lang="en-US" sz="1200" dirty="0">
+              <a:latin typeface="Arial" panose="020B0604020202020204" pitchFamily="34" charset="0"/>
+              <a:cs typeface="Arial" panose="020B0604020202020204" pitchFamily="34" charset="0"/>
+            </a:endParaRPr>
+          </a:p>
+        </p:txBody>
+      </p:sp>
+      <p:sp>
+        <p:nvSpPr>
+          <p:cNvPr id="65" name="TextBox 64">
+            <a:extLst>
+              <a:ext uri="{FF2B5EF4-FFF2-40B4-BE49-F238E27FC236}">
+                <a16:creationId xmlns:a16="http://schemas.microsoft.com/office/drawing/2014/main" id="{C52451FD-4DDC-6948-AC78-4DF42DD371A7}"/>
+              </a:ext>
+            </a:extLst>
+          </p:cNvPr>
+          <p:cNvSpPr txBox="1"/>
+          <p:nvPr/>
+        </p:nvSpPr>
+        <p:spPr>
+          <a:xfrm>
+            <a:off x="6470470" y="4691390"/>
+            <a:ext cx="1430883" cy="430887"/>
+          </a:xfrm>
+          <a:prstGeom prst="rect">
+            <a:avLst/>
+          </a:prstGeom>
+          <a:noFill/>
+        </p:spPr>
+        <p:txBody>
+          <a:bodyPr wrap="square" rtlCol="0">
+            <a:spAutoFit/>
+          </a:bodyPr>
+          <a:lstStyle/>
+          <a:p>
+            <a:pPr algn="ctr"/>
+            <a:r>
+              <a:rPr lang="en-US" sz="1100" dirty="0">
+                <a:latin typeface="Arial" panose="020B0604020202020204" pitchFamily="34" charset="0"/>
+                <a:cs typeface="Arial" panose="020B0604020202020204" pitchFamily="34" charset="0"/>
+              </a:rPr>
+              <a:t>SQL Server node 3 with replica</a:t>
+            </a:r>
+          </a:p>
+        </p:txBody>
+      </p:sp>
+      <p:sp>
+        <p:nvSpPr>
+          <p:cNvPr id="67" name="TextBox 66">
+            <a:extLst>
+              <a:ext uri="{FF2B5EF4-FFF2-40B4-BE49-F238E27FC236}">
+                <a16:creationId xmlns:a16="http://schemas.microsoft.com/office/drawing/2014/main" id="{201108FB-9F50-0548-AD17-7568A51E46F2}"/>
+              </a:ext>
+            </a:extLst>
+          </p:cNvPr>
+          <p:cNvSpPr txBox="1"/>
+          <p:nvPr/>
+        </p:nvSpPr>
+        <p:spPr>
+          <a:xfrm>
+            <a:off x="8268010" y="5361801"/>
+            <a:ext cx="1504166" cy="276999"/>
+          </a:xfrm>
+          <a:prstGeom prst="rect">
+            <a:avLst/>
+          </a:prstGeom>
+          <a:noFill/>
+        </p:spPr>
+        <p:txBody>
+          <a:bodyPr wrap="square" rtlCol="0">
+            <a:spAutoFit/>
+          </a:bodyPr>
+          <a:lstStyle/>
+          <a:p>
+            <a:pPr algn="ctr"/>
+            <a:r>
+              <a:rPr lang="en-US" sz="1200" dirty="0">
+                <a:latin typeface="Arial" panose="020B0604020202020204" pitchFamily="34" charset="0"/>
+                <a:cs typeface="Arial" panose="020B0604020202020204" pitchFamily="34" charset="0"/>
+              </a:rPr>
+              <a:t>Systems Manager</a:t>
+            </a:r>
+          </a:p>
+        </p:txBody>
+      </p:sp>
+      <p:sp>
+        <p:nvSpPr>
+          <p:cNvPr id="69" name="TextBox 68">
+            <a:extLst>
+              <a:ext uri="{FF2B5EF4-FFF2-40B4-BE49-F238E27FC236}">
+                <a16:creationId xmlns:a16="http://schemas.microsoft.com/office/drawing/2014/main" id="{DC75AA82-F7C7-4B40-A009-A58E49642607}"/>
+              </a:ext>
+            </a:extLst>
+          </p:cNvPr>
+          <p:cNvSpPr txBox="1"/>
+          <p:nvPr/>
+        </p:nvSpPr>
+        <p:spPr>
+          <a:xfrm>
+            <a:off x="8348056" y="4126035"/>
+            <a:ext cx="1344074" cy="276999"/>
+          </a:xfrm>
+          <a:prstGeom prst="rect">
+            <a:avLst/>
+          </a:prstGeom>
+          <a:noFill/>
+        </p:spPr>
+        <p:txBody>
+          <a:bodyPr wrap="square" rtlCol="0">
+            <a:spAutoFit/>
+          </a:bodyPr>
+          <a:lstStyle/>
+          <a:p>
+            <a:pPr algn="ctr"/>
+            <a:r>
+              <a:rPr lang="en-US" sz="1200" dirty="0">
+                <a:latin typeface="Arial" panose="020B0604020202020204" pitchFamily="34" charset="0"/>
+                <a:cs typeface="Arial" panose="020B0604020202020204" pitchFamily="34" charset="0"/>
+              </a:rPr>
+              <a:t>Secrets Manager</a:t>
+            </a:r>
+          </a:p>
+        </p:txBody>
+      </p:sp>
+      <p:sp>
+        <p:nvSpPr>
+          <p:cNvPr id="77" name="TextBox 9">
+            <a:extLst>
+              <a:ext uri="{FF2B5EF4-FFF2-40B4-BE49-F238E27FC236}">
+                <a16:creationId xmlns:a16="http://schemas.microsoft.com/office/drawing/2014/main" id="{B0B2D327-5291-4292-BC6C-E36B405F78F2}"/>
+              </a:ext>
+            </a:extLst>
+          </p:cNvPr>
+          <p:cNvSpPr txBox="1">
+            <a:spLocks noChangeArrowheads="1"/>
+          </p:cNvSpPr>
+          <p:nvPr/>
+        </p:nvSpPr>
+        <p:spPr bwMode="auto">
+          <a:xfrm>
+            <a:off x="8348056" y="2894880"/>
+            <a:ext cx="1344074" cy="276999"/>
+          </a:xfrm>
+          <a:prstGeom prst="rect">
+            <a:avLst/>
+          </a:prstGeom>
+          <a:noFill/>
+          <a:ln>
+            <a:noFill/>
+          </a:ln>
+          <a:extLst>
+            <a:ext uri="{909E8E84-426E-40DD-AFC4-6F175D3DCCD1}">
+              <a14:hiddenFill xmlns:a14="http://schemas.microsoft.com/office/drawing/2010/main">
+                <a:solidFill>
+                  <a:srgbClr val="FFFFFF"/>
+                </a:solidFill>
+              </a14:hiddenFill>
+            </a:ext>
+            <a:ext uri="{91240B29-F687-4F45-9708-019B960494DF}">
+              <a14:hiddenLine xmlns:a14="http://schemas.microsoft.com/office/drawing/2010/main" w="9525">
+                <a:solidFill>
+                  <a:srgbClr val="000000"/>
+                </a:solidFill>
+                <a:miter lim="800000"/>
+                <a:headEnd/>
+                <a:tailEnd/>
+              </a14:hiddenLine>
+            </a:ext>
+          </a:extLst>
+        </p:spPr>
+        <p:txBody>
+          <a:bodyPr wrap="square">
+            <a:spAutoFit/>
+          </a:bodyPr>
+          <a:lstStyle>
+            <a:lvl1pPr>
+              <a:defRPr>
+                <a:solidFill>
+                  <a:schemeClr val="tx1"/>
+                </a:solidFill>
+                <a:latin typeface="Calibri" panose="020F0502020204030204" pitchFamily="34" charset="0"/>
+              </a:defRPr>
+            </a:lvl1pPr>
+            <a:lvl2pPr marL="742950" indent="-285750">
+              <a:defRPr>
+                <a:solidFill>
+                  <a:schemeClr val="tx1"/>
+                </a:solidFill>
+                <a:latin typeface="Calibri" panose="020F0502020204030204" pitchFamily="34" charset="0"/>
+              </a:defRPr>
+            </a:lvl2pPr>
+            <a:lvl3pPr marL="1143000" indent="-228600">
+              <a:defRPr>
+                <a:solidFill>
+                  <a:schemeClr val="tx1"/>
+                </a:solidFill>
+                <a:latin typeface="Calibri" panose="020F0502020204030204" pitchFamily="34" charset="0"/>
+              </a:defRPr>
+            </a:lvl3pPr>
+            <a:lvl4pPr marL="1600200" indent="-228600">
+              <a:defRPr>
+                <a:solidFill>
+                  <a:schemeClr val="tx1"/>
+                </a:solidFill>
+                <a:latin typeface="Calibri" panose="020F0502020204030204" pitchFamily="34" charset="0"/>
+              </a:defRPr>
+            </a:lvl4pPr>
+            <a:lvl5pPr marL="2057400" indent="-228600">
+              <a:defRPr>
+                <a:solidFill>
+                  <a:schemeClr val="tx1"/>
+                </a:solidFill>
+                <a:latin typeface="Calibri" panose="020F0502020204030204" pitchFamily="34" charset="0"/>
+              </a:defRPr>
+            </a:lvl5pPr>
+            <a:lvl6pPr marL="2514600" indent="-228600" eaLnBrk="0" fontAlgn="base" hangingPunct="0">
+              <a:spcBef>
+                <a:spcPct val="0"/>
+              </a:spcBef>
+              <a:spcAft>
+                <a:spcPct val="0"/>
+              </a:spcAft>
+              <a:defRPr>
+                <a:solidFill>
+                  <a:schemeClr val="tx1"/>
+                </a:solidFill>
+                <a:latin typeface="Calibri" panose="020F0502020204030204" pitchFamily="34" charset="0"/>
+              </a:defRPr>
+            </a:lvl6pPr>
+            <a:lvl7pPr marL="2971800" indent="-228600" eaLnBrk="0" fontAlgn="base" hangingPunct="0">
+              <a:spcBef>
+                <a:spcPct val="0"/>
+              </a:spcBef>
+              <a:spcAft>
+                <a:spcPct val="0"/>
+              </a:spcAft>
+              <a:defRPr>
+                <a:solidFill>
+                  <a:schemeClr val="tx1"/>
+                </a:solidFill>
+                <a:latin typeface="Calibri" panose="020F0502020204030204" pitchFamily="34" charset="0"/>
+              </a:defRPr>
+            </a:lvl7pPr>
+            <a:lvl8pPr marL="3429000" indent="-228600" eaLnBrk="0" fontAlgn="base" hangingPunct="0">
+              <a:spcBef>
+                <a:spcPct val="0"/>
+              </a:spcBef>
+              <a:spcAft>
+                <a:spcPct val="0"/>
+              </a:spcAft>
+              <a:defRPr>
+                <a:solidFill>
+                  <a:schemeClr val="tx1"/>
+                </a:solidFill>
+                <a:latin typeface="Calibri" panose="020F0502020204030204" pitchFamily="34" charset="0"/>
+              </a:defRPr>
+            </a:lvl8pPr>
+            <a:lvl9pPr marL="3886200" indent="-228600" eaLnBrk="0" fontAlgn="base" hangingPunct="0">
+              <a:spcBef>
+                <a:spcPct val="0"/>
+              </a:spcBef>
+              <a:spcAft>
+                <a:spcPct val="0"/>
+              </a:spcAft>
+              <a:defRPr>
+                <a:solidFill>
+                  <a:schemeClr val="tx1"/>
+                </a:solidFill>
+                <a:latin typeface="Calibri" panose="020F0502020204030204" pitchFamily="34" charset="0"/>
+              </a:defRPr>
+            </a:lvl9pPr>
+          </a:lstStyle>
+          <a:p>
+            <a:pPr algn="ctr" eaLnBrk="1" hangingPunct="1"/>
+            <a:r>
+              <a:rPr lang="en-US" altLang="en-US" sz="1200" dirty="0">
+                <a:latin typeface="Arial" panose="020B0604020202020204" pitchFamily="34" charset="0"/>
+                <a:ea typeface="Amazon Ember" panose="020B0603020204020204" pitchFamily="34" charset="0"/>
+                <a:cs typeface="Arial" panose="020B0604020202020204" pitchFamily="34" charset="0"/>
+              </a:rPr>
+              <a:t>Directory Service</a:t>
+            </a:r>
+          </a:p>
+        </p:txBody>
+      </p:sp>
+      <p:pic>
+        <p:nvPicPr>
+          <p:cNvPr id="55" name="Graphic 18">
+            <a:extLst>
+              <a:ext uri="{FF2B5EF4-FFF2-40B4-BE49-F238E27FC236}">
+                <a16:creationId xmlns:a16="http://schemas.microsoft.com/office/drawing/2014/main" id="{A2DE0125-7EDE-4BDD-93E9-E6C5A549E8D5}"/>
+              </a:ext>
+            </a:extLst>
+          </p:cNvPr>
+          <p:cNvPicPr>
+            <a:picLocks noChangeAspect="1" noChangeArrowheads="1"/>
+          </p:cNvPicPr>
+          <p:nvPr/>
+        </p:nvPicPr>
+        <p:blipFill>
+          <a:blip r:embed="rId20">
+            <a:extLst>
+              <a:ext uri="{28A0092B-C50C-407E-A947-70E740481C1C}">
+                <a14:useLocalDpi xmlns:a14="http://schemas.microsoft.com/office/drawing/2010/main" val="0"/>
+              </a:ext>
+            </a:extLst>
+          </a:blip>
+          <a:srcRect/>
+          <a:stretch>
+            <a:fillRect/>
+          </a:stretch>
+        </p:blipFill>
+        <p:spPr bwMode="auto">
+          <a:xfrm>
+            <a:off x="8639093" y="733478"/>
+            <a:ext cx="762000" cy="762000"/>
+          </a:xfrm>
+          <a:prstGeom prst="rect">
+            <a:avLst/>
+          </a:prstGeom>
+          <a:noFill/>
+          <a:ln>
+            <a:noFill/>
+          </a:ln>
+          <a:extLst>
+            <a:ext uri="{909E8E84-426E-40DD-AFC4-6F175D3DCCD1}">
+              <a14:hiddenFill xmlns:a14="http://schemas.microsoft.com/office/drawing/2010/main">
+                <a:solidFill>
+                  <a:srgbClr val="FFFFFF"/>
+                </a:solidFill>
+              </a14:hiddenFill>
+            </a:ext>
+            <a:ext uri="{91240B29-F687-4F45-9708-019B960494DF}">
+              <a14:hiddenLine xmlns:a14="http://schemas.microsoft.com/office/drawing/2010/main" w="9525">
+                <a:solidFill>
+                  <a:srgbClr val="000000"/>
+                </a:solidFill>
+                <a:miter lim="800000"/>
+                <a:headEnd/>
+                <a:tailEnd/>
+              </a14:hiddenLine>
+            </a:ext>
+          </a:extLst>
+        </p:spPr>
+      </p:pic>
+      <p:sp>
+        <p:nvSpPr>
+          <p:cNvPr id="56" name="TextBox 12">
+            <a:extLst>
+              <a:ext uri="{FF2B5EF4-FFF2-40B4-BE49-F238E27FC236}">
+                <a16:creationId xmlns:a16="http://schemas.microsoft.com/office/drawing/2014/main" id="{705339A6-6C76-4254-8424-7054EA906E69}"/>
+              </a:ext>
+            </a:extLst>
+          </p:cNvPr>
+          <p:cNvSpPr txBox="1">
+            <a:spLocks noChangeArrowheads="1"/>
+          </p:cNvSpPr>
+          <p:nvPr/>
+        </p:nvSpPr>
+        <p:spPr bwMode="auto">
+          <a:xfrm>
+            <a:off x="8229600" y="1497065"/>
+            <a:ext cx="1580987" cy="461665"/>
+          </a:xfrm>
+          <a:prstGeom prst="rect">
+            <a:avLst/>
+          </a:prstGeom>
+          <a:noFill/>
+          <a:ln>
+            <a:noFill/>
+          </a:ln>
+          <a:extLst>
+            <a:ext uri="{909E8E84-426E-40DD-AFC4-6F175D3DCCD1}">
+              <a14:hiddenFill xmlns:a14="http://schemas.microsoft.com/office/drawing/2010/main">
+                <a:solidFill>
+                  <a:srgbClr val="FFFFFF"/>
+                </a:solidFill>
+              </a14:hiddenFill>
+            </a:ext>
+            <a:ext uri="{91240B29-F687-4F45-9708-019B960494DF}">
+              <a14:hiddenLine xmlns:a14="http://schemas.microsoft.com/office/drawing/2010/main" w="9525">
+                <a:solidFill>
+                  <a:srgbClr val="000000"/>
+                </a:solidFill>
+                <a:miter lim="800000"/>
+                <a:headEnd/>
+                <a:tailEnd/>
+              </a14:hiddenLine>
+            </a:ext>
+          </a:extLst>
+        </p:spPr>
+        <p:txBody>
+          <a:bodyPr wrap="square">
+            <a:spAutoFit/>
+          </a:bodyPr>
+          <a:lstStyle>
+            <a:lvl1pPr>
+              <a:defRPr>
+                <a:solidFill>
+                  <a:schemeClr val="tx1"/>
+                </a:solidFill>
+                <a:latin typeface="Calibri" panose="020F0502020204030204" pitchFamily="34" charset="0"/>
+              </a:defRPr>
+            </a:lvl1pPr>
+            <a:lvl2pPr marL="742950" indent="-285750">
+              <a:defRPr>
+                <a:solidFill>
+                  <a:schemeClr val="tx1"/>
+                </a:solidFill>
+                <a:latin typeface="Calibri" panose="020F0502020204030204" pitchFamily="34" charset="0"/>
+              </a:defRPr>
+            </a:lvl2pPr>
+            <a:lvl3pPr marL="1143000" indent="-228600">
+              <a:defRPr>
+                <a:solidFill>
+                  <a:schemeClr val="tx1"/>
+                </a:solidFill>
+                <a:latin typeface="Calibri" panose="020F0502020204030204" pitchFamily="34" charset="0"/>
+              </a:defRPr>
+            </a:lvl3pPr>
+            <a:lvl4pPr marL="1600200" indent="-228600">
+              <a:defRPr>
+                <a:solidFill>
+                  <a:schemeClr val="tx1"/>
+                </a:solidFill>
+                <a:latin typeface="Calibri" panose="020F0502020204030204" pitchFamily="34" charset="0"/>
+              </a:defRPr>
+            </a:lvl4pPr>
+            <a:lvl5pPr marL="2057400" indent="-228600">
+              <a:defRPr>
+                <a:solidFill>
+                  <a:schemeClr val="tx1"/>
+                </a:solidFill>
+                <a:latin typeface="Calibri" panose="020F0502020204030204" pitchFamily="34" charset="0"/>
+              </a:defRPr>
+            </a:lvl5pPr>
+            <a:lvl6pPr marL="2514600" indent="-228600" eaLnBrk="0" fontAlgn="base" hangingPunct="0">
+              <a:spcBef>
+                <a:spcPct val="0"/>
+              </a:spcBef>
+              <a:spcAft>
+                <a:spcPct val="0"/>
+              </a:spcAft>
+              <a:defRPr>
+                <a:solidFill>
+                  <a:schemeClr val="tx1"/>
+                </a:solidFill>
+                <a:latin typeface="Calibri" panose="020F0502020204030204" pitchFamily="34" charset="0"/>
+              </a:defRPr>
+            </a:lvl6pPr>
+            <a:lvl7pPr marL="2971800" indent="-228600" eaLnBrk="0" fontAlgn="base" hangingPunct="0">
+              <a:spcBef>
+                <a:spcPct val="0"/>
+              </a:spcBef>
+              <a:spcAft>
+                <a:spcPct val="0"/>
+              </a:spcAft>
+              <a:defRPr>
+                <a:solidFill>
+                  <a:schemeClr val="tx1"/>
+                </a:solidFill>
+                <a:latin typeface="Calibri" panose="020F0502020204030204" pitchFamily="34" charset="0"/>
+              </a:defRPr>
+            </a:lvl7pPr>
+            <a:lvl8pPr marL="3429000" indent="-228600" eaLnBrk="0" fontAlgn="base" hangingPunct="0">
+              <a:spcBef>
+                <a:spcPct val="0"/>
+              </a:spcBef>
+              <a:spcAft>
+                <a:spcPct val="0"/>
+              </a:spcAft>
+              <a:defRPr>
+                <a:solidFill>
+                  <a:schemeClr val="tx1"/>
+                </a:solidFill>
+                <a:latin typeface="Calibri" panose="020F0502020204030204" pitchFamily="34" charset="0"/>
+              </a:defRPr>
+            </a:lvl8pPr>
+            <a:lvl9pPr marL="3886200" indent="-228600" eaLnBrk="0" fontAlgn="base" hangingPunct="0">
+              <a:spcBef>
+                <a:spcPct val="0"/>
+              </a:spcBef>
+              <a:spcAft>
+                <a:spcPct val="0"/>
+              </a:spcAft>
+              <a:defRPr>
+                <a:solidFill>
+                  <a:schemeClr val="tx1"/>
+                </a:solidFill>
+                <a:latin typeface="Calibri" panose="020F0502020204030204" pitchFamily="34" charset="0"/>
+              </a:defRPr>
+            </a:lvl9pPr>
+          </a:lstStyle>
+          <a:p>
+            <a:pPr algn="ctr" eaLnBrk="1" hangingPunct="1"/>
+            <a:r>
+              <a:rPr lang="en-US" altLang="en-US" sz="1200" dirty="0">
+                <a:latin typeface="Arial" panose="020B0604020202020204" pitchFamily="34" charset="0"/>
+                <a:ea typeface="Amazon Ember" panose="020B0603020204020204" pitchFamily="34" charset="0"/>
+                <a:cs typeface="Arial" panose="020B0604020202020204" pitchFamily="34" charset="0"/>
+              </a:rPr>
+              <a:t>Amazon FSx for</a:t>
+            </a:r>
+            <a:br>
+              <a:rPr lang="en-US" altLang="en-US" sz="1200" dirty="0">
+                <a:latin typeface="Arial" panose="020B0604020202020204" pitchFamily="34" charset="0"/>
+                <a:ea typeface="Amazon Ember" panose="020B0603020204020204" pitchFamily="34" charset="0"/>
+                <a:cs typeface="Arial" panose="020B0604020202020204" pitchFamily="34" charset="0"/>
+              </a:rPr>
+            </a:br>
+            <a:r>
+              <a:rPr lang="en-US" altLang="en-US" sz="1200" dirty="0">
+                <a:latin typeface="Arial" panose="020B0604020202020204" pitchFamily="34" charset="0"/>
+                <a:ea typeface="Amazon Ember" panose="020B0603020204020204" pitchFamily="34" charset="0"/>
+                <a:cs typeface="Arial" panose="020B0604020202020204" pitchFamily="34" charset="0"/>
+              </a:rPr>
+              <a:t>Windows File Server</a:t>
+            </a:r>
+          </a:p>
+        </p:txBody>
+      </p:sp>
+      <p:sp>
+        <p:nvSpPr>
+          <p:cNvPr id="60" name="TextBox 16">
+            <a:extLst>
+              <a:ext uri="{FF2B5EF4-FFF2-40B4-BE49-F238E27FC236}">
+                <a16:creationId xmlns:a16="http://schemas.microsoft.com/office/drawing/2014/main" id="{1051FD55-0DC9-49FE-9122-ABE2EF0A26F4}"/>
+              </a:ext>
+            </a:extLst>
+          </p:cNvPr>
+          <p:cNvSpPr txBox="1">
+            <a:spLocks noChangeArrowheads="1"/>
+          </p:cNvSpPr>
+          <p:nvPr/>
+        </p:nvSpPr>
+        <p:spPr bwMode="auto">
+          <a:xfrm>
+            <a:off x="2743200" y="5741316"/>
+            <a:ext cx="1255644" cy="430887"/>
+          </a:xfrm>
+          <a:prstGeom prst="rect">
+            <a:avLst/>
+          </a:prstGeom>
+          <a:noFill/>
+          <a:ln>
+            <a:noFill/>
+          </a:ln>
+          <a:extLst>
+            <a:ext uri="{909E8E84-426E-40DD-AFC4-6F175D3DCCD1}">
+              <a14:hiddenFill xmlns:a14="http://schemas.microsoft.com/office/drawing/2010/main">
+                <a:solidFill>
+                  <a:srgbClr val="FFFFFF"/>
+                </a:solidFill>
+              </a14:hiddenFill>
+            </a:ext>
+            <a:ext uri="{91240B29-F687-4F45-9708-019B960494DF}">
+              <a14:hiddenLine xmlns:a14="http://schemas.microsoft.com/office/drawing/2010/main" w="9525">
+                <a:solidFill>
+                  <a:srgbClr val="000000"/>
+                </a:solidFill>
+                <a:miter lim="800000"/>
+                <a:headEnd/>
+                <a:tailEnd/>
+              </a14:hiddenLine>
+            </a:ext>
+          </a:extLst>
+        </p:spPr>
+        <p:txBody>
+          <a:bodyPr wrap="square">
+            <a:spAutoFit/>
+          </a:bodyPr>
+          <a:lstStyle>
+            <a:lvl1pPr>
+              <a:defRPr>
+                <a:solidFill>
+                  <a:schemeClr val="tx1"/>
+                </a:solidFill>
+                <a:latin typeface="Calibri" panose="020F0502020204030204" pitchFamily="34" charset="0"/>
+              </a:defRPr>
+            </a:lvl1pPr>
+            <a:lvl2pPr marL="742950" indent="-285750">
+              <a:defRPr>
+                <a:solidFill>
+                  <a:schemeClr val="tx1"/>
+                </a:solidFill>
+                <a:latin typeface="Calibri" panose="020F0502020204030204" pitchFamily="34" charset="0"/>
+              </a:defRPr>
+            </a:lvl2pPr>
+            <a:lvl3pPr marL="1143000" indent="-228600">
+              <a:defRPr>
+                <a:solidFill>
+                  <a:schemeClr val="tx1"/>
+                </a:solidFill>
+                <a:latin typeface="Calibri" panose="020F0502020204030204" pitchFamily="34" charset="0"/>
+              </a:defRPr>
+            </a:lvl3pPr>
+            <a:lvl4pPr marL="1600200" indent="-228600">
+              <a:defRPr>
+                <a:solidFill>
+                  <a:schemeClr val="tx1"/>
+                </a:solidFill>
+                <a:latin typeface="Calibri" panose="020F0502020204030204" pitchFamily="34" charset="0"/>
+              </a:defRPr>
+            </a:lvl4pPr>
+            <a:lvl5pPr marL="2057400" indent="-228600">
+              <a:defRPr>
+                <a:solidFill>
+                  <a:schemeClr val="tx1"/>
+                </a:solidFill>
+                <a:latin typeface="Calibri" panose="020F0502020204030204" pitchFamily="34" charset="0"/>
+              </a:defRPr>
+            </a:lvl5pPr>
+            <a:lvl6pPr marL="2514600" indent="-228600" eaLnBrk="0" fontAlgn="base" hangingPunct="0">
+              <a:spcBef>
+                <a:spcPct val="0"/>
+              </a:spcBef>
+              <a:spcAft>
+                <a:spcPct val="0"/>
+              </a:spcAft>
+              <a:defRPr>
+                <a:solidFill>
+                  <a:schemeClr val="tx1"/>
+                </a:solidFill>
+                <a:latin typeface="Calibri" panose="020F0502020204030204" pitchFamily="34" charset="0"/>
+              </a:defRPr>
+            </a:lvl6pPr>
+            <a:lvl7pPr marL="2971800" indent="-228600" eaLnBrk="0" fontAlgn="base" hangingPunct="0">
+              <a:spcBef>
+                <a:spcPct val="0"/>
+              </a:spcBef>
+              <a:spcAft>
+                <a:spcPct val="0"/>
+              </a:spcAft>
+              <a:defRPr>
+                <a:solidFill>
+                  <a:schemeClr val="tx1"/>
+                </a:solidFill>
+                <a:latin typeface="Calibri" panose="020F0502020204030204" pitchFamily="34" charset="0"/>
+              </a:defRPr>
+            </a:lvl7pPr>
+            <a:lvl8pPr marL="3429000" indent="-228600" eaLnBrk="0" fontAlgn="base" hangingPunct="0">
+              <a:spcBef>
+                <a:spcPct val="0"/>
+              </a:spcBef>
+              <a:spcAft>
+                <a:spcPct val="0"/>
+              </a:spcAft>
+              <a:defRPr>
+                <a:solidFill>
+                  <a:schemeClr val="tx1"/>
+                </a:solidFill>
+                <a:latin typeface="Calibri" panose="020F0502020204030204" pitchFamily="34" charset="0"/>
+              </a:defRPr>
+            </a:lvl8pPr>
+            <a:lvl9pPr marL="3886200" indent="-228600" eaLnBrk="0" fontAlgn="base" hangingPunct="0">
+              <a:spcBef>
+                <a:spcPct val="0"/>
+              </a:spcBef>
+              <a:spcAft>
+                <a:spcPct val="0"/>
+              </a:spcAft>
+              <a:defRPr>
+                <a:solidFill>
+                  <a:schemeClr val="tx1"/>
+                </a:solidFill>
+                <a:latin typeface="Calibri" panose="020F0502020204030204" pitchFamily="34" charset="0"/>
+              </a:defRPr>
+            </a:lvl9pPr>
+          </a:lstStyle>
+          <a:p>
+            <a:pPr algn="ctr" eaLnBrk="1" hangingPunct="1"/>
+            <a:r>
+              <a:rPr lang="en-US" altLang="en-US" sz="1100" dirty="0">
+                <a:latin typeface="Arial" panose="020B0604020202020204" pitchFamily="34" charset="0"/>
+                <a:ea typeface="Amazon Ember" panose="020B0603020204020204" pitchFamily="34" charset="0"/>
+                <a:cs typeface="Arial" panose="020B0604020202020204" pitchFamily="34" charset="0"/>
+              </a:rPr>
+              <a:t>Amazon FSx </a:t>
+            </a:r>
+            <a:br>
+              <a:rPr lang="en-US" altLang="en-US" sz="1100" dirty="0">
+                <a:latin typeface="Arial" panose="020B0604020202020204" pitchFamily="34" charset="0"/>
+                <a:ea typeface="Amazon Ember" panose="020B0603020204020204" pitchFamily="34" charset="0"/>
+                <a:cs typeface="Arial" panose="020B0604020202020204" pitchFamily="34" charset="0"/>
+              </a:rPr>
+            </a:br>
+            <a:r>
+              <a:rPr lang="en-US" altLang="en-US" sz="1100" dirty="0">
+                <a:latin typeface="Arial" panose="020B0604020202020204" pitchFamily="34" charset="0"/>
+                <a:ea typeface="Amazon Ember" panose="020B0603020204020204" pitchFamily="34" charset="0"/>
+                <a:cs typeface="Arial" panose="020B0604020202020204" pitchFamily="34" charset="0"/>
+              </a:rPr>
+              <a:t>file system</a:t>
+            </a:r>
+          </a:p>
+        </p:txBody>
+      </p:sp>
+      <p:pic>
+        <p:nvPicPr>
+          <p:cNvPr id="61" name="Graphic 17">
+            <a:extLst>
+              <a:ext uri="{FF2B5EF4-FFF2-40B4-BE49-F238E27FC236}">
+                <a16:creationId xmlns:a16="http://schemas.microsoft.com/office/drawing/2014/main" id="{1B7245A7-0A4F-4D16-9D52-454FF84C2EB1}"/>
+              </a:ext>
+            </a:extLst>
+          </p:cNvPr>
+          <p:cNvPicPr>
+            <a:picLocks noChangeAspect="1" noChangeArrowheads="1"/>
+          </p:cNvPicPr>
+          <p:nvPr/>
+        </p:nvPicPr>
+        <p:blipFill>
+          <a:blip r:embed="rId21">
+            <a:extLst>
+              <a:ext uri="{28A0092B-C50C-407E-A947-70E740481C1C}">
+                <a14:useLocalDpi xmlns:a14="http://schemas.microsoft.com/office/drawing/2010/main" val="0"/>
+              </a:ext>
+            </a:extLst>
+          </a:blip>
+          <a:srcRect/>
+          <a:stretch>
+            <a:fillRect/>
+          </a:stretch>
+        </p:blipFill>
+        <p:spPr bwMode="auto">
+          <a:xfrm>
+            <a:off x="3170650" y="5284116"/>
+            <a:ext cx="457200" cy="457200"/>
+          </a:xfrm>
+          <a:prstGeom prst="rect">
+            <a:avLst/>
+          </a:prstGeom>
+          <a:noFill/>
+          <a:ln>
+            <a:noFill/>
+          </a:ln>
+          <a:extLst>
+            <a:ext uri="{909E8E84-426E-40DD-AFC4-6F175D3DCCD1}">
+              <a14:hiddenFill xmlns:a14="http://schemas.microsoft.com/office/drawing/2010/main">
+                <a:solidFill>
+                  <a:srgbClr val="FFFFFF"/>
+                </a:solidFill>
+              </a14:hiddenFill>
+            </a:ext>
+            <a:ext uri="{91240B29-F687-4F45-9708-019B960494DF}">
+              <a14:hiddenLine xmlns:a14="http://schemas.microsoft.com/office/drawing/2010/main" w="9525">
+                <a:solidFill>
+                  <a:srgbClr val="000000"/>
+                </a:solidFill>
+                <a:miter lim="800000"/>
+                <a:headEnd/>
+                <a:tailEnd/>
+              </a14:hiddenLine>
+            </a:ext>
+          </a:extLst>
+        </p:spPr>
+      </p:pic>
+      <p:sp>
+        <p:nvSpPr>
+          <p:cNvPr id="78" name="TextBox 77">
+            <a:extLst>
+              <a:ext uri="{FF2B5EF4-FFF2-40B4-BE49-F238E27FC236}">
+                <a16:creationId xmlns:a16="http://schemas.microsoft.com/office/drawing/2014/main" id="{66D07B82-BF92-4D3D-8A4E-F9CC401EB97F}"/>
+              </a:ext>
+            </a:extLst>
+          </p:cNvPr>
+          <p:cNvSpPr txBox="1"/>
+          <p:nvPr/>
+        </p:nvSpPr>
+        <p:spPr>
+          <a:xfrm>
+            <a:off x="4501994" y="2176790"/>
+            <a:ext cx="1035183" cy="261610"/>
+          </a:xfrm>
+          <a:prstGeom prst="rect">
+            <a:avLst/>
+          </a:prstGeom>
+          <a:noFill/>
+        </p:spPr>
+        <p:txBody>
+          <a:bodyPr wrap="square" rtlCol="0">
+            <a:spAutoFit/>
+          </a:bodyPr>
+          <a:lstStyle/>
+          <a:p>
+            <a:pPr algn="ctr"/>
+            <a:r>
+              <a:rPr lang="en-US" sz="1100" dirty="0">
+                <a:latin typeface="Arial" panose="020B0604020202020204" pitchFamily="34" charset="0"/>
+                <a:cs typeface="Arial" panose="020B0604020202020204" pitchFamily="34" charset="0"/>
+              </a:rPr>
+              <a:t>NAT gateway</a:t>
+            </a:r>
+          </a:p>
+        </p:txBody>
+      </p:sp>
+      <p:pic>
+        <p:nvPicPr>
+          <p:cNvPr id="79" name="Graphic 78">
+            <a:extLst>
+              <a:ext uri="{FF2B5EF4-FFF2-40B4-BE49-F238E27FC236}">
+                <a16:creationId xmlns:a16="http://schemas.microsoft.com/office/drawing/2014/main" id="{8714B8CC-C0A3-4852-919A-A34F5F2A50DD}"/>
+              </a:ext>
+            </a:extLst>
+          </p:cNvPr>
+          <p:cNvPicPr>
+            <a:picLocks noChangeAspect="1"/>
+          </p:cNvPicPr>
+          <p:nvPr/>
+        </p:nvPicPr>
+        <p:blipFill>
+          <a:blip r:embed="rId14">
+            <a:extLst>
+              <a:ext uri="{96DAC541-7B7A-43D3-8B79-37D633B846F1}">
+                <asvg:svgBlip xmlns:asvg="http://schemas.microsoft.com/office/drawing/2016/SVG/main" r:embed="rId15"/>
+              </a:ext>
+            </a:extLst>
+          </a:blip>
+          <a:stretch>
+            <a:fillRect/>
+          </a:stretch>
+        </p:blipFill>
+        <p:spPr>
+          <a:xfrm>
+            <a:off x="4784635" y="1699384"/>
+            <a:ext cx="469900" cy="469900"/>
+          </a:xfrm>
+          <a:prstGeom prst="rect">
+            <a:avLst/>
+          </a:prstGeom>
+        </p:spPr>
+      </p:pic>
+      <p:sp>
+        <p:nvSpPr>
+          <p:cNvPr id="80" name="TextBox 79">
+            <a:extLst>
+              <a:ext uri="{FF2B5EF4-FFF2-40B4-BE49-F238E27FC236}">
+                <a16:creationId xmlns:a16="http://schemas.microsoft.com/office/drawing/2014/main" id="{5515A940-6809-433A-9BE0-544D620D9C3D}"/>
+              </a:ext>
+            </a:extLst>
+          </p:cNvPr>
+          <p:cNvSpPr txBox="1"/>
+          <p:nvPr/>
+        </p:nvSpPr>
+        <p:spPr>
+          <a:xfrm>
+            <a:off x="6684338" y="2176790"/>
+            <a:ext cx="1035183" cy="261610"/>
+          </a:xfrm>
+          <a:prstGeom prst="rect">
+            <a:avLst/>
+          </a:prstGeom>
+          <a:noFill/>
+        </p:spPr>
+        <p:txBody>
+          <a:bodyPr wrap="square" rtlCol="0">
+            <a:spAutoFit/>
+          </a:bodyPr>
+          <a:lstStyle/>
+          <a:p>
+            <a:pPr algn="ctr"/>
+            <a:r>
+              <a:rPr lang="en-US" sz="1100" dirty="0">
+                <a:latin typeface="Arial" panose="020B0604020202020204" pitchFamily="34" charset="0"/>
+                <a:cs typeface="Arial" panose="020B0604020202020204" pitchFamily="34" charset="0"/>
+              </a:rPr>
+              <a:t>NAT gateway</a:t>
+            </a:r>
+          </a:p>
+        </p:txBody>
+      </p:sp>
+      <p:pic>
+        <p:nvPicPr>
+          <p:cNvPr id="81" name="Graphic 80">
+            <a:extLst>
+              <a:ext uri="{FF2B5EF4-FFF2-40B4-BE49-F238E27FC236}">
+                <a16:creationId xmlns:a16="http://schemas.microsoft.com/office/drawing/2014/main" id="{5852E716-28A7-454F-98A2-9A3AB55D885A}"/>
+              </a:ext>
+            </a:extLst>
+          </p:cNvPr>
+          <p:cNvPicPr>
+            <a:picLocks noChangeAspect="1"/>
+          </p:cNvPicPr>
+          <p:nvPr/>
+        </p:nvPicPr>
+        <p:blipFill>
+          <a:blip r:embed="rId14">
+            <a:extLst>
+              <a:ext uri="{96DAC541-7B7A-43D3-8B79-37D633B846F1}">
+                <asvg:svgBlip xmlns:asvg="http://schemas.microsoft.com/office/drawing/2016/SVG/main" r:embed="rId15"/>
+              </a:ext>
+            </a:extLst>
+          </a:blip>
+          <a:stretch>
+            <a:fillRect/>
+          </a:stretch>
+        </p:blipFill>
+        <p:spPr>
+          <a:xfrm>
+            <a:off x="6966979" y="1699384"/>
+            <a:ext cx="469900" cy="469900"/>
+          </a:xfrm>
+          <a:prstGeom prst="rect">
+            <a:avLst/>
+          </a:prstGeom>
+        </p:spPr>
+      </p:pic>
+      <p:sp>
+        <p:nvSpPr>
+          <p:cNvPr id="16" name="TextBox 15">
+            <a:extLst>
+              <a:ext uri="{FF2B5EF4-FFF2-40B4-BE49-F238E27FC236}">
+                <a16:creationId xmlns:a16="http://schemas.microsoft.com/office/drawing/2014/main" id="{0A09D38D-CA78-40A5-9C77-1DE6DDE523D1}"/>
+              </a:ext>
+            </a:extLst>
+          </p:cNvPr>
+          <p:cNvSpPr txBox="1"/>
+          <p:nvPr/>
+        </p:nvSpPr>
+        <p:spPr>
+          <a:xfrm>
+            <a:off x="2713774" y="4038600"/>
+            <a:ext cx="1361270" cy="646331"/>
+          </a:xfrm>
+          <a:prstGeom prst="rect">
+            <a:avLst/>
+          </a:prstGeom>
+          <a:noFill/>
+        </p:spPr>
+        <p:txBody>
+          <a:bodyPr wrap="none" rtlCol="0">
+            <a:spAutoFit/>
+          </a:bodyPr>
+          <a:lstStyle/>
+          <a:p>
+            <a:pPr algn="ctr"/>
+            <a:r>
+              <a:rPr lang="en-US" sz="1200" dirty="0">
+                <a:solidFill>
+                  <a:srgbClr val="5A6B86"/>
+                </a:solidFill>
+                <a:latin typeface="Arial" panose="020B0604020202020204" pitchFamily="34" charset="0"/>
+                <a:cs typeface="Arial" panose="020B0604020202020204" pitchFamily="34" charset="0"/>
+              </a:rPr>
+              <a:t>WSFC cluster </a:t>
+            </a:r>
+            <a:br>
+              <a:rPr lang="en-US" sz="1200" dirty="0">
+                <a:solidFill>
+                  <a:srgbClr val="5A6B86"/>
+                </a:solidFill>
+                <a:latin typeface="Arial" panose="020B0604020202020204" pitchFamily="34" charset="0"/>
+                <a:cs typeface="Arial" panose="020B0604020202020204" pitchFamily="34" charset="0"/>
+              </a:rPr>
+            </a:br>
+            <a:r>
+              <a:rPr lang="en-US" sz="1200" dirty="0">
+                <a:solidFill>
+                  <a:srgbClr val="5A6B86"/>
+                </a:solidFill>
+                <a:latin typeface="Arial" panose="020B0604020202020204" pitchFamily="34" charset="0"/>
+                <a:cs typeface="Arial" panose="020B0604020202020204" pitchFamily="34" charset="0"/>
+              </a:rPr>
+              <a:t>with DataKeeper </a:t>
+            </a:r>
+            <a:br>
+              <a:rPr lang="en-US" sz="1200" dirty="0">
+                <a:solidFill>
+                  <a:srgbClr val="5A6B86"/>
+                </a:solidFill>
+                <a:latin typeface="Arial" panose="020B0604020202020204" pitchFamily="34" charset="0"/>
+                <a:cs typeface="Arial" panose="020B0604020202020204" pitchFamily="34" charset="0"/>
+              </a:rPr>
+            </a:br>
+            <a:r>
+              <a:rPr lang="en-US" sz="1200" dirty="0">
+                <a:solidFill>
+                  <a:srgbClr val="5A6B86"/>
+                </a:solidFill>
+                <a:latin typeface="Arial" panose="020B0604020202020204" pitchFamily="34" charset="0"/>
+                <a:cs typeface="Arial" panose="020B0604020202020204" pitchFamily="34" charset="0"/>
+              </a:rPr>
+              <a:t>replication</a:t>
+            </a:r>
+          </a:p>
+        </p:txBody>
+      </p:sp>
+      <p:sp>
+        <p:nvSpPr>
+          <p:cNvPr id="17" name="TextBox 16">
+            <a:extLst>
+              <a:ext uri="{FF2B5EF4-FFF2-40B4-BE49-F238E27FC236}">
+                <a16:creationId xmlns:a16="http://schemas.microsoft.com/office/drawing/2014/main" id="{E039C0DB-5BD2-4B93-90B1-56B29CA87234}"/>
+              </a:ext>
+            </a:extLst>
+          </p:cNvPr>
+          <p:cNvSpPr txBox="1"/>
+          <p:nvPr/>
+        </p:nvSpPr>
+        <p:spPr>
+          <a:xfrm>
+            <a:off x="2871670" y="2842845"/>
+            <a:ext cx="1045479" cy="461665"/>
+          </a:xfrm>
+          <a:prstGeom prst="rect">
+            <a:avLst/>
+          </a:prstGeom>
+          <a:noFill/>
+        </p:spPr>
+        <p:txBody>
+          <a:bodyPr wrap="none" rtlCol="0">
+            <a:spAutoFit/>
+          </a:bodyPr>
+          <a:lstStyle/>
+          <a:p>
+            <a:pPr algn="ctr"/>
+            <a:r>
+              <a:rPr lang="en-US" sz="1200" dirty="0">
+                <a:solidFill>
+                  <a:srgbClr val="D86613"/>
+                </a:solidFill>
+                <a:latin typeface="Arial" panose="020B0604020202020204" pitchFamily="34" charset="0"/>
+                <a:cs typeface="Arial" panose="020B0604020202020204" pitchFamily="34" charset="0"/>
+              </a:rPr>
+              <a:t>Auto Scaling</a:t>
+            </a:r>
+            <a:br>
+              <a:rPr lang="en-US" sz="1200" dirty="0">
+                <a:solidFill>
+                  <a:srgbClr val="D86613"/>
+                </a:solidFill>
+                <a:latin typeface="Arial" panose="020B0604020202020204" pitchFamily="34" charset="0"/>
+                <a:cs typeface="Arial" panose="020B0604020202020204" pitchFamily="34" charset="0"/>
+              </a:rPr>
+            </a:br>
+            <a:r>
+              <a:rPr lang="en-US" sz="1200" dirty="0">
+                <a:solidFill>
+                  <a:srgbClr val="D86613"/>
+                </a:solidFill>
+                <a:latin typeface="Arial" panose="020B0604020202020204" pitchFamily="34" charset="0"/>
+                <a:cs typeface="Arial" panose="020B0604020202020204" pitchFamily="34" charset="0"/>
+              </a:rPr>
+              <a:t>group</a:t>
+            </a:r>
+          </a:p>
+        </p:txBody>
+      </p:sp>
+      <p:pic>
+        <p:nvPicPr>
+          <p:cNvPr id="82" name="Graphic 7">
+            <a:extLst>
+              <a:ext uri="{FF2B5EF4-FFF2-40B4-BE49-F238E27FC236}">
+                <a16:creationId xmlns:a16="http://schemas.microsoft.com/office/drawing/2014/main" id="{A9115010-8240-494D-980B-1EE5BBF0A8EB}"/>
+              </a:ext>
+            </a:extLst>
+          </p:cNvPr>
+          <p:cNvPicPr>
+            <a:picLocks noChangeAspect="1" noChangeArrowheads="1"/>
+          </p:cNvPicPr>
+          <p:nvPr/>
+        </p:nvPicPr>
+        <p:blipFill>
+          <a:blip r:embed="rId22">
+            <a:extLst>
+              <a:ext uri="{28A0092B-C50C-407E-A947-70E740481C1C}">
+                <a14:useLocalDpi xmlns:a14="http://schemas.microsoft.com/office/drawing/2010/main" val="0"/>
+              </a:ext>
+            </a:extLst>
+          </a:blip>
+          <a:srcRect/>
+          <a:stretch>
+            <a:fillRect/>
+          </a:stretch>
+        </p:blipFill>
+        <p:spPr bwMode="auto">
+          <a:xfrm>
+            <a:off x="8639093" y="2140929"/>
+            <a:ext cx="762000" cy="762000"/>
+          </a:xfrm>
+          <a:prstGeom prst="rect">
+            <a:avLst/>
+          </a:prstGeom>
+          <a:noFill/>
+          <a:ln>
+            <a:noFill/>
+          </a:ln>
+          <a:extLst>
+            <a:ext uri="{909E8E84-426E-40DD-AFC4-6F175D3DCCD1}">
+              <a14:hiddenFill xmlns:a14="http://schemas.microsoft.com/office/drawing/2010/main">
+                <a:solidFill>
+                  <a:srgbClr val="FFFFFF"/>
+                </a:solidFill>
+              </a14:hiddenFill>
+            </a:ext>
+            <a:ext uri="{91240B29-F687-4F45-9708-019B960494DF}">
+              <a14:hiddenLine xmlns:a14="http://schemas.microsoft.com/office/drawing/2010/main" w="9525">
+                <a:solidFill>
+                  <a:srgbClr val="000000"/>
+                </a:solidFill>
+                <a:miter lim="800000"/>
+                <a:headEnd/>
+                <a:tailEnd/>
+              </a14:hiddenLine>
+            </a:ext>
+          </a:extLst>
+        </p:spPr>
+      </p:pic>
+      <p:pic>
+        <p:nvPicPr>
+          <p:cNvPr id="83" name="Graphic 17">
+            <a:extLst>
+              <a:ext uri="{FF2B5EF4-FFF2-40B4-BE49-F238E27FC236}">
+                <a16:creationId xmlns:a16="http://schemas.microsoft.com/office/drawing/2014/main" id="{51C9771A-2065-4A13-B54A-643932293459}"/>
+              </a:ext>
+            </a:extLst>
+          </p:cNvPr>
+          <p:cNvPicPr>
+            <a:picLocks noChangeAspect="1" noChangeArrowheads="1"/>
+          </p:cNvPicPr>
+          <p:nvPr/>
+        </p:nvPicPr>
+        <p:blipFill>
+          <a:blip r:embed="rId23">
+            <a:extLst>
+              <a:ext uri="{28A0092B-C50C-407E-A947-70E740481C1C}">
+                <a14:useLocalDpi xmlns:a14="http://schemas.microsoft.com/office/drawing/2010/main" val="0"/>
+              </a:ext>
+            </a:extLst>
+          </a:blip>
+          <a:srcRect/>
+          <a:stretch>
+            <a:fillRect/>
+          </a:stretch>
+        </p:blipFill>
+        <p:spPr bwMode="auto">
+          <a:xfrm>
+            <a:off x="8639783" y="3358561"/>
+            <a:ext cx="762000" cy="762000"/>
+          </a:xfrm>
+          <a:prstGeom prst="rect">
+            <a:avLst/>
+          </a:prstGeom>
+          <a:noFill/>
+          <a:ln>
+            <a:noFill/>
+          </a:ln>
+          <a:extLst>
+            <a:ext uri="{909E8E84-426E-40DD-AFC4-6F175D3DCCD1}">
+              <a14:hiddenFill xmlns:a14="http://schemas.microsoft.com/office/drawing/2010/main">
+                <a:solidFill>
+                  <a:srgbClr val="FFFFFF"/>
+                </a:solidFill>
+              </a14:hiddenFill>
+            </a:ext>
+            <a:ext uri="{91240B29-F687-4F45-9708-019B960494DF}">
+              <a14:hiddenLine xmlns:a14="http://schemas.microsoft.com/office/drawing/2010/main" w="9525">
+                <a:solidFill>
+                  <a:srgbClr val="000000"/>
+                </a:solidFill>
+                <a:miter lim="800000"/>
+                <a:headEnd/>
+                <a:tailEnd/>
+              </a14:hiddenLine>
+            </a:ext>
+          </a:extLst>
+        </p:spPr>
+      </p:pic>
+      <p:pic>
+        <p:nvPicPr>
+          <p:cNvPr id="84" name="Graphic 15">
+            <a:extLst>
+              <a:ext uri="{FF2B5EF4-FFF2-40B4-BE49-F238E27FC236}">
+                <a16:creationId xmlns:a16="http://schemas.microsoft.com/office/drawing/2014/main" id="{139329F1-A3F5-4F0B-B056-DE8A61EA5D02}"/>
+              </a:ext>
+            </a:extLst>
+          </p:cNvPr>
+          <p:cNvPicPr>
+            <a:picLocks noChangeAspect="1" noChangeArrowheads="1"/>
+          </p:cNvPicPr>
+          <p:nvPr/>
+        </p:nvPicPr>
+        <p:blipFill>
+          <a:blip r:embed="rId24">
+            <a:extLst>
+              <a:ext uri="{28A0092B-C50C-407E-A947-70E740481C1C}">
+                <a14:useLocalDpi xmlns:a14="http://schemas.microsoft.com/office/drawing/2010/main" val="0"/>
+              </a:ext>
+            </a:extLst>
+          </a:blip>
+          <a:srcRect/>
+          <a:stretch>
+            <a:fillRect/>
+          </a:stretch>
+        </p:blipFill>
+        <p:spPr bwMode="auto">
+          <a:xfrm>
+            <a:off x="8639783" y="4594174"/>
+            <a:ext cx="762000" cy="762000"/>
+          </a:xfrm>
+          <a:prstGeom prst="rect">
+            <a:avLst/>
+          </a:prstGeom>
+          <a:noFill/>
+          <a:ln>
+            <a:noFill/>
+          </a:ln>
+          <a:extLst>
+            <a:ext uri="{909E8E84-426E-40DD-AFC4-6F175D3DCCD1}">
+              <a14:hiddenFill xmlns:a14="http://schemas.microsoft.com/office/drawing/2010/main">
+                <a:solidFill>
+                  <a:srgbClr val="FFFFFF"/>
+                </a:solidFill>
+              </a14:hiddenFill>
+            </a:ext>
+            <a:ext uri="{91240B29-F687-4F45-9708-019B960494DF}">
+              <a14:hiddenLine xmlns:a14="http://schemas.microsoft.com/office/drawing/2010/main" w="9525">
+                <a:solidFill>
+                  <a:srgbClr val="000000"/>
+                </a:solidFill>
+                <a:miter lim="800000"/>
+                <a:headEnd/>
+                <a:tailEnd/>
+              </a14:hiddenLine>
+            </a:ext>
+          </a:extLst>
+        </p:spPr>
+      </p:pic>
+      <p:sp>
+        <p:nvSpPr>
+          <p:cNvPr id="85" name="Freeform 36">
+            <a:extLst>
+              <a:ext uri="{FF2B5EF4-FFF2-40B4-BE49-F238E27FC236}">
+                <a16:creationId xmlns:a16="http://schemas.microsoft.com/office/drawing/2014/main" id="{1DF04EE1-5C7B-4403-8532-5E4810BB8E43}"/>
+              </a:ext>
+            </a:extLst>
+          </p:cNvPr>
+          <p:cNvSpPr/>
+          <p:nvPr/>
+        </p:nvSpPr>
+        <p:spPr>
+          <a:xfrm rot="16200000" flipH="1">
+            <a:off x="2212490" y="4639841"/>
+            <a:ext cx="451063" cy="1388432"/>
+          </a:xfrm>
+          <a:custGeom>
+            <a:avLst/>
+            <a:gdLst>
+              <a:gd name="connsiteX0" fmla="*/ 1371600 w 1371600"/>
+              <a:gd name="connsiteY0" fmla="*/ 711200 h 711200"/>
+              <a:gd name="connsiteX1" fmla="*/ 1371600 w 1371600"/>
+              <a:gd name="connsiteY1" fmla="*/ 0 h 711200"/>
+              <a:gd name="connsiteX2" fmla="*/ 0 w 1371600"/>
+              <a:gd name="connsiteY2" fmla="*/ 0 h 711200"/>
+            </a:gdLst>
+            <a:ahLst/>
+            <a:cxnLst>
+              <a:cxn ang="0">
+                <a:pos x="connsiteX0" y="connsiteY0"/>
+              </a:cxn>
+              <a:cxn ang="0">
+                <a:pos x="connsiteX1" y="connsiteY1"/>
+              </a:cxn>
+              <a:cxn ang="0">
+                <a:pos x="connsiteX2" y="connsiteY2"/>
+              </a:cxn>
+            </a:cxnLst>
+            <a:rect l="l" t="t" r="r" b="b"/>
+            <a:pathLst>
+              <a:path w="1371600" h="711200">
+                <a:moveTo>
+                  <a:pt x="1371600" y="711200"/>
+                </a:moveTo>
+                <a:lnTo>
+                  <a:pt x="1371600" y="0"/>
+                </a:lnTo>
+                <a:lnTo>
+                  <a:pt x="0" y="0"/>
+                </a:lnTo>
+              </a:path>
+            </a:pathLst>
+          </a:custGeom>
+          <a:noFill/>
+          <a:ln w="12700">
+            <a:solidFill>
+              <a:schemeClr val="tx2"/>
+            </a:solidFill>
+            <a:headEnd type="arrow" w="med" len="sm"/>
+            <a:tailEnd type="arrow" w="med" len="sm"/>
+          </a:ln>
+        </p:spPr>
+        <p:style>
+          <a:lnRef idx="2">
+            <a:schemeClr val="accent1">
+              <a:shade val="50000"/>
+            </a:schemeClr>
+          </a:lnRef>
+          <a:fillRef idx="1">
+            <a:schemeClr val="accent1"/>
+          </a:fillRef>
+          <a:effectRef idx="0">
+            <a:schemeClr val="accent1"/>
+          </a:effectRef>
+          <a:fontRef idx="minor">
+            <a:schemeClr val="lt1"/>
+          </a:fontRef>
+        </p:style>
+        <p:txBody>
+          <a:bodyPr anchor="ctr"/>
+          <a:lstStyle/>
+          <a:p>
+            <a:pPr algn="ctr" eaLnBrk="1" fontAlgn="auto" hangingPunct="1">
+              <a:spcBef>
+                <a:spcPts val="0"/>
+              </a:spcBef>
+              <a:spcAft>
+                <a:spcPts val="0"/>
+              </a:spcAft>
+              <a:defRPr/>
+            </a:pPr>
+            <a:endParaRPr lang="en-US" dirty="0"/>
+          </a:p>
+        </p:txBody>
+      </p:sp>
+      <p:sp>
+        <p:nvSpPr>
+          <p:cNvPr id="86" name="Freeform 36">
+            <a:extLst>
+              <a:ext uri="{FF2B5EF4-FFF2-40B4-BE49-F238E27FC236}">
+                <a16:creationId xmlns:a16="http://schemas.microsoft.com/office/drawing/2014/main" id="{0C2B24B6-9E55-4495-A61F-8E12C8C7E840}"/>
+              </a:ext>
+            </a:extLst>
+          </p:cNvPr>
+          <p:cNvSpPr/>
+          <p:nvPr/>
+        </p:nvSpPr>
+        <p:spPr>
+          <a:xfrm rot="16200000" flipH="1" flipV="1">
+            <a:off x="5234806" y="3588526"/>
+            <a:ext cx="451063" cy="3491063"/>
+          </a:xfrm>
+          <a:custGeom>
+            <a:avLst/>
+            <a:gdLst>
+              <a:gd name="connsiteX0" fmla="*/ 1371600 w 1371600"/>
+              <a:gd name="connsiteY0" fmla="*/ 711200 h 711200"/>
+              <a:gd name="connsiteX1" fmla="*/ 1371600 w 1371600"/>
+              <a:gd name="connsiteY1" fmla="*/ 0 h 711200"/>
+              <a:gd name="connsiteX2" fmla="*/ 0 w 1371600"/>
+              <a:gd name="connsiteY2" fmla="*/ 0 h 711200"/>
+            </a:gdLst>
+            <a:ahLst/>
+            <a:cxnLst>
+              <a:cxn ang="0">
+                <a:pos x="connsiteX0" y="connsiteY0"/>
+              </a:cxn>
+              <a:cxn ang="0">
+                <a:pos x="connsiteX1" y="connsiteY1"/>
+              </a:cxn>
+              <a:cxn ang="0">
+                <a:pos x="connsiteX2" y="connsiteY2"/>
+              </a:cxn>
+            </a:cxnLst>
+            <a:rect l="l" t="t" r="r" b="b"/>
+            <a:pathLst>
+              <a:path w="1371600" h="711200">
+                <a:moveTo>
+                  <a:pt x="1371600" y="711200"/>
+                </a:moveTo>
+                <a:lnTo>
+                  <a:pt x="1371600" y="0"/>
+                </a:lnTo>
+                <a:lnTo>
+                  <a:pt x="0" y="0"/>
+                </a:lnTo>
+              </a:path>
+            </a:pathLst>
+          </a:custGeom>
+          <a:noFill/>
+          <a:ln w="12700">
+            <a:solidFill>
+              <a:schemeClr val="tx2"/>
+            </a:solidFill>
+            <a:headEnd type="arrow" w="med" len="sm"/>
+            <a:tailEnd type="arrow" w="med" len="sm"/>
+          </a:ln>
+        </p:spPr>
+        <p:style>
+          <a:lnRef idx="2">
+            <a:schemeClr val="accent1">
+              <a:shade val="50000"/>
+            </a:schemeClr>
+          </a:lnRef>
+          <a:fillRef idx="1">
+            <a:schemeClr val="accent1"/>
+          </a:fillRef>
+          <a:effectRef idx="0">
+            <a:schemeClr val="accent1"/>
+          </a:effectRef>
+          <a:fontRef idx="minor">
+            <a:schemeClr val="lt1"/>
+          </a:fontRef>
+        </p:style>
+        <p:txBody>
+          <a:bodyPr anchor="ctr"/>
+          <a:lstStyle/>
+          <a:p>
+            <a:pPr algn="ctr" eaLnBrk="1" fontAlgn="auto" hangingPunct="1">
+              <a:spcBef>
+                <a:spcPts val="0"/>
+              </a:spcBef>
+              <a:spcAft>
+                <a:spcPts val="0"/>
+              </a:spcAft>
+              <a:defRPr/>
+            </a:pPr>
+            <a:endParaRPr lang="en-US" dirty="0"/>
+          </a:p>
+        </p:txBody>
+      </p:sp>
+      <p:cxnSp>
+        <p:nvCxnSpPr>
+          <p:cNvPr id="87" name="Straight Arrow Connector 86">
+            <a:extLst>
+              <a:ext uri="{FF2B5EF4-FFF2-40B4-BE49-F238E27FC236}">
+                <a16:creationId xmlns:a16="http://schemas.microsoft.com/office/drawing/2014/main" id="{1A453E03-86A2-4806-A465-0862A96D255C}"/>
+              </a:ext>
+            </a:extLst>
+          </p:cNvPr>
+          <p:cNvCxnSpPr>
+            <a:cxnSpLocks/>
+          </p:cNvCxnSpPr>
+          <p:nvPr/>
+        </p:nvCxnSpPr>
+        <p:spPr>
+          <a:xfrm flipV="1">
+            <a:off x="5019261" y="5108527"/>
+            <a:ext cx="0" cy="451062"/>
+          </a:xfrm>
+          <a:prstGeom prst="straightConnector1">
+            <a:avLst/>
+          </a:prstGeom>
+          <a:ln w="12700">
+            <a:solidFill>
+              <a:schemeClr val="tx2"/>
+            </a:solidFill>
+            <a:headEnd type="none" w="med" len="sm"/>
+            <a:tailEnd type="arrow" w="med" len="sm"/>
+          </a:ln>
+        </p:spPr>
+        <p:style>
+          <a:lnRef idx="1">
+            <a:schemeClr val="accent1"/>
+          </a:lnRef>
+          <a:fillRef idx="0">
+            <a:schemeClr val="accent1"/>
+          </a:fillRef>
+          <a:effectRef idx="0">
+            <a:schemeClr val="accent1"/>
+          </a:effectRef>
+          <a:fontRef idx="minor">
+            <a:schemeClr val="tx1"/>
+          </a:fontRef>
+        </p:style>
+      </p:cxnSp>
+    </p:spTree>
+    <p:extLst>
+      <p:ext uri="{BB962C8B-B14F-4D97-AF65-F5344CB8AC3E}">
+        <p14:creationId xmlns:p14="http://schemas.microsoft.com/office/powerpoint/2010/main" val="1783241675"/>
+      </p:ext>
+    </p:extLst>
+  </p:cSld>
+  <p:clrMapOvr>
+    <a:masterClrMapping/>
+  </p:clrMapOvr>
+</p:sld>
+</file>
+
+<file path=ppt/slides/slide2.xml><?xml version="1.0" encoding="utf-8"?>
+<p:sld xmlns:a="http://schemas.openxmlformats.org/drawingml/2006/main" xmlns:r="http://schemas.openxmlformats.org/officeDocument/2006/relationships" xmlns:p="http://schemas.openxmlformats.org/presentationml/2006/main">
+  <p:cSld>
+    <p:spTree>
+      <p:nvGrpSpPr>
+        <p:cNvPr id="1" name=""/>
+        <p:cNvGrpSpPr/>
+        <p:nvPr/>
+      </p:nvGrpSpPr>
+      <p:grpSpPr>
+        <a:xfrm>
+          <a:off x="0" y="0"/>
+          <a:ext cx="0" cy="0"/>
+          <a:chOff x="0" y="0"/>
+          <a:chExt cx="0" cy="0"/>
+        </a:xfrm>
+      </p:grpSpPr>
+      <p:sp>
+        <p:nvSpPr>
+          <p:cNvPr id="30" name="Rectangle 29">
+            <a:extLst>
+              <a:ext uri="{FF2B5EF4-FFF2-40B4-BE49-F238E27FC236}">
+                <a16:creationId xmlns:a16="http://schemas.microsoft.com/office/drawing/2014/main" id="{C773603B-5798-7D4A-B1E4-2072ADA8AD70}"/>
+              </a:ext>
+            </a:extLst>
+          </p:cNvPr>
+          <p:cNvSpPr/>
+          <p:nvPr/>
+        </p:nvSpPr>
+        <p:spPr>
+          <a:xfrm>
+            <a:off x="4507005" y="1355882"/>
+            <a:ext cx="2474928" cy="2065388"/>
+          </a:xfrm>
+          <a:prstGeom prst="rect">
+            <a:avLst/>
+          </a:prstGeom>
+          <a:solidFill>
+            <a:srgbClr val="1D8900">
+              <a:alpha val="9804"/>
+            </a:srgbClr>
+          </a:solidFill>
+          <a:ln w="12700">
+            <a:solidFill>
+              <a:srgbClr val="1E8900"/>
+            </a:solidFill>
+            <a:prstDash val="solid"/>
+          </a:ln>
+        </p:spPr>
+        <p:style>
+          <a:lnRef idx="2">
+            <a:schemeClr val="accent1">
+              <a:shade val="50000"/>
+            </a:schemeClr>
+          </a:lnRef>
+          <a:fillRef idx="1">
+            <a:schemeClr val="accent1"/>
+          </a:fillRef>
+          <a:effectRef idx="0">
+            <a:schemeClr val="accent1"/>
+          </a:effectRef>
+          <a:fontRef idx="minor">
+            <a:schemeClr val="lt1"/>
+          </a:fontRef>
+        </p:style>
+        <p:txBody>
+          <a:bodyPr rot="0" spcFirstLastPara="0" vertOverflow="overflow" horzOverflow="overflow" vert="horz" wrap="square" lIns="338328" tIns="45720" rIns="91440" bIns="45720" numCol="1" spcCol="0" rtlCol="0" fromWordArt="0" anchor="t" anchorCtr="0" forceAA="0" compatLnSpc="1">
+            <a:prstTxWarp prst="textNoShape">
+              <a:avLst/>
+            </a:prstTxWarp>
+            <a:noAutofit/>
+          </a:bodyPr>
+          <a:lstStyle/>
+          <a:p>
+            <a:pPr algn="l"/>
+            <a:r>
+              <a:rPr lang="en-US" sz="1200" dirty="0">
+                <a:solidFill>
+                  <a:srgbClr val="1E8900"/>
+                </a:solidFill>
+              </a:rPr>
+              <a:t>Public subnet</a:t>
+            </a:r>
+          </a:p>
+        </p:txBody>
+      </p:sp>
+      <p:pic>
+        <p:nvPicPr>
+          <p:cNvPr id="37" name="Graphic 36">
+            <a:extLst>
+              <a:ext uri="{FF2B5EF4-FFF2-40B4-BE49-F238E27FC236}">
+                <a16:creationId xmlns:a16="http://schemas.microsoft.com/office/drawing/2014/main" id="{756BA681-A93E-434D-B654-6440C1188B57}"/>
+              </a:ext>
+            </a:extLst>
+          </p:cNvPr>
+          <p:cNvPicPr>
+            <a:picLocks noChangeAspect="1"/>
+          </p:cNvPicPr>
+          <p:nvPr/>
+        </p:nvPicPr>
+        <p:blipFill>
+          <a:blip r:embed="rId2">
+            <a:extLst>
+              <a:ext uri="{BEBA8EAE-BF5A-486C-A8C5-ECC9F3942E4B}">
+                <a14:imgProps xmlns:a14="http://schemas.microsoft.com/office/drawing/2010/main">
+                  <a14:imgLayer r:embed="rId3">
+                    <a14:imgEffect>
+                      <a14:artisticBlur/>
+                    </a14:imgEffect>
+                  </a14:imgLayer>
+                </a14:imgProps>
+              </a:ext>
+            </a:extLst>
+          </a:blip>
+          <a:stretch>
+            <a:fillRect/>
+          </a:stretch>
+        </p:blipFill>
+        <p:spPr>
+          <a:xfrm>
+            <a:off x="5526898" y="2313355"/>
+            <a:ext cx="469900" cy="469900"/>
+          </a:xfrm>
+          <a:prstGeom prst="rect">
+            <a:avLst/>
+          </a:prstGeom>
+          <a:effectLst>
+            <a:softEdge rad="0"/>
+          </a:effectLst>
+        </p:spPr>
+      </p:pic>
+      <p:sp>
+        <p:nvSpPr>
+          <p:cNvPr id="40" name="TextBox 39">
+            <a:extLst>
+              <a:ext uri="{FF2B5EF4-FFF2-40B4-BE49-F238E27FC236}">
+                <a16:creationId xmlns:a16="http://schemas.microsoft.com/office/drawing/2014/main" id="{4394DFF6-5686-E64D-849D-B0B9A63801B0}"/>
+              </a:ext>
+            </a:extLst>
+          </p:cNvPr>
+          <p:cNvSpPr txBox="1"/>
+          <p:nvPr/>
+        </p:nvSpPr>
+        <p:spPr>
+          <a:xfrm>
+            <a:off x="5275295" y="2772137"/>
+            <a:ext cx="973105" cy="276999"/>
+          </a:xfrm>
+          <a:prstGeom prst="rect">
+            <a:avLst/>
+          </a:prstGeom>
+          <a:noFill/>
+        </p:spPr>
+        <p:txBody>
+          <a:bodyPr wrap="square" rtlCol="0">
+            <a:spAutoFit/>
+          </a:bodyPr>
+          <a:lstStyle/>
+          <a:p>
+            <a:pPr algn="ctr"/>
+            <a:r>
+              <a:rPr lang="en-US" sz="1200" dirty="0"/>
+              <a:t>RDGW</a:t>
+            </a:r>
+          </a:p>
+        </p:txBody>
+      </p:sp>
+      <p:sp>
+        <p:nvSpPr>
+          <p:cNvPr id="10" name="Rectangle 9">
+            <a:extLst>
+              <a:ext uri="{FF2B5EF4-FFF2-40B4-BE49-F238E27FC236}">
+                <a16:creationId xmlns:a16="http://schemas.microsoft.com/office/drawing/2014/main" id="{97470CE0-BF03-6A48-90D5-E9FD99948C96}"/>
+              </a:ext>
+            </a:extLst>
+          </p:cNvPr>
+          <p:cNvSpPr/>
+          <p:nvPr/>
+        </p:nvSpPr>
+        <p:spPr>
+          <a:xfrm>
+            <a:off x="711488" y="1346092"/>
+            <a:ext cx="2474928" cy="2065388"/>
+          </a:xfrm>
+          <a:prstGeom prst="rect">
+            <a:avLst/>
+          </a:prstGeom>
+          <a:solidFill>
+            <a:srgbClr val="1D8900">
+              <a:alpha val="9804"/>
+            </a:srgbClr>
+          </a:solidFill>
+          <a:ln w="12700">
+            <a:solidFill>
+              <a:srgbClr val="1E8900"/>
+            </a:solidFill>
+            <a:prstDash val="solid"/>
+          </a:ln>
+        </p:spPr>
+        <p:style>
+          <a:lnRef idx="2">
+            <a:schemeClr val="accent1">
+              <a:shade val="50000"/>
+            </a:schemeClr>
+          </a:lnRef>
+          <a:fillRef idx="1">
+            <a:schemeClr val="accent1"/>
+          </a:fillRef>
+          <a:effectRef idx="0">
+            <a:schemeClr val="accent1"/>
+          </a:effectRef>
+          <a:fontRef idx="minor">
+            <a:schemeClr val="lt1"/>
+          </a:fontRef>
+        </p:style>
+        <p:txBody>
+          <a:bodyPr rot="0" spcFirstLastPara="0" vertOverflow="overflow" horzOverflow="overflow" vert="horz" wrap="square" lIns="338328" tIns="45720" rIns="91440" bIns="45720" numCol="1" spcCol="0" rtlCol="0" fromWordArt="0" anchor="t" anchorCtr="0" forceAA="0" compatLnSpc="1">
+            <a:prstTxWarp prst="textNoShape">
+              <a:avLst/>
+            </a:prstTxWarp>
+            <a:noAutofit/>
+          </a:bodyPr>
+          <a:lstStyle/>
+          <a:p>
+            <a:pPr algn="l"/>
+            <a:r>
+              <a:rPr lang="en-US" sz="1200" dirty="0">
+                <a:solidFill>
+                  <a:srgbClr val="1E8900"/>
+                </a:solidFill>
+              </a:rPr>
+              <a:t>Public subnet</a:t>
+            </a:r>
+          </a:p>
+        </p:txBody>
+      </p:sp>
+      <p:sp>
+        <p:nvSpPr>
+          <p:cNvPr id="2" name="Rectangle 1">
+            <a:extLst>
+              <a:ext uri="{FF2B5EF4-FFF2-40B4-BE49-F238E27FC236}">
+                <a16:creationId xmlns:a16="http://schemas.microsoft.com/office/drawing/2014/main" id="{90D38B4F-D429-7841-A9AC-908EF32195EA}"/>
+              </a:ext>
+            </a:extLst>
+          </p:cNvPr>
+          <p:cNvSpPr/>
+          <p:nvPr/>
+        </p:nvSpPr>
+        <p:spPr>
+          <a:xfrm>
+            <a:off x="371796" y="978748"/>
+            <a:ext cx="10797699" cy="5266272"/>
+          </a:xfrm>
+          <a:prstGeom prst="rect">
+            <a:avLst/>
+          </a:prstGeom>
+          <a:noFill/>
+          <a:ln w="12700">
+            <a:solidFill>
+              <a:srgbClr val="1E8900"/>
+            </a:solidFill>
+          </a:ln>
+        </p:spPr>
+        <p:style>
+          <a:lnRef idx="2">
+            <a:schemeClr val="accent1">
+              <a:shade val="50000"/>
+            </a:schemeClr>
+          </a:lnRef>
+          <a:fillRef idx="1">
+            <a:schemeClr val="accent1"/>
+          </a:fillRef>
+          <a:effectRef idx="0">
+            <a:schemeClr val="accent1"/>
+          </a:effectRef>
+          <a:fontRef idx="minor">
+            <a:schemeClr val="lt1"/>
+          </a:fontRef>
+        </p:style>
+        <p:txBody>
+          <a:bodyPr rot="0" spcFirstLastPara="0" vertOverflow="overflow" horzOverflow="overflow" vert="horz" wrap="square" lIns="457200" tIns="91440" rIns="91440" bIns="45720" numCol="1" spcCol="0" rtlCol="0" fromWordArt="0" anchor="t" anchorCtr="0" forceAA="0" compatLnSpc="1">
+            <a:prstTxWarp prst="textNoShape">
+              <a:avLst/>
+            </a:prstTxWarp>
+            <a:noAutofit/>
+          </a:bodyPr>
+          <a:lstStyle/>
+          <a:p>
+            <a:pPr algn="l"/>
+            <a:r>
+              <a:rPr lang="en-US" sz="1200" dirty="0">
+                <a:ln w="0"/>
+                <a:solidFill>
+                  <a:srgbClr val="1E8900"/>
+                </a:solidFill>
+              </a:rPr>
+              <a:t>VPC</a:t>
+            </a:r>
+          </a:p>
+        </p:txBody>
+      </p:sp>
+      <p:sp>
+        <p:nvSpPr>
+          <p:cNvPr id="3" name="Rectangle 2">
+            <a:extLst>
+              <a:ext uri="{FF2B5EF4-FFF2-40B4-BE49-F238E27FC236}">
+                <a16:creationId xmlns:a16="http://schemas.microsoft.com/office/drawing/2014/main" id="{C2F65D24-7DB6-A147-BECA-9EA935B27F20}"/>
+              </a:ext>
+            </a:extLst>
+          </p:cNvPr>
+          <p:cNvSpPr/>
+          <p:nvPr/>
+        </p:nvSpPr>
+        <p:spPr>
+          <a:xfrm>
+            <a:off x="715191" y="3562085"/>
+            <a:ext cx="2470969" cy="2564948"/>
+          </a:xfrm>
+          <a:prstGeom prst="rect">
+            <a:avLst/>
+          </a:prstGeom>
+          <a:solidFill>
+            <a:srgbClr val="007CBC">
+              <a:alpha val="9804"/>
+            </a:srgbClr>
+          </a:solidFill>
+          <a:ln w="12700">
+            <a:solidFill>
+              <a:srgbClr val="007DBC"/>
+            </a:solidFill>
+            <a:prstDash val="solid"/>
+          </a:ln>
+        </p:spPr>
+        <p:style>
+          <a:lnRef idx="2">
+            <a:schemeClr val="accent1">
+              <a:shade val="50000"/>
+            </a:schemeClr>
+          </a:lnRef>
+          <a:fillRef idx="1">
+            <a:schemeClr val="accent1"/>
+          </a:fillRef>
+          <a:effectRef idx="0">
+            <a:schemeClr val="accent1"/>
+          </a:effectRef>
+          <a:fontRef idx="minor">
+            <a:schemeClr val="lt1"/>
+          </a:fontRef>
+        </p:style>
+        <p:txBody>
+          <a:bodyPr rot="0" spcFirstLastPara="0" vertOverflow="overflow" horzOverflow="overflow" vert="horz" wrap="square" lIns="338328" tIns="45720" rIns="91440" bIns="45720" numCol="1" spcCol="0" rtlCol="0" fromWordArt="0" anchor="t" anchorCtr="0" forceAA="0" compatLnSpc="1">
+            <a:prstTxWarp prst="textNoShape">
+              <a:avLst/>
+            </a:prstTxWarp>
+            <a:noAutofit/>
+          </a:bodyPr>
+          <a:lstStyle/>
+          <a:p>
+            <a:pPr algn="l"/>
+            <a:r>
+              <a:rPr lang="en-US" sz="1200" dirty="0">
+                <a:solidFill>
+                  <a:srgbClr val="007DBC"/>
+                </a:solidFill>
+              </a:rPr>
+              <a:t>Private subnet</a:t>
+            </a:r>
+          </a:p>
+        </p:txBody>
+      </p:sp>
+      <p:sp>
+        <p:nvSpPr>
+          <p:cNvPr id="4" name="Rectangle 3">
+            <a:extLst>
+              <a:ext uri="{FF2B5EF4-FFF2-40B4-BE49-F238E27FC236}">
+                <a16:creationId xmlns:a16="http://schemas.microsoft.com/office/drawing/2014/main" id="{A89417FC-56D4-E941-8CC3-E9F8FACFB63F}"/>
+              </a:ext>
+            </a:extLst>
+          </p:cNvPr>
+          <p:cNvSpPr/>
+          <p:nvPr/>
+        </p:nvSpPr>
+        <p:spPr>
+          <a:xfrm>
+            <a:off x="184009" y="172372"/>
+            <a:ext cx="11833819" cy="6474233"/>
+          </a:xfrm>
+          <a:prstGeom prst="rect">
+            <a:avLst/>
+          </a:prstGeom>
+          <a:noFill/>
+          <a:ln w="12700">
+            <a:solidFill>
+              <a:schemeClr val="tx1"/>
+            </a:solidFill>
+          </a:ln>
+        </p:spPr>
+        <p:style>
+          <a:lnRef idx="2">
+            <a:schemeClr val="accent1">
+              <a:shade val="50000"/>
+            </a:schemeClr>
+          </a:lnRef>
+          <a:fillRef idx="1">
+            <a:schemeClr val="accent1"/>
+          </a:fillRef>
+          <a:effectRef idx="0">
+            <a:schemeClr val="accent1"/>
+          </a:effectRef>
+          <a:fontRef idx="minor">
+            <a:schemeClr val="lt1"/>
+          </a:fontRef>
+        </p:style>
+        <p:txBody>
+          <a:bodyPr rot="0" spcFirstLastPara="0" vertOverflow="overflow" horzOverflow="overflow" vert="horz" wrap="square" lIns="457200" tIns="91440" rIns="91440" bIns="45720" numCol="1" spcCol="0" rtlCol="0" fromWordArt="0" anchor="t" anchorCtr="0" forceAA="0" compatLnSpc="1">
+            <a:prstTxWarp prst="textNoShape">
+              <a:avLst/>
+            </a:prstTxWarp>
+            <a:noAutofit/>
+          </a:bodyPr>
+          <a:lstStyle/>
+          <a:p>
+            <a:pPr algn="l"/>
+            <a:r>
+              <a:rPr lang="en-US" sz="1200" dirty="0">
+                <a:solidFill>
+                  <a:sysClr val="windowText" lastClr="000000"/>
+                </a:solidFill>
+              </a:rPr>
+              <a:t>AWS Cloud</a:t>
+            </a:r>
+          </a:p>
+        </p:txBody>
+      </p:sp>
+      <p:sp>
+        <p:nvSpPr>
+          <p:cNvPr id="5" name="Rectangle 4">
+            <a:extLst>
+              <a:ext uri="{FF2B5EF4-FFF2-40B4-BE49-F238E27FC236}">
+                <a16:creationId xmlns:a16="http://schemas.microsoft.com/office/drawing/2014/main" id="{36F59100-3334-F144-A4DB-28B6FDAB4FFC}"/>
+              </a:ext>
+            </a:extLst>
+          </p:cNvPr>
+          <p:cNvSpPr/>
+          <p:nvPr/>
+        </p:nvSpPr>
+        <p:spPr>
+          <a:xfrm>
+            <a:off x="560063" y="619972"/>
+            <a:ext cx="2782099" cy="5849653"/>
+          </a:xfrm>
+          <a:prstGeom prst="rect">
+            <a:avLst/>
+          </a:prstGeom>
+          <a:noFill/>
+          <a:ln w="12700">
+            <a:solidFill>
+              <a:srgbClr val="007DBC"/>
+            </a:solidFill>
+            <a:prstDash val="dash"/>
+          </a:ln>
+        </p:spPr>
+        <p:style>
+          <a:lnRef idx="2">
+            <a:schemeClr val="accent1">
+              <a:shade val="50000"/>
+            </a:schemeClr>
+          </a:lnRef>
+          <a:fillRef idx="1">
+            <a:schemeClr val="accent1"/>
+          </a:fillRef>
+          <a:effectRef idx="0">
+            <a:schemeClr val="accent1"/>
+          </a:effectRef>
+          <a:fontRef idx="minor">
+            <a:schemeClr val="lt1"/>
+          </a:fontRef>
+        </p:style>
+        <p:txBody>
+          <a:bodyPr rot="0" spcFirstLastPara="0" vertOverflow="overflow" horzOverflow="overflow" vert="horz" wrap="square" lIns="91440" tIns="91440" rIns="91440" bIns="45720" numCol="1" spcCol="0" rtlCol="0" fromWordArt="0" anchor="t" anchorCtr="0" forceAA="0" compatLnSpc="1">
+            <a:prstTxWarp prst="textNoShape">
+              <a:avLst/>
+            </a:prstTxWarp>
+            <a:noAutofit/>
+          </a:bodyPr>
+          <a:lstStyle/>
+          <a:p>
+            <a:pPr algn="ctr"/>
+            <a:r>
+              <a:rPr lang="en-US" sz="1200" dirty="0">
+                <a:solidFill>
+                  <a:srgbClr val="007DBC"/>
+                </a:solidFill>
+              </a:rPr>
+              <a:t>Availability Zone 1</a:t>
+            </a:r>
+          </a:p>
+        </p:txBody>
+      </p:sp>
+      <p:pic>
+        <p:nvPicPr>
+          <p:cNvPr id="7" name="Graphic 6">
+            <a:extLst>
+              <a:ext uri="{FF2B5EF4-FFF2-40B4-BE49-F238E27FC236}">
+                <a16:creationId xmlns:a16="http://schemas.microsoft.com/office/drawing/2014/main" id="{F87736BC-EF01-454C-A88E-546607A59719}"/>
+              </a:ext>
+            </a:extLst>
+          </p:cNvPr>
+          <p:cNvPicPr>
+            <a:picLocks noChangeAspect="1"/>
+          </p:cNvPicPr>
+          <p:nvPr/>
+        </p:nvPicPr>
+        <p:blipFill>
+          <a:blip r:embed="rId4">
+            <a:extLst>
+              <a:ext uri="{96DAC541-7B7A-43D3-8B79-37D633B846F1}">
+                <asvg:svgBlip xmlns:asvg="http://schemas.microsoft.com/office/drawing/2016/SVG/main" r:embed="rId5"/>
+              </a:ext>
+            </a:extLst>
+          </a:blip>
+          <a:stretch>
+            <a:fillRect/>
+          </a:stretch>
+        </p:blipFill>
+        <p:spPr>
+          <a:xfrm>
+            <a:off x="3713193" y="1999794"/>
+            <a:ext cx="330200" cy="330200"/>
+          </a:xfrm>
+          <a:prstGeom prst="rect">
+            <a:avLst/>
+          </a:prstGeom>
+        </p:spPr>
+      </p:pic>
+      <p:pic>
+        <p:nvPicPr>
+          <p:cNvPr id="8" name="Graphic 7">
+            <a:extLst>
+              <a:ext uri="{FF2B5EF4-FFF2-40B4-BE49-F238E27FC236}">
+                <a16:creationId xmlns:a16="http://schemas.microsoft.com/office/drawing/2014/main" id="{8C52EDEC-608A-7244-9C8E-3B1D5D0558B6}"/>
+              </a:ext>
+            </a:extLst>
+          </p:cNvPr>
+          <p:cNvPicPr>
+            <a:picLocks noChangeAspect="1"/>
+          </p:cNvPicPr>
+          <p:nvPr/>
+        </p:nvPicPr>
+        <p:blipFill>
+          <a:blip r:embed="rId6">
+            <a:extLst>
+              <a:ext uri="{96DAC541-7B7A-43D3-8B79-37D633B846F1}">
+                <asvg:svgBlip xmlns:asvg="http://schemas.microsoft.com/office/drawing/2016/SVG/main" r:embed="rId7"/>
+              </a:ext>
+            </a:extLst>
+          </a:blip>
+          <a:stretch>
+            <a:fillRect/>
+          </a:stretch>
+        </p:blipFill>
+        <p:spPr>
+          <a:xfrm>
+            <a:off x="184011" y="172373"/>
+            <a:ext cx="330200" cy="330200"/>
+          </a:xfrm>
+          <a:prstGeom prst="rect">
+            <a:avLst/>
+          </a:prstGeom>
+        </p:spPr>
+      </p:pic>
+      <p:pic>
+        <p:nvPicPr>
+          <p:cNvPr id="9" name="Graphic 8">
+            <a:extLst>
+              <a:ext uri="{FF2B5EF4-FFF2-40B4-BE49-F238E27FC236}">
+                <a16:creationId xmlns:a16="http://schemas.microsoft.com/office/drawing/2014/main" id="{011BCAE1-B92B-7840-9563-921CE65285D8}"/>
+              </a:ext>
+            </a:extLst>
+          </p:cNvPr>
+          <p:cNvPicPr>
+            <a:picLocks noChangeAspect="1"/>
+          </p:cNvPicPr>
+          <p:nvPr/>
+        </p:nvPicPr>
+        <p:blipFill>
+          <a:blip r:embed="rId8">
+            <a:extLst>
+              <a:ext uri="{96DAC541-7B7A-43D3-8B79-37D633B846F1}">
+                <asvg:svgBlip xmlns:asvg="http://schemas.microsoft.com/office/drawing/2016/SVG/main" r:embed="rId9"/>
+              </a:ext>
+            </a:extLst>
+          </a:blip>
+          <a:stretch>
+            <a:fillRect/>
+          </a:stretch>
+        </p:blipFill>
+        <p:spPr>
+          <a:xfrm>
+            <a:off x="371796" y="980233"/>
+            <a:ext cx="330200" cy="330200"/>
+          </a:xfrm>
+          <a:prstGeom prst="rect">
+            <a:avLst/>
+          </a:prstGeom>
+        </p:spPr>
+      </p:pic>
+      <p:pic>
+        <p:nvPicPr>
+          <p:cNvPr id="11" name="Graphic 10">
+            <a:extLst>
+              <a:ext uri="{FF2B5EF4-FFF2-40B4-BE49-F238E27FC236}">
+                <a16:creationId xmlns:a16="http://schemas.microsoft.com/office/drawing/2014/main" id="{A27495A7-D781-034C-BC9D-AE77455948A6}"/>
+              </a:ext>
+            </a:extLst>
+          </p:cNvPr>
+          <p:cNvPicPr>
+            <a:picLocks noChangeAspect="1"/>
+          </p:cNvPicPr>
+          <p:nvPr/>
+        </p:nvPicPr>
+        <p:blipFill>
+          <a:blip r:embed="rId10">
+            <a:extLst>
+              <a:ext uri="{96DAC541-7B7A-43D3-8B79-37D633B846F1}">
+                <asvg:svgBlip xmlns:asvg="http://schemas.microsoft.com/office/drawing/2016/SVG/main" r:embed="rId11"/>
+              </a:ext>
+            </a:extLst>
+          </a:blip>
+          <a:stretch>
+            <a:fillRect/>
+          </a:stretch>
+        </p:blipFill>
+        <p:spPr>
+          <a:xfrm>
+            <a:off x="711488" y="1343733"/>
+            <a:ext cx="274320" cy="274320"/>
+          </a:xfrm>
+          <a:prstGeom prst="rect">
+            <a:avLst/>
+          </a:prstGeom>
+        </p:spPr>
+      </p:pic>
+      <p:pic>
+        <p:nvPicPr>
+          <p:cNvPr id="12" name="Graphic 11">
+            <a:extLst>
+              <a:ext uri="{FF2B5EF4-FFF2-40B4-BE49-F238E27FC236}">
+                <a16:creationId xmlns:a16="http://schemas.microsoft.com/office/drawing/2014/main" id="{6DF2F2BD-5D9A-8046-A860-3517B0AB2957}"/>
+              </a:ext>
+            </a:extLst>
+          </p:cNvPr>
+          <p:cNvPicPr>
+            <a:picLocks noChangeAspect="1"/>
+          </p:cNvPicPr>
+          <p:nvPr/>
+        </p:nvPicPr>
+        <p:blipFill>
+          <a:blip r:embed="rId12">
+            <a:extLst>
+              <a:ext uri="{96DAC541-7B7A-43D3-8B79-37D633B846F1}">
+                <asvg:svgBlip xmlns:asvg="http://schemas.microsoft.com/office/drawing/2016/SVG/main" r:embed="rId13"/>
+              </a:ext>
+            </a:extLst>
+          </a:blip>
+          <a:stretch>
+            <a:fillRect/>
+          </a:stretch>
+        </p:blipFill>
+        <p:spPr>
+          <a:xfrm>
+            <a:off x="715192" y="3571820"/>
+            <a:ext cx="274320" cy="274320"/>
+          </a:xfrm>
+          <a:prstGeom prst="rect">
+            <a:avLst/>
+          </a:prstGeom>
+        </p:spPr>
+      </p:pic>
+      <p:sp>
+        <p:nvSpPr>
+          <p:cNvPr id="13" name="TextBox 12">
+            <a:extLst>
+              <a:ext uri="{FF2B5EF4-FFF2-40B4-BE49-F238E27FC236}">
+                <a16:creationId xmlns:a16="http://schemas.microsoft.com/office/drawing/2014/main" id="{D4EA7CF5-5EB1-1445-865B-A3E5D58F02AD}"/>
+              </a:ext>
+            </a:extLst>
+          </p:cNvPr>
+          <p:cNvSpPr txBox="1"/>
+          <p:nvPr/>
+        </p:nvSpPr>
+        <p:spPr>
+          <a:xfrm>
+            <a:off x="2318611" y="1439094"/>
+            <a:ext cx="725107" cy="461665"/>
+          </a:xfrm>
+          <a:prstGeom prst="rect">
+            <a:avLst/>
+          </a:prstGeom>
+          <a:noFill/>
+        </p:spPr>
+        <p:txBody>
+          <a:bodyPr wrap="square" rtlCol="0">
+            <a:spAutoFit/>
+          </a:bodyPr>
+          <a:lstStyle/>
+          <a:p>
+            <a:pPr algn="ctr"/>
+            <a:r>
+              <a:rPr lang="en-US" sz="1200" dirty="0"/>
+              <a:t>NAT gateway</a:t>
+            </a:r>
+          </a:p>
+        </p:txBody>
+      </p:sp>
+      <p:pic>
+        <p:nvPicPr>
+          <p:cNvPr id="14" name="Graphic 13">
+            <a:extLst>
+              <a:ext uri="{FF2B5EF4-FFF2-40B4-BE49-F238E27FC236}">
+                <a16:creationId xmlns:a16="http://schemas.microsoft.com/office/drawing/2014/main" id="{6027A170-9F7D-154D-9BDC-7C83139E50CF}"/>
+              </a:ext>
+            </a:extLst>
+          </p:cNvPr>
+          <p:cNvPicPr>
+            <a:picLocks noChangeAspect="1"/>
+          </p:cNvPicPr>
+          <p:nvPr/>
+        </p:nvPicPr>
+        <p:blipFill>
+          <a:blip r:embed="rId14">
+            <a:extLst>
+              <a:ext uri="{96DAC541-7B7A-43D3-8B79-37D633B846F1}">
+                <asvg:svgBlip xmlns:asvg="http://schemas.microsoft.com/office/drawing/2016/SVG/main" r:embed="rId15"/>
+              </a:ext>
+            </a:extLst>
+          </a:blip>
+          <a:stretch>
+            <a:fillRect/>
+          </a:stretch>
+        </p:blipFill>
+        <p:spPr>
+          <a:xfrm>
+            <a:off x="1970745" y="1393677"/>
+            <a:ext cx="469900" cy="469900"/>
+          </a:xfrm>
+          <a:prstGeom prst="rect">
+            <a:avLst/>
+          </a:prstGeom>
+        </p:spPr>
+      </p:pic>
+      <p:pic>
+        <p:nvPicPr>
+          <p:cNvPr id="15" name="Graphic 14">
+            <a:extLst>
+              <a:ext uri="{FF2B5EF4-FFF2-40B4-BE49-F238E27FC236}">
+                <a16:creationId xmlns:a16="http://schemas.microsoft.com/office/drawing/2014/main" id="{C286F45A-451D-824E-ACAD-79A90C040B73}"/>
+              </a:ext>
+            </a:extLst>
+          </p:cNvPr>
+          <p:cNvPicPr>
+            <a:picLocks noChangeAspect="1"/>
+          </p:cNvPicPr>
+          <p:nvPr/>
+        </p:nvPicPr>
+        <p:blipFill>
+          <a:blip r:embed="rId16">
+            <a:extLst>
+              <a:ext uri="{96DAC541-7B7A-43D3-8B79-37D633B846F1}">
+                <asvg:svgBlip xmlns:asvg="http://schemas.microsoft.com/office/drawing/2016/SVG/main" r:embed="rId17"/>
+              </a:ext>
+            </a:extLst>
+          </a:blip>
+          <a:stretch>
+            <a:fillRect/>
+          </a:stretch>
+        </p:blipFill>
+        <p:spPr>
+          <a:xfrm>
+            <a:off x="2244553" y="2264079"/>
+            <a:ext cx="469900" cy="469900"/>
+          </a:xfrm>
+          <a:prstGeom prst="rect">
+            <a:avLst/>
+          </a:prstGeom>
+        </p:spPr>
+      </p:pic>
+      <p:sp>
+        <p:nvSpPr>
+          <p:cNvPr id="18" name="TextBox 17">
+            <a:extLst>
+              <a:ext uri="{FF2B5EF4-FFF2-40B4-BE49-F238E27FC236}">
+                <a16:creationId xmlns:a16="http://schemas.microsoft.com/office/drawing/2014/main" id="{E86B4EF8-8467-EA40-B547-0B08490E5C82}"/>
+              </a:ext>
+            </a:extLst>
+          </p:cNvPr>
+          <p:cNvSpPr txBox="1"/>
+          <p:nvPr/>
+        </p:nvSpPr>
+        <p:spPr>
+          <a:xfrm>
+            <a:off x="1992950" y="2722861"/>
+            <a:ext cx="973105" cy="276999"/>
+          </a:xfrm>
+          <a:prstGeom prst="rect">
+            <a:avLst/>
+          </a:prstGeom>
+          <a:noFill/>
+        </p:spPr>
+        <p:txBody>
+          <a:bodyPr wrap="square" rtlCol="0">
+            <a:spAutoFit/>
+          </a:bodyPr>
+          <a:lstStyle/>
+          <a:p>
+            <a:pPr algn="ctr"/>
+            <a:r>
+              <a:rPr lang="en-US" sz="1200" dirty="0"/>
+              <a:t>RDGW</a:t>
+            </a:r>
+          </a:p>
+        </p:txBody>
+      </p:sp>
+      <p:sp>
+        <p:nvSpPr>
+          <p:cNvPr id="31" name="Rectangle 30">
+            <a:extLst>
+              <a:ext uri="{FF2B5EF4-FFF2-40B4-BE49-F238E27FC236}">
+                <a16:creationId xmlns:a16="http://schemas.microsoft.com/office/drawing/2014/main" id="{C9AB2DA7-DA00-5D4A-9698-2A7EF6E082FE}"/>
+              </a:ext>
+            </a:extLst>
+          </p:cNvPr>
+          <p:cNvSpPr/>
+          <p:nvPr/>
+        </p:nvSpPr>
+        <p:spPr>
+          <a:xfrm>
+            <a:off x="4510708" y="3571875"/>
+            <a:ext cx="2470969" cy="2564948"/>
+          </a:xfrm>
+          <a:prstGeom prst="rect">
+            <a:avLst/>
+          </a:prstGeom>
+          <a:solidFill>
+            <a:srgbClr val="007CBC">
+              <a:alpha val="9804"/>
+            </a:srgbClr>
+          </a:solidFill>
+          <a:ln w="12700">
+            <a:solidFill>
+              <a:srgbClr val="007DBC"/>
+            </a:solidFill>
+            <a:prstDash val="solid"/>
+          </a:ln>
+        </p:spPr>
+        <p:style>
+          <a:lnRef idx="2">
+            <a:schemeClr val="accent1">
+              <a:shade val="50000"/>
+            </a:schemeClr>
+          </a:lnRef>
+          <a:fillRef idx="1">
+            <a:schemeClr val="accent1"/>
+          </a:fillRef>
+          <a:effectRef idx="0">
+            <a:schemeClr val="accent1"/>
+          </a:effectRef>
+          <a:fontRef idx="minor">
+            <a:schemeClr val="lt1"/>
+          </a:fontRef>
+        </p:style>
+        <p:txBody>
+          <a:bodyPr rot="0" spcFirstLastPara="0" vertOverflow="overflow" horzOverflow="overflow" vert="horz" wrap="square" lIns="338328" tIns="45720" rIns="91440" bIns="45720" numCol="1" spcCol="0" rtlCol="0" fromWordArt="0" anchor="t" anchorCtr="0" forceAA="0" compatLnSpc="1">
+            <a:prstTxWarp prst="textNoShape">
+              <a:avLst/>
+            </a:prstTxWarp>
+            <a:noAutofit/>
+          </a:bodyPr>
+          <a:lstStyle/>
+          <a:p>
+            <a:pPr algn="l"/>
+            <a:r>
+              <a:rPr lang="en-US" sz="1200" dirty="0">
+                <a:solidFill>
+                  <a:srgbClr val="007DBC"/>
+                </a:solidFill>
+              </a:rPr>
+              <a:t>Private subnet</a:t>
+            </a:r>
+          </a:p>
+        </p:txBody>
+      </p:sp>
+      <p:sp>
+        <p:nvSpPr>
+          <p:cNvPr id="32" name="Rectangle 31">
+            <a:extLst>
+              <a:ext uri="{FF2B5EF4-FFF2-40B4-BE49-F238E27FC236}">
+                <a16:creationId xmlns:a16="http://schemas.microsoft.com/office/drawing/2014/main" id="{7096E968-AD7E-1745-89D5-3B7F86F5DD97}"/>
+              </a:ext>
+            </a:extLst>
+          </p:cNvPr>
+          <p:cNvSpPr/>
+          <p:nvPr/>
+        </p:nvSpPr>
+        <p:spPr>
+          <a:xfrm>
+            <a:off x="4355580" y="629762"/>
+            <a:ext cx="2782099" cy="5849653"/>
+          </a:xfrm>
+          <a:prstGeom prst="rect">
+            <a:avLst/>
+          </a:prstGeom>
+          <a:noFill/>
+          <a:ln w="12700">
+            <a:solidFill>
+              <a:srgbClr val="007DBC"/>
+            </a:solidFill>
+            <a:prstDash val="dash"/>
+          </a:ln>
+        </p:spPr>
+        <p:style>
+          <a:lnRef idx="2">
+            <a:schemeClr val="accent1">
+              <a:shade val="50000"/>
+            </a:schemeClr>
+          </a:lnRef>
+          <a:fillRef idx="1">
+            <a:schemeClr val="accent1"/>
+          </a:fillRef>
+          <a:effectRef idx="0">
+            <a:schemeClr val="accent1"/>
+          </a:effectRef>
+          <a:fontRef idx="minor">
+            <a:schemeClr val="lt1"/>
+          </a:fontRef>
+        </p:style>
+        <p:txBody>
+          <a:bodyPr rot="0" spcFirstLastPara="0" vertOverflow="overflow" horzOverflow="overflow" vert="horz" wrap="square" lIns="91440" tIns="91440" rIns="91440" bIns="45720" numCol="1" spcCol="0" rtlCol="0" fromWordArt="0" anchor="t" anchorCtr="0" forceAA="0" compatLnSpc="1">
+            <a:prstTxWarp prst="textNoShape">
+              <a:avLst/>
+            </a:prstTxWarp>
+            <a:noAutofit/>
+          </a:bodyPr>
+          <a:lstStyle/>
+          <a:p>
+            <a:pPr algn="ctr"/>
+            <a:r>
+              <a:rPr lang="en-US" sz="1200" dirty="0">
+                <a:solidFill>
+                  <a:srgbClr val="007DBC"/>
+                </a:solidFill>
+              </a:rPr>
+              <a:t>Availability Zone 2</a:t>
+            </a:r>
+          </a:p>
+        </p:txBody>
+      </p:sp>
+      <p:pic>
+        <p:nvPicPr>
+          <p:cNvPr id="33" name="Graphic 32">
+            <a:extLst>
+              <a:ext uri="{FF2B5EF4-FFF2-40B4-BE49-F238E27FC236}">
+                <a16:creationId xmlns:a16="http://schemas.microsoft.com/office/drawing/2014/main" id="{350585F2-7B67-FB44-A7D1-88EBE25B2918}"/>
+              </a:ext>
+            </a:extLst>
+          </p:cNvPr>
+          <p:cNvPicPr>
+            <a:picLocks noChangeAspect="1"/>
+          </p:cNvPicPr>
+          <p:nvPr/>
+        </p:nvPicPr>
+        <p:blipFill>
+          <a:blip r:embed="rId10">
+            <a:extLst>
+              <a:ext uri="{96DAC541-7B7A-43D3-8B79-37D633B846F1}">
+                <asvg:svgBlip xmlns:asvg="http://schemas.microsoft.com/office/drawing/2016/SVG/main" r:embed="rId11"/>
+              </a:ext>
+            </a:extLst>
+          </a:blip>
+          <a:stretch>
+            <a:fillRect/>
+          </a:stretch>
+        </p:blipFill>
+        <p:spPr>
+          <a:xfrm>
+            <a:off x="4507005" y="1353523"/>
+            <a:ext cx="274320" cy="274320"/>
+          </a:xfrm>
+          <a:prstGeom prst="rect">
+            <a:avLst/>
+          </a:prstGeom>
+        </p:spPr>
+      </p:pic>
+      <p:pic>
+        <p:nvPicPr>
+          <p:cNvPr id="34" name="Graphic 33">
+            <a:extLst>
+              <a:ext uri="{FF2B5EF4-FFF2-40B4-BE49-F238E27FC236}">
+                <a16:creationId xmlns:a16="http://schemas.microsoft.com/office/drawing/2014/main" id="{C776ABA9-5E64-204C-B51D-F2AB180851BE}"/>
+              </a:ext>
+            </a:extLst>
+          </p:cNvPr>
+          <p:cNvPicPr>
+            <a:picLocks noChangeAspect="1"/>
+          </p:cNvPicPr>
+          <p:nvPr/>
+        </p:nvPicPr>
+        <p:blipFill>
+          <a:blip r:embed="rId12">
+            <a:extLst>
+              <a:ext uri="{96DAC541-7B7A-43D3-8B79-37D633B846F1}">
+                <asvg:svgBlip xmlns:asvg="http://schemas.microsoft.com/office/drawing/2016/SVG/main" r:embed="rId13"/>
+              </a:ext>
+            </a:extLst>
+          </a:blip>
+          <a:stretch>
+            <a:fillRect/>
+          </a:stretch>
+        </p:blipFill>
+        <p:spPr>
+          <a:xfrm>
+            <a:off x="4510709" y="3581610"/>
+            <a:ext cx="274320" cy="274320"/>
+          </a:xfrm>
+          <a:prstGeom prst="rect">
+            <a:avLst/>
+          </a:prstGeom>
+        </p:spPr>
+      </p:pic>
+      <p:sp>
+        <p:nvSpPr>
+          <p:cNvPr id="35" name="TextBox 34">
+            <a:extLst>
+              <a:ext uri="{FF2B5EF4-FFF2-40B4-BE49-F238E27FC236}">
+                <a16:creationId xmlns:a16="http://schemas.microsoft.com/office/drawing/2014/main" id="{1CF886C8-1D5E-494C-8004-7362DA77D891}"/>
+              </a:ext>
+            </a:extLst>
+          </p:cNvPr>
+          <p:cNvSpPr txBox="1"/>
+          <p:nvPr/>
+        </p:nvSpPr>
+        <p:spPr>
+          <a:xfrm>
+            <a:off x="6130699" y="1440385"/>
+            <a:ext cx="760401" cy="461665"/>
+          </a:xfrm>
+          <a:prstGeom prst="rect">
+            <a:avLst/>
+          </a:prstGeom>
+          <a:noFill/>
+        </p:spPr>
+        <p:txBody>
+          <a:bodyPr wrap="square" rtlCol="0">
+            <a:spAutoFit/>
+          </a:bodyPr>
+          <a:lstStyle/>
+          <a:p>
+            <a:pPr algn="ctr"/>
+            <a:r>
+              <a:rPr lang="en-US" sz="1200" dirty="0"/>
+              <a:t>NAT gateway</a:t>
+            </a:r>
+          </a:p>
+        </p:txBody>
+      </p:sp>
+      <p:pic>
+        <p:nvPicPr>
+          <p:cNvPr id="36" name="Graphic 35">
+            <a:extLst>
+              <a:ext uri="{FF2B5EF4-FFF2-40B4-BE49-F238E27FC236}">
+                <a16:creationId xmlns:a16="http://schemas.microsoft.com/office/drawing/2014/main" id="{76E8F122-CFD4-394C-98DC-C6D9C4D39481}"/>
+              </a:ext>
+            </a:extLst>
+          </p:cNvPr>
+          <p:cNvPicPr>
+            <a:picLocks noChangeAspect="1"/>
+          </p:cNvPicPr>
+          <p:nvPr/>
+        </p:nvPicPr>
+        <p:blipFill>
+          <a:blip r:embed="rId14">
+            <a:extLst>
+              <a:ext uri="{96DAC541-7B7A-43D3-8B79-37D633B846F1}">
+                <asvg:svgBlip xmlns:asvg="http://schemas.microsoft.com/office/drawing/2016/SVG/main" r:embed="rId15"/>
+              </a:ext>
+            </a:extLst>
+          </a:blip>
+          <a:stretch>
+            <a:fillRect/>
+          </a:stretch>
+        </p:blipFill>
+        <p:spPr>
+          <a:xfrm>
+            <a:off x="5783111" y="1412840"/>
+            <a:ext cx="469900" cy="469900"/>
+          </a:xfrm>
+          <a:prstGeom prst="rect">
+            <a:avLst/>
+          </a:prstGeom>
+        </p:spPr>
+      </p:pic>
+      <p:sp>
+        <p:nvSpPr>
+          <p:cNvPr id="45" name="Rectangle 44">
+            <a:extLst>
+              <a:ext uri="{FF2B5EF4-FFF2-40B4-BE49-F238E27FC236}">
+                <a16:creationId xmlns:a16="http://schemas.microsoft.com/office/drawing/2014/main" id="{20690DAB-75D7-F04A-AF99-72F7BEC7812F}"/>
+              </a:ext>
+            </a:extLst>
+          </p:cNvPr>
+          <p:cNvSpPr/>
+          <p:nvPr/>
+        </p:nvSpPr>
+        <p:spPr>
+          <a:xfrm>
+            <a:off x="1849679" y="1998198"/>
+            <a:ext cx="7780688" cy="1050938"/>
+          </a:xfrm>
+          <a:prstGeom prst="rect">
+            <a:avLst/>
+          </a:prstGeom>
+          <a:noFill/>
+          <a:ln w="12700">
+            <a:solidFill>
+              <a:srgbClr val="D86613"/>
+            </a:solidFill>
+            <a:prstDash val="dash"/>
+          </a:ln>
+        </p:spPr>
+        <p:style>
+          <a:lnRef idx="2">
+            <a:schemeClr val="accent1">
+              <a:shade val="50000"/>
+            </a:schemeClr>
+          </a:lnRef>
+          <a:fillRef idx="1">
+            <a:schemeClr val="accent1"/>
+          </a:fillRef>
+          <a:effectRef idx="0">
+            <a:schemeClr val="accent1"/>
+          </a:effectRef>
+          <a:fontRef idx="minor">
+            <a:schemeClr val="lt1"/>
+          </a:fontRef>
+        </p:style>
+        <p:txBody>
+          <a:bodyPr rot="0" spcFirstLastPara="0" vertOverflow="overflow" horzOverflow="overflow" vert="horz" wrap="square" lIns="91440" tIns="91440" rIns="91440" bIns="45720" numCol="1" spcCol="0" rtlCol="0" fromWordArt="0" anchor="t" anchorCtr="0" forceAA="0" compatLnSpc="1">
+            <a:prstTxWarp prst="textNoShape">
+              <a:avLst/>
+            </a:prstTxWarp>
+            <a:noAutofit/>
+          </a:bodyPr>
+          <a:lstStyle/>
+          <a:p>
+            <a:pPr algn="ctr"/>
+            <a:r>
+              <a:rPr lang="en-US" sz="1200" dirty="0">
+                <a:solidFill>
+                  <a:srgbClr val="D86613"/>
+                </a:solidFill>
+              </a:rPr>
+              <a:t>Auto Scaling group</a:t>
+            </a:r>
+          </a:p>
+        </p:txBody>
+      </p:sp>
+      <p:sp>
+        <p:nvSpPr>
+          <p:cNvPr id="46" name="Rectangle 45">
+            <a:extLst>
+              <a:ext uri="{FF2B5EF4-FFF2-40B4-BE49-F238E27FC236}">
+                <a16:creationId xmlns:a16="http://schemas.microsoft.com/office/drawing/2014/main" id="{3D17EDEE-CE65-4447-A2E3-63BB12023B47}"/>
+              </a:ext>
+            </a:extLst>
+          </p:cNvPr>
+          <p:cNvSpPr/>
+          <p:nvPr/>
+        </p:nvSpPr>
+        <p:spPr>
+          <a:xfrm>
+            <a:off x="1849679" y="3943351"/>
+            <a:ext cx="7780688" cy="1028700"/>
+          </a:xfrm>
+          <a:prstGeom prst="rect">
+            <a:avLst/>
+          </a:prstGeom>
+          <a:noFill/>
+          <a:ln w="12700">
+            <a:solidFill>
+              <a:srgbClr val="5A6B86"/>
+            </a:solidFill>
+            <a:prstDash val="dash"/>
+          </a:ln>
+        </p:spPr>
+        <p:style>
+          <a:lnRef idx="2">
+            <a:schemeClr val="accent1">
+              <a:shade val="50000"/>
+            </a:schemeClr>
+          </a:lnRef>
+          <a:fillRef idx="1">
+            <a:schemeClr val="accent1"/>
+          </a:fillRef>
+          <a:effectRef idx="0">
+            <a:schemeClr val="accent1"/>
+          </a:effectRef>
+          <a:fontRef idx="minor">
+            <a:schemeClr val="lt1"/>
+          </a:fontRef>
+        </p:style>
+        <p:txBody>
+          <a:bodyPr rot="0" spcFirstLastPara="0" vertOverflow="overflow" horzOverflow="overflow" vert="horz" wrap="square" lIns="91440" tIns="91440" rIns="91440" bIns="45720" numCol="1" spcCol="0" rtlCol="0" fromWordArt="0" anchor="t" anchorCtr="0" forceAA="0" compatLnSpc="1">
+            <a:prstTxWarp prst="textNoShape">
+              <a:avLst/>
+            </a:prstTxWarp>
+            <a:noAutofit/>
+          </a:bodyPr>
+          <a:lstStyle/>
+          <a:p>
+            <a:pPr algn="ctr"/>
+            <a:r>
+              <a:rPr lang="en-US" sz="1200" dirty="0">
+                <a:solidFill>
+                  <a:srgbClr val="5A6B86"/>
+                </a:solidFill>
+              </a:rPr>
+              <a:t>WSFC with DataKeeper Replication</a:t>
+            </a:r>
+          </a:p>
+        </p:txBody>
+      </p:sp>
+      <p:pic>
+        <p:nvPicPr>
+          <p:cNvPr id="50" name="Graphic 49">
+            <a:extLst>
+              <a:ext uri="{FF2B5EF4-FFF2-40B4-BE49-F238E27FC236}">
+                <a16:creationId xmlns:a16="http://schemas.microsoft.com/office/drawing/2014/main" id="{10123651-17B0-2A44-8CA4-B77BD7B2FA57}"/>
+              </a:ext>
+            </a:extLst>
+          </p:cNvPr>
+          <p:cNvPicPr>
+            <a:picLocks noChangeAspect="1"/>
+          </p:cNvPicPr>
+          <p:nvPr/>
+        </p:nvPicPr>
+        <p:blipFill>
+          <a:blip r:embed="rId18">
+            <a:extLst>
+              <a:ext uri="{96DAC541-7B7A-43D3-8B79-37D633B846F1}">
+                <asvg:svgBlip xmlns:asvg="http://schemas.microsoft.com/office/drawing/2016/SVG/main" r:embed="rId19"/>
+              </a:ext>
+            </a:extLst>
+          </a:blip>
+          <a:stretch>
+            <a:fillRect/>
+          </a:stretch>
+        </p:blipFill>
+        <p:spPr>
+          <a:xfrm>
+            <a:off x="2469975" y="4296371"/>
+            <a:ext cx="573743" cy="573743"/>
+          </a:xfrm>
+          <a:prstGeom prst="rect">
+            <a:avLst/>
+          </a:prstGeom>
+        </p:spPr>
+      </p:pic>
+      <p:pic>
+        <p:nvPicPr>
+          <p:cNvPr id="51" name="Graphic 50">
+            <a:extLst>
+              <a:ext uri="{FF2B5EF4-FFF2-40B4-BE49-F238E27FC236}">
+                <a16:creationId xmlns:a16="http://schemas.microsoft.com/office/drawing/2014/main" id="{9E199607-7A71-D842-BF36-F0C99179EC26}"/>
+              </a:ext>
+            </a:extLst>
+          </p:cNvPr>
+          <p:cNvPicPr>
+            <a:picLocks noChangeAspect="1"/>
+          </p:cNvPicPr>
+          <p:nvPr/>
+        </p:nvPicPr>
+        <p:blipFill>
+          <a:blip r:embed="rId18">
+            <a:extLst>
+              <a:ext uri="{96DAC541-7B7A-43D3-8B79-37D633B846F1}">
+                <asvg:svgBlip xmlns:asvg="http://schemas.microsoft.com/office/drawing/2016/SVG/main" r:embed="rId19"/>
+              </a:ext>
+            </a:extLst>
+          </a:blip>
+          <a:stretch>
+            <a:fillRect/>
+          </a:stretch>
+        </p:blipFill>
+        <p:spPr>
+          <a:xfrm>
+            <a:off x="5380871" y="4325059"/>
+            <a:ext cx="573743" cy="573743"/>
+          </a:xfrm>
+          <a:prstGeom prst="rect">
+            <a:avLst/>
+          </a:prstGeom>
+        </p:spPr>
+      </p:pic>
+      <p:sp>
+        <p:nvSpPr>
+          <p:cNvPr id="52" name="TextBox 51">
+            <a:extLst>
+              <a:ext uri="{FF2B5EF4-FFF2-40B4-BE49-F238E27FC236}">
+                <a16:creationId xmlns:a16="http://schemas.microsoft.com/office/drawing/2014/main" id="{D1302C80-B7EB-D248-900A-0DDAF4CD099C}"/>
+              </a:ext>
+            </a:extLst>
+          </p:cNvPr>
+          <p:cNvSpPr txBox="1"/>
+          <p:nvPr/>
+        </p:nvSpPr>
+        <p:spPr>
+          <a:xfrm>
+            <a:off x="1849679" y="4326584"/>
+            <a:ext cx="674262" cy="461665"/>
+          </a:xfrm>
+          <a:prstGeom prst="rect">
+            <a:avLst/>
+          </a:prstGeom>
+          <a:noFill/>
+        </p:spPr>
+        <p:txBody>
+          <a:bodyPr wrap="square" rtlCol="0">
+            <a:spAutoFit/>
+          </a:bodyPr>
+          <a:lstStyle/>
+          <a:p>
+            <a:pPr algn="r"/>
+            <a:r>
+              <a:rPr lang="en-US" sz="1200" dirty="0"/>
+              <a:t>Primary </a:t>
+            </a:r>
+          </a:p>
+          <a:p>
+            <a:pPr algn="r"/>
+            <a:r>
+              <a:rPr lang="en-US" sz="1200" dirty="0"/>
+              <a:t>replica</a:t>
+            </a:r>
+          </a:p>
+        </p:txBody>
+      </p:sp>
+      <p:sp>
+        <p:nvSpPr>
+          <p:cNvPr id="53" name="TextBox 52">
+            <a:extLst>
+              <a:ext uri="{FF2B5EF4-FFF2-40B4-BE49-F238E27FC236}">
+                <a16:creationId xmlns:a16="http://schemas.microsoft.com/office/drawing/2014/main" id="{50219184-E6D6-5740-B4EF-30598FA614EA}"/>
+              </a:ext>
+            </a:extLst>
+          </p:cNvPr>
+          <p:cNvSpPr txBox="1"/>
+          <p:nvPr/>
+        </p:nvSpPr>
+        <p:spPr>
+          <a:xfrm>
+            <a:off x="5968611" y="4345947"/>
+            <a:ext cx="922489" cy="461665"/>
+          </a:xfrm>
+          <a:prstGeom prst="rect">
+            <a:avLst/>
+          </a:prstGeom>
+          <a:noFill/>
+        </p:spPr>
+        <p:txBody>
+          <a:bodyPr wrap="square" rtlCol="0">
+            <a:spAutoFit/>
+          </a:bodyPr>
+          <a:lstStyle/>
+          <a:p>
+            <a:r>
+              <a:rPr lang="en-US" sz="1200" dirty="0"/>
+              <a:t>Secondary </a:t>
+            </a:r>
+          </a:p>
+          <a:p>
+            <a:r>
+              <a:rPr lang="en-US" sz="1200" dirty="0"/>
+              <a:t>replica</a:t>
+            </a:r>
+          </a:p>
+        </p:txBody>
+      </p:sp>
+      <p:sp>
+        <p:nvSpPr>
+          <p:cNvPr id="39" name="Rectangle 38">
+            <a:extLst>
+              <a:ext uri="{FF2B5EF4-FFF2-40B4-BE49-F238E27FC236}">
+                <a16:creationId xmlns:a16="http://schemas.microsoft.com/office/drawing/2014/main" id="{D6FCA288-1691-2540-8A79-AEB6BC4CAB60}"/>
+              </a:ext>
+            </a:extLst>
+          </p:cNvPr>
+          <p:cNvSpPr/>
+          <p:nvPr/>
+        </p:nvSpPr>
+        <p:spPr>
+          <a:xfrm>
+            <a:off x="8278957" y="1355882"/>
+            <a:ext cx="2474928" cy="2065388"/>
+          </a:xfrm>
+          <a:prstGeom prst="rect">
+            <a:avLst/>
+          </a:prstGeom>
+          <a:solidFill>
+            <a:srgbClr val="1D8900">
+              <a:alpha val="9804"/>
+            </a:srgbClr>
+          </a:solidFill>
+          <a:ln w="12700">
+            <a:solidFill>
+              <a:srgbClr val="1E8900"/>
+            </a:solidFill>
+            <a:prstDash val="solid"/>
+          </a:ln>
+        </p:spPr>
+        <p:style>
+          <a:lnRef idx="2">
+            <a:schemeClr val="accent1">
+              <a:shade val="50000"/>
+            </a:schemeClr>
+          </a:lnRef>
+          <a:fillRef idx="1">
+            <a:schemeClr val="accent1"/>
+          </a:fillRef>
+          <a:effectRef idx="0">
+            <a:schemeClr val="accent1"/>
+          </a:effectRef>
+          <a:fontRef idx="minor">
+            <a:schemeClr val="lt1"/>
+          </a:fontRef>
+        </p:style>
+        <p:txBody>
+          <a:bodyPr rot="0" spcFirstLastPara="0" vertOverflow="overflow" horzOverflow="overflow" vert="horz" wrap="square" lIns="338328" tIns="45720" rIns="91440" bIns="45720" numCol="1" spcCol="0" rtlCol="0" fromWordArt="0" anchor="t" anchorCtr="0" forceAA="0" compatLnSpc="1">
+            <a:prstTxWarp prst="textNoShape">
+              <a:avLst/>
+            </a:prstTxWarp>
+            <a:noAutofit/>
+          </a:bodyPr>
+          <a:lstStyle/>
+          <a:p>
+            <a:pPr algn="l"/>
+            <a:r>
+              <a:rPr lang="en-US" sz="1200" dirty="0">
+                <a:solidFill>
+                  <a:srgbClr val="1E8900"/>
+                </a:solidFill>
+              </a:rPr>
+              <a:t>Public subnet</a:t>
+            </a:r>
+          </a:p>
+        </p:txBody>
+      </p:sp>
+      <p:pic>
+        <p:nvPicPr>
+          <p:cNvPr id="43" name="Graphic 36">
+            <a:extLst>
+              <a:ext uri="{FF2B5EF4-FFF2-40B4-BE49-F238E27FC236}">
+                <a16:creationId xmlns:a16="http://schemas.microsoft.com/office/drawing/2014/main" id="{C4E4C284-FAB9-4B44-9F8C-32E1EAC8F019}"/>
+              </a:ext>
+            </a:extLst>
+          </p:cNvPr>
+          <p:cNvPicPr>
+            <a:picLocks noChangeAspect="1"/>
+          </p:cNvPicPr>
+          <p:nvPr/>
+        </p:nvPicPr>
+        <p:blipFill>
+          <a:blip r:embed="rId2">
+            <a:extLst>
+              <a:ext uri="{BEBA8EAE-BF5A-486C-A8C5-ECC9F3942E4B}">
+                <a14:imgProps xmlns:a14="http://schemas.microsoft.com/office/drawing/2010/main">
+                  <a14:imgLayer r:embed="rId3">
+                    <a14:imgEffect>
+                      <a14:artisticBlur/>
+                    </a14:imgEffect>
+                  </a14:imgLayer>
+                </a14:imgProps>
+              </a:ext>
+            </a:extLst>
+          </a:blip>
+          <a:stretch>
+            <a:fillRect/>
+          </a:stretch>
+        </p:blipFill>
+        <p:spPr>
+          <a:xfrm>
+            <a:off x="8720746" y="2293965"/>
+            <a:ext cx="469900" cy="469900"/>
+          </a:xfrm>
+          <a:prstGeom prst="rect">
+            <a:avLst/>
+          </a:prstGeom>
+          <a:effectLst>
+            <a:softEdge rad="0"/>
+          </a:effectLst>
+        </p:spPr>
+      </p:pic>
+      <p:sp>
+        <p:nvSpPr>
+          <p:cNvPr id="44" name="Rectangle 43">
+            <a:extLst>
+              <a:ext uri="{FF2B5EF4-FFF2-40B4-BE49-F238E27FC236}">
+                <a16:creationId xmlns:a16="http://schemas.microsoft.com/office/drawing/2014/main" id="{EAFEF44D-1B41-8042-A64F-D11FF8EC880D}"/>
+              </a:ext>
+            </a:extLst>
+          </p:cNvPr>
+          <p:cNvSpPr/>
+          <p:nvPr/>
+        </p:nvSpPr>
+        <p:spPr>
+          <a:xfrm>
+            <a:off x="8282660" y="3571875"/>
+            <a:ext cx="2470969" cy="2564948"/>
+          </a:xfrm>
+          <a:prstGeom prst="rect">
+            <a:avLst/>
+          </a:prstGeom>
+          <a:solidFill>
+            <a:srgbClr val="007CBC">
+              <a:alpha val="9804"/>
+            </a:srgbClr>
+          </a:solidFill>
+          <a:ln w="12700">
+            <a:solidFill>
+              <a:srgbClr val="007DBC"/>
+            </a:solidFill>
+            <a:prstDash val="solid"/>
+          </a:ln>
+        </p:spPr>
+        <p:style>
+          <a:lnRef idx="2">
+            <a:schemeClr val="accent1">
+              <a:shade val="50000"/>
+            </a:schemeClr>
+          </a:lnRef>
+          <a:fillRef idx="1">
+            <a:schemeClr val="accent1"/>
+          </a:fillRef>
+          <a:effectRef idx="0">
+            <a:schemeClr val="accent1"/>
+          </a:effectRef>
+          <a:fontRef idx="minor">
+            <a:schemeClr val="lt1"/>
+          </a:fontRef>
+        </p:style>
+        <p:txBody>
+          <a:bodyPr rot="0" spcFirstLastPara="0" vertOverflow="overflow" horzOverflow="overflow" vert="horz" wrap="square" lIns="338328" tIns="45720" rIns="91440" bIns="45720" numCol="1" spcCol="0" rtlCol="0" fromWordArt="0" anchor="t" anchorCtr="0" forceAA="0" compatLnSpc="1">
+            <a:prstTxWarp prst="textNoShape">
+              <a:avLst/>
+            </a:prstTxWarp>
+            <a:noAutofit/>
+          </a:bodyPr>
+          <a:lstStyle/>
+          <a:p>
+            <a:pPr algn="l"/>
+            <a:r>
+              <a:rPr lang="en-US" sz="1200" dirty="0">
+                <a:solidFill>
+                  <a:srgbClr val="007DBC"/>
+                </a:solidFill>
+              </a:rPr>
+              <a:t>Private subnet</a:t>
+            </a:r>
+          </a:p>
+        </p:txBody>
+      </p:sp>
+      <p:sp>
+        <p:nvSpPr>
+          <p:cNvPr id="47" name="Rectangle 46">
+            <a:extLst>
+              <a:ext uri="{FF2B5EF4-FFF2-40B4-BE49-F238E27FC236}">
+                <a16:creationId xmlns:a16="http://schemas.microsoft.com/office/drawing/2014/main" id="{DBB90A93-5A97-BD4E-9960-C5CD5DF3ACA4}"/>
+              </a:ext>
+            </a:extLst>
+          </p:cNvPr>
+          <p:cNvSpPr/>
+          <p:nvPr/>
+        </p:nvSpPr>
+        <p:spPr>
+          <a:xfrm>
+            <a:off x="8127532" y="629762"/>
+            <a:ext cx="2782099" cy="5849653"/>
+          </a:xfrm>
+          <a:prstGeom prst="rect">
+            <a:avLst/>
+          </a:prstGeom>
+          <a:noFill/>
+          <a:ln w="12700">
+            <a:solidFill>
+              <a:srgbClr val="007DBC"/>
+            </a:solidFill>
+            <a:prstDash val="dash"/>
+          </a:ln>
+        </p:spPr>
+        <p:style>
+          <a:lnRef idx="2">
+            <a:schemeClr val="accent1">
+              <a:shade val="50000"/>
+            </a:schemeClr>
+          </a:lnRef>
+          <a:fillRef idx="1">
+            <a:schemeClr val="accent1"/>
+          </a:fillRef>
+          <a:effectRef idx="0">
+            <a:schemeClr val="accent1"/>
+          </a:effectRef>
+          <a:fontRef idx="minor">
+            <a:schemeClr val="lt1"/>
+          </a:fontRef>
+        </p:style>
+        <p:txBody>
+          <a:bodyPr rot="0" spcFirstLastPara="0" vertOverflow="overflow" horzOverflow="overflow" vert="horz" wrap="square" lIns="91440" tIns="91440" rIns="91440" bIns="45720" numCol="1" spcCol="0" rtlCol="0" fromWordArt="0" anchor="t" anchorCtr="0" forceAA="0" compatLnSpc="1">
+            <a:prstTxWarp prst="textNoShape">
+              <a:avLst/>
+            </a:prstTxWarp>
+            <a:noAutofit/>
+          </a:bodyPr>
+          <a:lstStyle/>
+          <a:p>
+            <a:pPr algn="ctr"/>
+            <a:r>
+              <a:rPr lang="en-US" sz="1200" dirty="0">
+                <a:solidFill>
+                  <a:srgbClr val="007DBC"/>
+                </a:solidFill>
               </a:rPr>
               <a:t>Availability Zone 3</a:t>
             </a:r>
@@ -5597,10 +8839,9 @@
           <a:p>
             <a:pPr algn="ctr"/>
             <a:r>
-              <a:rPr lang="en-US" altLang="en-US" dirty="0" err="1"/>
+              <a:rPr lang="en-US" altLang="en-US" dirty="0"/>
               <a:t>FSx</a:t>
             </a:r>
-            <a:endParaRPr lang="en-US" altLang="en-US" dirty="0"/>
           </a:p>
         </p:txBody>
       </p:sp>
@@ -5815,7 +9056,7 @@
           <a:p>
             <a:pPr algn="ctr" eaLnBrk="1" hangingPunct="1"/>
             <a:r>
-              <a:rPr lang="en-US" altLang="en-US" sz="1200">
+              <a:rPr lang="en-US" altLang="en-US" sz="1200" dirty="0">
                 <a:latin typeface="+mn-lt"/>
                 <a:ea typeface="Amazon Ember" panose="020B0603020204020204" pitchFamily="34" charset="0"/>
                 <a:cs typeface="Arial" panose="020B0604020202020204" pitchFamily="34" charset="0"/>
@@ -5826,7 +9067,7 @@
           <a:p>
             <a:pPr algn="ctr" eaLnBrk="1" hangingPunct="1"/>
             <a:r>
-              <a:rPr lang="en-US" altLang="en-US" sz="1200">
+              <a:rPr lang="en-US" altLang="en-US" sz="1200" dirty="0">
                 <a:latin typeface="+mn-lt"/>
                 <a:ea typeface="Amazon Ember" panose="020B0603020204020204" pitchFamily="34" charset="0"/>
                 <a:cs typeface="Arial" panose="020B0604020202020204" pitchFamily="34" charset="0"/>
@@ -5854,7 +9095,7 @@
     </p:spTree>
     <p:extLst>
       <p:ext uri="{BB962C8B-B14F-4D97-AF65-F5344CB8AC3E}">
-        <p14:creationId xmlns:p14="http://schemas.microsoft.com/office/powerpoint/2010/main" val="1783241675"/>
+        <p14:creationId xmlns:p14="http://schemas.microsoft.com/office/powerpoint/2010/main" val="1168696528"/>
       </p:ext>
     </p:extLst>
   </p:cSld>

</xml_diff>

<commit_message>
A few more edits in the deployment guide
</commit_message>
<xml_diff>
--- a/docs/deployment_guide/images/SIOS DataKeeper architecture.pptx
+++ b/docs/deployment_guide/images/SIOS DataKeeper architecture.pptx
@@ -6,7 +6,8 @@
   </p:sldMasterIdLst>
   <p:sldIdLst>
     <p:sldId id="261" r:id="rId2"/>
-    <p:sldId id="262" r:id="rId3"/>
+    <p:sldId id="263" r:id="rId3"/>
+    <p:sldId id="262" r:id="rId4"/>
   </p:sldIdLst>
   <p:sldSz cx="12192000" cy="6858000"/>
   <p:notesSz cx="6858000" cy="9144000"/>
@@ -115,6 +116,7 @@
         </p14:section>
         <p14:section name="OLD - Do not use" id="{3CA19DAC-AEFA-45FA-84EB-68CA044D5DE1}">
           <p14:sldIdLst>
+            <p14:sldId id="263"/>
             <p14:sldId id="262"/>
           </p14:sldIdLst>
         </p14:section>
@@ -274,7 +276,7 @@
           <a:p>
             <a:fld id="{6244D3B9-4146-964F-9E7E-473F62F24AD4}" type="datetimeFigureOut">
               <a:rPr lang="en-US" smtClean="0"/>
-              <a:t>9/16/2022</a:t>
+              <a:t>9/20/2022</a:t>
             </a:fld>
             <a:endParaRPr lang="en-US" dirty="0"/>
           </a:p>
@@ -472,7 +474,7 @@
           <a:p>
             <a:fld id="{6244D3B9-4146-964F-9E7E-473F62F24AD4}" type="datetimeFigureOut">
               <a:rPr lang="en-US" smtClean="0"/>
-              <a:t>9/16/2022</a:t>
+              <a:t>9/20/2022</a:t>
             </a:fld>
             <a:endParaRPr lang="en-US" dirty="0"/>
           </a:p>
@@ -680,7 +682,7 @@
           <a:p>
             <a:fld id="{6244D3B9-4146-964F-9E7E-473F62F24AD4}" type="datetimeFigureOut">
               <a:rPr lang="en-US" smtClean="0"/>
-              <a:t>9/16/2022</a:t>
+              <a:t>9/20/2022</a:t>
             </a:fld>
             <a:endParaRPr lang="en-US" dirty="0"/>
           </a:p>
@@ -878,7 +880,7 @@
           <a:p>
             <a:fld id="{6244D3B9-4146-964F-9E7E-473F62F24AD4}" type="datetimeFigureOut">
               <a:rPr lang="en-US" smtClean="0"/>
-              <a:t>9/16/2022</a:t>
+              <a:t>9/20/2022</a:t>
             </a:fld>
             <a:endParaRPr lang="en-US" dirty="0"/>
           </a:p>
@@ -1153,7 +1155,7 @@
           <a:p>
             <a:fld id="{6244D3B9-4146-964F-9E7E-473F62F24AD4}" type="datetimeFigureOut">
               <a:rPr lang="en-US" smtClean="0"/>
-              <a:t>9/16/2022</a:t>
+              <a:t>9/20/2022</a:t>
             </a:fld>
             <a:endParaRPr lang="en-US" dirty="0"/>
           </a:p>
@@ -1418,7 +1420,7 @@
           <a:p>
             <a:fld id="{6244D3B9-4146-964F-9E7E-473F62F24AD4}" type="datetimeFigureOut">
               <a:rPr lang="en-US" smtClean="0"/>
-              <a:t>9/16/2022</a:t>
+              <a:t>9/20/2022</a:t>
             </a:fld>
             <a:endParaRPr lang="en-US" dirty="0"/>
           </a:p>
@@ -1830,7 +1832,7 @@
           <a:p>
             <a:fld id="{6244D3B9-4146-964F-9E7E-473F62F24AD4}" type="datetimeFigureOut">
               <a:rPr lang="en-US" smtClean="0"/>
-              <a:t>9/16/2022</a:t>
+              <a:t>9/20/2022</a:t>
             </a:fld>
             <a:endParaRPr lang="en-US" dirty="0"/>
           </a:p>
@@ -1971,7 +1973,7 @@
           <a:p>
             <a:fld id="{6244D3B9-4146-964F-9E7E-473F62F24AD4}" type="datetimeFigureOut">
               <a:rPr lang="en-US" smtClean="0"/>
-              <a:t>9/16/2022</a:t>
+              <a:t>9/20/2022</a:t>
             </a:fld>
             <a:endParaRPr lang="en-US" dirty="0"/>
           </a:p>
@@ -2084,7 +2086,7 @@
           <a:p>
             <a:fld id="{6244D3B9-4146-964F-9E7E-473F62F24AD4}" type="datetimeFigureOut">
               <a:rPr lang="en-US" smtClean="0"/>
-              <a:t>9/16/2022</a:t>
+              <a:t>9/20/2022</a:t>
             </a:fld>
             <a:endParaRPr lang="en-US" dirty="0"/>
           </a:p>
@@ -2395,7 +2397,7 @@
           <a:p>
             <a:fld id="{6244D3B9-4146-964F-9E7E-473F62F24AD4}" type="datetimeFigureOut">
               <a:rPr lang="en-US" smtClean="0"/>
-              <a:t>9/16/2022</a:t>
+              <a:t>9/20/2022</a:t>
             </a:fld>
             <a:endParaRPr lang="en-US" dirty="0"/>
           </a:p>
@@ -2683,7 +2685,7 @@
           <a:p>
             <a:fld id="{6244D3B9-4146-964F-9E7E-473F62F24AD4}" type="datetimeFigureOut">
               <a:rPr lang="en-US" smtClean="0"/>
-              <a:t>9/16/2022</a:t>
+              <a:t>9/20/2022</a:t>
             </a:fld>
             <a:endParaRPr lang="en-US" dirty="0"/>
           </a:p>
@@ -2924,7 +2926,7 @@
           <a:p>
             <a:fld id="{6244D3B9-4146-964F-9E7E-473F62F24AD4}" type="datetimeFigureOut">
               <a:rPr lang="en-US" smtClean="0"/>
-              <a:t>9/16/2022</a:t>
+              <a:t>9/20/2022</a:t>
             </a:fld>
             <a:endParaRPr lang="en-US" dirty="0"/>
           </a:p>
@@ -3355,7 +3357,7 @@
         </p:nvSpPr>
         <p:spPr>
           <a:xfrm>
-            <a:off x="4190023" y="1355882"/>
+            <a:off x="6385598" y="1355882"/>
             <a:ext cx="1627632" cy="2065388"/>
           </a:xfrm>
           <a:prstGeom prst="rect">
@@ -3444,7 +3446,7 @@
         </p:blipFill>
         <p:spPr>
           <a:xfrm>
-            <a:off x="4784635" y="2593812"/>
+            <a:off x="6980210" y="2593812"/>
             <a:ext cx="469900" cy="469900"/>
           </a:xfrm>
           <a:prstGeom prst="rect">
@@ -3469,7 +3471,7 @@
         </p:nvSpPr>
         <p:spPr>
           <a:xfrm>
-            <a:off x="4517513" y="3063413"/>
+            <a:off x="6713088" y="3063413"/>
             <a:ext cx="1004144" cy="261610"/>
           </a:xfrm>
           <a:prstGeom prst="rect">
@@ -3508,7 +3510,7 @@
         </p:nvSpPr>
         <p:spPr>
           <a:xfrm>
-            <a:off x="930848" y="1346092"/>
+            <a:off x="2931261" y="1346092"/>
             <a:ext cx="1625917" cy="2065388"/>
           </a:xfrm>
           <a:prstGeom prst="rect">
@@ -3577,8 +3579,8 @@
         </p:nvSpPr>
         <p:spPr>
           <a:xfrm>
-            <a:off x="371797" y="978749"/>
-            <a:ext cx="7891745" cy="5218852"/>
+            <a:off x="2372210" y="978749"/>
+            <a:ext cx="5952803" cy="5218852"/>
           </a:xfrm>
           <a:prstGeom prst="rect">
             <a:avLst/>
@@ -3644,7 +3646,7 @@
         </p:nvSpPr>
         <p:spPr>
           <a:xfrm>
-            <a:off x="934551" y="3562086"/>
+            <a:off x="2934964" y="3562086"/>
             <a:ext cx="1627632" cy="1797904"/>
           </a:xfrm>
           <a:prstGeom prst="rect">
@@ -3713,8 +3715,8 @@
         </p:nvSpPr>
         <p:spPr>
           <a:xfrm>
-            <a:off x="184010" y="172373"/>
-            <a:ext cx="9588166" cy="6236894"/>
+            <a:off x="2184423" y="172373"/>
+            <a:ext cx="7797777" cy="6236894"/>
           </a:xfrm>
           <a:prstGeom prst="rect">
             <a:avLst/>
@@ -3779,7 +3781,7 @@
         </p:nvSpPr>
         <p:spPr>
           <a:xfrm>
-            <a:off x="779424" y="619973"/>
+            <a:off x="2779837" y="619973"/>
             <a:ext cx="1938438" cy="5694838"/>
           </a:xfrm>
           <a:prstGeom prst="rect">
@@ -3860,7 +3862,7 @@
         </p:blipFill>
         <p:spPr>
           <a:xfrm>
-            <a:off x="3229309" y="2503942"/>
+            <a:off x="5309810" y="2503942"/>
             <a:ext cx="330200" cy="330200"/>
           </a:xfrm>
           <a:prstGeom prst="rect">
@@ -3896,7 +3898,7 @@
         </p:blipFill>
         <p:spPr>
           <a:xfrm>
-            <a:off x="184011" y="172373"/>
+            <a:off x="2184424" y="172373"/>
             <a:ext cx="330200" cy="330200"/>
           </a:xfrm>
           <a:prstGeom prst="rect">
@@ -3932,7 +3934,7 @@
         </p:blipFill>
         <p:spPr>
           <a:xfrm>
-            <a:off x="371796" y="980233"/>
+            <a:off x="2372209" y="980233"/>
             <a:ext cx="330200" cy="330200"/>
           </a:xfrm>
           <a:prstGeom prst="rect">
@@ -3968,7 +3970,7 @@
         </p:blipFill>
         <p:spPr>
           <a:xfrm>
-            <a:off x="930848" y="1343733"/>
+            <a:off x="2931261" y="1343733"/>
             <a:ext cx="274320" cy="274320"/>
           </a:xfrm>
           <a:prstGeom prst="rect">
@@ -4004,7 +4006,7 @@
         </p:blipFill>
         <p:spPr>
           <a:xfrm>
-            <a:off x="934552" y="3571820"/>
+            <a:off x="2934965" y="3571820"/>
             <a:ext cx="274320" cy="274320"/>
           </a:xfrm>
           <a:prstGeom prst="rect">
@@ -4026,7 +4028,7 @@
         </p:nvSpPr>
         <p:spPr>
           <a:xfrm>
-            <a:off x="1244761" y="2173684"/>
+            <a:off x="3245174" y="2173684"/>
             <a:ext cx="1035183" cy="261610"/>
           </a:xfrm>
           <a:prstGeom prst="rect">
@@ -4079,7 +4081,7 @@
         </p:blipFill>
         <p:spPr>
           <a:xfrm>
-            <a:off x="1527402" y="1696278"/>
+            <a:off x="3527815" y="1696278"/>
             <a:ext cx="469900" cy="469900"/>
           </a:xfrm>
           <a:prstGeom prst="rect">
@@ -4115,7 +4117,7 @@
         </p:blipFill>
         <p:spPr>
           <a:xfrm>
-            <a:off x="1527402" y="2593812"/>
+            <a:off x="3527815" y="2593812"/>
             <a:ext cx="469900" cy="469900"/>
           </a:xfrm>
           <a:prstGeom prst="rect">
@@ -4137,7 +4139,7 @@
         </p:nvSpPr>
         <p:spPr>
           <a:xfrm>
-            <a:off x="1205168" y="3063413"/>
+            <a:off x="3205581" y="3063413"/>
             <a:ext cx="1140092" cy="266180"/>
           </a:xfrm>
           <a:prstGeom prst="rect">
@@ -4176,7 +4178,7 @@
         </p:nvSpPr>
         <p:spPr>
           <a:xfrm>
-            <a:off x="4193727" y="3571875"/>
+            <a:off x="6389302" y="3571875"/>
             <a:ext cx="1627632" cy="1787525"/>
           </a:xfrm>
           <a:prstGeom prst="rect">
@@ -4245,7 +4247,7 @@
         </p:nvSpPr>
         <p:spPr>
           <a:xfrm>
-            <a:off x="4038600" y="629763"/>
+            <a:off x="6234175" y="629763"/>
             <a:ext cx="1938438" cy="5694838"/>
           </a:xfrm>
           <a:prstGeom prst="rect">
@@ -4326,7 +4328,7 @@
         </p:blipFill>
         <p:spPr>
           <a:xfrm>
-            <a:off x="4190024" y="1353523"/>
+            <a:off x="6385599" y="1353523"/>
             <a:ext cx="274320" cy="274320"/>
           </a:xfrm>
           <a:prstGeom prst="rect">
@@ -4362,7 +4364,7 @@
         </p:blipFill>
         <p:spPr>
           <a:xfrm>
-            <a:off x="4193728" y="3581610"/>
+            <a:off x="6389303" y="3581610"/>
             <a:ext cx="274320" cy="274320"/>
           </a:xfrm>
           <a:prstGeom prst="rect">
@@ -4384,8 +4386,8 @@
         </p:nvSpPr>
         <p:spPr>
           <a:xfrm>
-            <a:off x="1016000" y="2503942"/>
-            <a:ext cx="6908799" cy="835458"/>
+            <a:off x="3016413" y="2503942"/>
+            <a:ext cx="4927599" cy="835458"/>
           </a:xfrm>
           <a:prstGeom prst="rect">
             <a:avLst/>
@@ -4448,8 +4450,8 @@
         </p:nvSpPr>
         <p:spPr>
           <a:xfrm>
-            <a:off x="1016000" y="4020455"/>
-            <a:ext cx="6908800" cy="1225667"/>
+            <a:off x="3016412" y="4020455"/>
+            <a:ext cx="4927599" cy="1225667"/>
           </a:xfrm>
           <a:prstGeom prst="rect">
             <a:avLst/>
@@ -4525,7 +4527,7 @@
         </p:blipFill>
         <p:spPr>
           <a:xfrm>
-            <a:off x="1475481" y="4112134"/>
+            <a:off x="3475894" y="4112134"/>
             <a:ext cx="573743" cy="573743"/>
           </a:xfrm>
           <a:prstGeom prst="rect">
@@ -4561,7 +4563,7 @@
         </p:blipFill>
         <p:spPr>
           <a:xfrm>
-            <a:off x="4732714" y="4112134"/>
+            <a:off x="6928289" y="4112134"/>
             <a:ext cx="573743" cy="573743"/>
           </a:xfrm>
           <a:prstGeom prst="rect">
@@ -4583,7 +4585,7 @@
         </p:nvSpPr>
         <p:spPr>
           <a:xfrm>
-            <a:off x="986972" y="4691390"/>
+            <a:off x="2987385" y="4691390"/>
             <a:ext cx="1519549" cy="430887"/>
           </a:xfrm>
           <a:prstGeom prst="rect">
@@ -4635,7 +4637,7 @@
         </p:nvSpPr>
         <p:spPr>
           <a:xfrm>
-            <a:off x="4210418" y="4691390"/>
+            <a:off x="6405993" y="4691390"/>
             <a:ext cx="1589803" cy="430887"/>
           </a:xfrm>
           <a:prstGeom prst="rect">
@@ -4675,371 +4677,10 @@
       </p:sp>
       <p:sp>
         <p:nvSpPr>
-          <p:cNvPr id="39" name="Rectangle 38">
-            <a:extLst>
-              <a:ext uri="{FF2B5EF4-FFF2-40B4-BE49-F238E27FC236}">
-                <a16:creationId xmlns:a16="http://schemas.microsoft.com/office/drawing/2014/main" id="{D6FCA288-1691-2540-8A79-AEB6BC4CAB60}"/>
-              </a:ext>
-            </a:extLst>
-          </p:cNvPr>
-          <p:cNvSpPr/>
-          <p:nvPr/>
-        </p:nvSpPr>
-        <p:spPr>
-          <a:xfrm>
-            <a:off x="6387644" y="1355882"/>
-            <a:ext cx="1627632" cy="2065388"/>
-          </a:xfrm>
-          <a:prstGeom prst="rect">
-            <a:avLst/>
-          </a:prstGeom>
-          <a:solidFill>
-            <a:srgbClr val="1D8900">
-              <a:alpha val="9804"/>
-            </a:srgbClr>
-          </a:solidFill>
-          <a:ln w="12700">
-            <a:noFill/>
-            <a:prstDash val="solid"/>
-          </a:ln>
-        </p:spPr>
-        <p:style>
-          <a:lnRef idx="2">
-            <a:schemeClr val="accent1">
-              <a:shade val="50000"/>
-            </a:schemeClr>
-          </a:lnRef>
-          <a:fillRef idx="1">
-            <a:schemeClr val="accent1"/>
-          </a:fillRef>
-          <a:effectRef idx="0">
-            <a:schemeClr val="accent1"/>
-          </a:effectRef>
-          <a:fontRef idx="minor">
-            <a:schemeClr val="lt1"/>
-          </a:fontRef>
-        </p:style>
-        <p:txBody>
-          <a:bodyPr rot="0" spcFirstLastPara="0" vertOverflow="overflow" horzOverflow="overflow" vert="horz" wrap="square" lIns="338328" tIns="45720" rIns="91440" bIns="45720" numCol="1" spcCol="0" rtlCol="0" fromWordArt="0" anchor="t" anchorCtr="0" forceAA="0" compatLnSpc="1">
-            <a:prstTxWarp prst="textNoShape">
-              <a:avLst/>
-            </a:prstTxWarp>
-            <a:noAutofit/>
-          </a:bodyPr>
-          <a:lstStyle/>
-          <a:p>
-            <a:pPr algn="l"/>
-            <a:r>
-              <a:rPr lang="en-US" sz="1200" dirty="0">
-                <a:solidFill>
-                  <a:srgbClr val="1E8900"/>
-                </a:solidFill>
-                <a:latin typeface="Arial" panose="020B0604020202020204" pitchFamily="34" charset="0"/>
-                <a:cs typeface="Arial" panose="020B0604020202020204" pitchFamily="34" charset="0"/>
-              </a:rPr>
-              <a:t>Public subnet</a:t>
-            </a:r>
-          </a:p>
-        </p:txBody>
-      </p:sp>
-      <p:pic>
-        <p:nvPicPr>
-          <p:cNvPr id="43" name="Graphic 36">
-            <a:extLst>
-              <a:ext uri="{FF2B5EF4-FFF2-40B4-BE49-F238E27FC236}">
-                <a16:creationId xmlns:a16="http://schemas.microsoft.com/office/drawing/2014/main" id="{C4E4C284-FAB9-4B44-9F8C-32E1EAC8F019}"/>
-              </a:ext>
-            </a:extLst>
-          </p:cNvPr>
-          <p:cNvPicPr>
-            <a:picLocks noChangeAspect="1"/>
-          </p:cNvPicPr>
-          <p:nvPr/>
-        </p:nvPicPr>
-        <p:blipFill>
-          <a:blip r:embed="rId2">
-            <a:extLst>
-              <a:ext uri="{BEBA8EAE-BF5A-486C-A8C5-ECC9F3942E4B}">
-                <a14:imgProps xmlns:a14="http://schemas.microsoft.com/office/drawing/2010/main">
-                  <a14:imgLayer r:embed="rId3">
-                    <a14:imgEffect>
-                      <a14:artisticBlur/>
-                    </a14:imgEffect>
-                  </a14:imgLayer>
-                </a14:imgProps>
-              </a:ext>
-            </a:extLst>
-          </a:blip>
-          <a:stretch>
-            <a:fillRect/>
-          </a:stretch>
-        </p:blipFill>
-        <p:spPr>
-          <a:xfrm>
-            <a:off x="6966979" y="2593812"/>
-            <a:ext cx="469900" cy="469900"/>
-          </a:xfrm>
-          <a:prstGeom prst="rect">
-            <a:avLst/>
-          </a:prstGeom>
-          <a:effectLst>
-            <a:softEdge rad="0"/>
-          </a:effectLst>
-        </p:spPr>
-      </p:pic>
-      <p:sp>
-        <p:nvSpPr>
-          <p:cNvPr id="44" name="Rectangle 43">
-            <a:extLst>
-              <a:ext uri="{FF2B5EF4-FFF2-40B4-BE49-F238E27FC236}">
-                <a16:creationId xmlns:a16="http://schemas.microsoft.com/office/drawing/2014/main" id="{EAFEF44D-1B41-8042-A64F-D11FF8EC880D}"/>
-              </a:ext>
-            </a:extLst>
-          </p:cNvPr>
-          <p:cNvSpPr/>
-          <p:nvPr/>
-        </p:nvSpPr>
-        <p:spPr>
-          <a:xfrm>
-            <a:off x="6391347" y="3571875"/>
-            <a:ext cx="1627632" cy="1787525"/>
-          </a:xfrm>
-          <a:prstGeom prst="rect">
-            <a:avLst/>
-          </a:prstGeom>
-          <a:solidFill>
-            <a:srgbClr val="007CBC">
-              <a:alpha val="9804"/>
-            </a:srgbClr>
-          </a:solidFill>
-          <a:ln w="12700">
-            <a:noFill/>
-            <a:prstDash val="solid"/>
-          </a:ln>
-        </p:spPr>
-        <p:style>
-          <a:lnRef idx="2">
-            <a:schemeClr val="accent1">
-              <a:shade val="50000"/>
-            </a:schemeClr>
-          </a:lnRef>
-          <a:fillRef idx="1">
-            <a:schemeClr val="accent1"/>
-          </a:fillRef>
-          <a:effectRef idx="0">
-            <a:schemeClr val="accent1"/>
-          </a:effectRef>
-          <a:fontRef idx="minor">
-            <a:schemeClr val="lt1"/>
-          </a:fontRef>
-        </p:style>
-        <p:txBody>
-          <a:bodyPr rot="0" spcFirstLastPara="0" vertOverflow="overflow" horzOverflow="overflow" vert="horz" wrap="square" lIns="338328" tIns="45720" rIns="91440" bIns="45720" numCol="1" spcCol="0" rtlCol="0" fromWordArt="0" anchor="t" anchorCtr="0" forceAA="0" compatLnSpc="1">
-            <a:prstTxWarp prst="textNoShape">
-              <a:avLst/>
-            </a:prstTxWarp>
-            <a:noAutofit/>
-          </a:bodyPr>
-          <a:lstStyle/>
-          <a:p>
-            <a:pPr algn="l"/>
-            <a:r>
-              <a:rPr lang="en-US" sz="1200" dirty="0">
-                <a:solidFill>
-                  <a:srgbClr val="007DBC"/>
-                </a:solidFill>
-                <a:latin typeface="Arial" panose="020B0604020202020204" pitchFamily="34" charset="0"/>
-                <a:cs typeface="Arial" panose="020B0604020202020204" pitchFamily="34" charset="0"/>
-              </a:rPr>
-              <a:t>Private subnet</a:t>
-            </a:r>
-          </a:p>
-        </p:txBody>
-      </p:sp>
-      <p:sp>
-        <p:nvSpPr>
-          <p:cNvPr id="47" name="Rectangle 46">
-            <a:extLst>
-              <a:ext uri="{FF2B5EF4-FFF2-40B4-BE49-F238E27FC236}">
-                <a16:creationId xmlns:a16="http://schemas.microsoft.com/office/drawing/2014/main" id="{DBB90A93-5A97-BD4E-9960-C5CD5DF3ACA4}"/>
-              </a:ext>
-            </a:extLst>
-          </p:cNvPr>
-          <p:cNvSpPr/>
-          <p:nvPr/>
-        </p:nvSpPr>
-        <p:spPr>
-          <a:xfrm>
-            <a:off x="6236220" y="629763"/>
-            <a:ext cx="1933746" cy="5694838"/>
-          </a:xfrm>
-          <a:prstGeom prst="rect">
-            <a:avLst/>
-          </a:prstGeom>
-          <a:noFill/>
-          <a:ln w="12700">
-            <a:solidFill>
-              <a:srgbClr val="007DBC"/>
-            </a:solidFill>
-            <a:prstDash val="dash"/>
-          </a:ln>
-        </p:spPr>
-        <p:style>
-          <a:lnRef idx="2">
-            <a:schemeClr val="accent1">
-              <a:shade val="50000"/>
-            </a:schemeClr>
-          </a:lnRef>
-          <a:fillRef idx="1">
-            <a:schemeClr val="accent1"/>
-          </a:fillRef>
-          <a:effectRef idx="0">
-            <a:schemeClr val="accent1"/>
-          </a:effectRef>
-          <a:fontRef idx="minor">
-            <a:schemeClr val="lt1"/>
-          </a:fontRef>
-        </p:style>
-        <p:txBody>
-          <a:bodyPr rot="0" spcFirstLastPara="0" vertOverflow="overflow" horzOverflow="overflow" vert="horz" wrap="square" lIns="91440" tIns="91440" rIns="91440" bIns="45720" numCol="1" spcCol="0" rtlCol="0" fromWordArt="0" anchor="t" anchorCtr="0" forceAA="0" compatLnSpc="1">
-            <a:prstTxWarp prst="textNoShape">
-              <a:avLst/>
-            </a:prstTxWarp>
-            <a:noAutofit/>
-          </a:bodyPr>
-          <a:lstStyle/>
-          <a:p>
-            <a:pPr algn="ctr"/>
-            <a:r>
-              <a:rPr lang="en-US" sz="1200" dirty="0">
-                <a:solidFill>
-                  <a:srgbClr val="007DBC"/>
-                </a:solidFill>
-                <a:latin typeface="Arial" panose="020B0604020202020204" pitchFamily="34" charset="0"/>
-                <a:cs typeface="Arial" panose="020B0604020202020204" pitchFamily="34" charset="0"/>
-              </a:rPr>
-              <a:t>Availability Zone 3</a:t>
-            </a:r>
-          </a:p>
-        </p:txBody>
-      </p:sp>
-      <p:pic>
-        <p:nvPicPr>
-          <p:cNvPr id="48" name="Graphic 47">
-            <a:extLst>
-              <a:ext uri="{FF2B5EF4-FFF2-40B4-BE49-F238E27FC236}">
-                <a16:creationId xmlns:a16="http://schemas.microsoft.com/office/drawing/2014/main" id="{80C740EE-E304-EB4F-8F4F-655107822FCD}"/>
-              </a:ext>
-            </a:extLst>
-          </p:cNvPr>
-          <p:cNvPicPr>
-            <a:picLocks noChangeAspect="1"/>
-          </p:cNvPicPr>
-          <p:nvPr/>
-        </p:nvPicPr>
-        <p:blipFill>
-          <a:blip r:embed="rId10">
-            <a:extLst>
-              <a:ext uri="{96DAC541-7B7A-43D3-8B79-37D633B846F1}">
-                <asvg:svgBlip xmlns:asvg="http://schemas.microsoft.com/office/drawing/2016/SVG/main" r:embed="rId11"/>
-              </a:ext>
-            </a:extLst>
-          </a:blip>
-          <a:stretch>
-            <a:fillRect/>
-          </a:stretch>
-        </p:blipFill>
-        <p:spPr>
-          <a:xfrm>
-            <a:off x="6387644" y="1353523"/>
-            <a:ext cx="274320" cy="274320"/>
-          </a:xfrm>
-          <a:prstGeom prst="rect">
-            <a:avLst/>
-          </a:prstGeom>
-        </p:spPr>
-      </p:pic>
-      <p:pic>
-        <p:nvPicPr>
-          <p:cNvPr id="57" name="Graphic 56">
-            <a:extLst>
-              <a:ext uri="{FF2B5EF4-FFF2-40B4-BE49-F238E27FC236}">
-                <a16:creationId xmlns:a16="http://schemas.microsoft.com/office/drawing/2014/main" id="{6756DE6B-8CEF-3C4D-A926-0B3C425D64AD}"/>
-              </a:ext>
-            </a:extLst>
-          </p:cNvPr>
-          <p:cNvPicPr>
-            <a:picLocks noChangeAspect="1"/>
-          </p:cNvPicPr>
-          <p:nvPr/>
-        </p:nvPicPr>
-        <p:blipFill>
-          <a:blip r:embed="rId12">
-            <a:extLst>
-              <a:ext uri="{96DAC541-7B7A-43D3-8B79-37D633B846F1}">
-                <asvg:svgBlip xmlns:asvg="http://schemas.microsoft.com/office/drawing/2016/SVG/main" r:embed="rId13"/>
-              </a:ext>
-            </a:extLst>
-          </a:blip>
-          <a:stretch>
-            <a:fillRect/>
-          </a:stretch>
-        </p:blipFill>
-        <p:spPr>
-          <a:xfrm>
-            <a:off x="6391348" y="3581610"/>
-            <a:ext cx="274320" cy="274320"/>
-          </a:xfrm>
-          <a:prstGeom prst="rect">
-            <a:avLst/>
-          </a:prstGeom>
-        </p:spPr>
-      </p:pic>
-      <p:pic>
-        <p:nvPicPr>
-          <p:cNvPr id="62" name="Graphic 61">
-            <a:extLst>
-              <a:ext uri="{FF2B5EF4-FFF2-40B4-BE49-F238E27FC236}">
-                <a16:creationId xmlns:a16="http://schemas.microsoft.com/office/drawing/2014/main" id="{5C134F55-C14C-494E-9720-DA08A9B04B6E}"/>
-              </a:ext>
-            </a:extLst>
-          </p:cNvPr>
-          <p:cNvPicPr>
-            <a:picLocks noChangeAspect="1"/>
-          </p:cNvPicPr>
-          <p:nvPr/>
-        </p:nvPicPr>
-        <p:blipFill>
-          <a:blip r:embed="rId18">
-            <a:extLst>
-              <a:ext uri="{96DAC541-7B7A-43D3-8B79-37D633B846F1}">
-                <asvg:svgBlip xmlns:asvg="http://schemas.microsoft.com/office/drawing/2016/SVG/main" r:embed="rId19"/>
-              </a:ext>
-            </a:extLst>
-          </a:blip>
-          <a:stretch>
-            <a:fillRect/>
-          </a:stretch>
-        </p:blipFill>
-        <p:spPr>
-          <a:xfrm>
-            <a:off x="6915058" y="4112134"/>
-            <a:ext cx="573743" cy="573743"/>
-          </a:xfrm>
-          <a:prstGeom prst="rect">
-            <a:avLst/>
-          </a:prstGeom>
-          <a:effectLst>
-            <a:softEdge rad="0"/>
-          </a:effectLst>
-        </p:spPr>
-      </p:pic>
-      <p:sp>
-        <p:nvSpPr>
-          <p:cNvPr id="64" name="TextBox 63">
-            <a:extLst>
-              <a:ext uri="{FF2B5EF4-FFF2-40B4-BE49-F238E27FC236}">
-                <a16:creationId xmlns:a16="http://schemas.microsoft.com/office/drawing/2014/main" id="{A376846E-941B-D04E-A9D1-6BB5A5ADC4A9}"/>
+          <p:cNvPr id="67" name="TextBox 66">
+            <a:extLst>
+              <a:ext uri="{FF2B5EF4-FFF2-40B4-BE49-F238E27FC236}">
+                <a16:creationId xmlns:a16="http://schemas.microsoft.com/office/drawing/2014/main" id="{201108FB-9F50-0548-AD17-7568A51E46F2}"/>
               </a:ext>
             </a:extLst>
           </p:cNvPr>
@@ -5048,92 +4689,7 @@
         </p:nvSpPr>
         <p:spPr>
           <a:xfrm>
-            <a:off x="6679531" y="3119735"/>
-            <a:ext cx="1044797" cy="446276"/>
-          </a:xfrm>
-          <a:prstGeom prst="rect">
-            <a:avLst/>
-          </a:prstGeom>
-          <a:noFill/>
-        </p:spPr>
-        <p:txBody>
-          <a:bodyPr wrap="square" rtlCol="0">
-            <a:spAutoFit/>
-          </a:bodyPr>
-          <a:lstStyle/>
-          <a:p>
-            <a:pPr algn="ctr"/>
-            <a:r>
-              <a:rPr lang="en-US" sz="1100" dirty="0">
-                <a:latin typeface="Arial" panose="020B0604020202020204" pitchFamily="34" charset="0"/>
-                <a:cs typeface="Arial" panose="020B0604020202020204" pitchFamily="34" charset="0"/>
-              </a:rPr>
-              <a:t>RD Gateway</a:t>
-            </a:r>
-          </a:p>
-          <a:p>
-            <a:pPr algn="ctr"/>
-            <a:endParaRPr lang="en-US" sz="1200" dirty="0">
-              <a:latin typeface="Arial" panose="020B0604020202020204" pitchFamily="34" charset="0"/>
-              <a:cs typeface="Arial" panose="020B0604020202020204" pitchFamily="34" charset="0"/>
-            </a:endParaRPr>
-          </a:p>
-        </p:txBody>
-      </p:sp>
-      <p:sp>
-        <p:nvSpPr>
-          <p:cNvPr id="65" name="TextBox 64">
-            <a:extLst>
-              <a:ext uri="{FF2B5EF4-FFF2-40B4-BE49-F238E27FC236}">
-                <a16:creationId xmlns:a16="http://schemas.microsoft.com/office/drawing/2014/main" id="{C52451FD-4DDC-6948-AC78-4DF42DD371A7}"/>
-              </a:ext>
-            </a:extLst>
-          </p:cNvPr>
-          <p:cNvSpPr txBox="1"/>
-          <p:nvPr/>
-        </p:nvSpPr>
-        <p:spPr>
-          <a:xfrm>
-            <a:off x="6470470" y="4691390"/>
-            <a:ext cx="1430883" cy="430887"/>
-          </a:xfrm>
-          <a:prstGeom prst="rect">
-            <a:avLst/>
-          </a:prstGeom>
-          <a:noFill/>
-        </p:spPr>
-        <p:txBody>
-          <a:bodyPr wrap="square" rtlCol="0">
-            <a:spAutoFit/>
-          </a:bodyPr>
-          <a:lstStyle/>
-          <a:p>
-            <a:pPr algn="ctr"/>
-            <a:r>
-              <a:rPr lang="en-US" sz="1100" dirty="0">
-                <a:latin typeface="Arial" panose="020B0604020202020204" pitchFamily="34" charset="0"/>
-                <a:cs typeface="Arial" panose="020B0604020202020204" pitchFamily="34" charset="0"/>
-              </a:rPr>
-              <a:t>SQL Server node 3 with replica</a:t>
-            </a:r>
-          </a:p>
-        </p:txBody>
-      </p:sp>
-      <p:sp>
-        <p:nvSpPr>
-          <p:cNvPr id="67" name="TextBox 66">
-            <a:extLst>
-              <a:ext uri="{FF2B5EF4-FFF2-40B4-BE49-F238E27FC236}">
-                <a16:creationId xmlns:a16="http://schemas.microsoft.com/office/drawing/2014/main" id="{201108FB-9F50-0548-AD17-7568A51E46F2}"/>
-              </a:ext>
-            </a:extLst>
-          </p:cNvPr>
-          <p:cNvSpPr txBox="1"/>
-          <p:nvPr/>
-        </p:nvSpPr>
-        <p:spPr>
-          <a:xfrm>
-            <a:off x="8268010" y="5361801"/>
+            <a:off x="8400548" y="5695123"/>
             <a:ext cx="1504166" cy="276999"/>
           </a:xfrm>
           <a:prstGeom prst="rect">
@@ -5172,7 +4728,7 @@
         </p:nvSpPr>
         <p:spPr>
           <a:xfrm>
-            <a:off x="8348056" y="4126035"/>
+            <a:off x="8480594" y="4459357"/>
             <a:ext cx="1344074" cy="276999"/>
           </a:xfrm>
           <a:prstGeom prst="rect">
@@ -5213,7 +4769,7 @@
         </p:nvSpPr>
         <p:spPr bwMode="auto">
           <a:xfrm>
-            <a:off x="8348056" y="2894880"/>
+            <a:off x="8480594" y="3228202"/>
             <a:ext cx="1344074" cy="276999"/>
           </a:xfrm>
           <a:prstGeom prst="rect">
@@ -5387,7 +4943,7 @@
         </p:blipFill>
         <p:spPr bwMode="auto">
           <a:xfrm>
-            <a:off x="8639093" y="733478"/>
+            <a:off x="8771631" y="1066800"/>
             <a:ext cx="762000" cy="762000"/>
           </a:xfrm>
           <a:prstGeom prst="rect">
@@ -5434,7 +4990,7 @@
         </p:nvSpPr>
         <p:spPr bwMode="auto">
           <a:xfrm>
-            <a:off x="8229600" y="1497065"/>
+            <a:off x="8362138" y="1830387"/>
             <a:ext cx="1580987" cy="461665"/>
           </a:xfrm>
           <a:prstGeom prst="rect">
@@ -5610,7 +5166,7 @@
         </p:nvSpPr>
         <p:spPr bwMode="auto">
           <a:xfrm>
-            <a:off x="2743200" y="5741316"/>
+            <a:off x="4859569" y="5741316"/>
             <a:ext cx="1255644" cy="430887"/>
           </a:xfrm>
           <a:prstGeom prst="rect">
@@ -5799,7 +5355,7 @@
         </p:blipFill>
         <p:spPr bwMode="auto">
           <a:xfrm>
-            <a:off x="3170650" y="5284116"/>
+            <a:off x="5302649" y="5291931"/>
             <a:ext cx="457200" cy="457200"/>
           </a:xfrm>
           <a:prstGeom prst="rect">
@@ -5844,7 +5400,7 @@
         </p:nvSpPr>
         <p:spPr>
           <a:xfrm>
-            <a:off x="4501994" y="2176790"/>
+            <a:off x="6697569" y="2176790"/>
             <a:ext cx="1035183" cy="261610"/>
           </a:xfrm>
           <a:prstGeom prst="rect">
@@ -5897,7 +5453,7 @@
         </p:blipFill>
         <p:spPr>
           <a:xfrm>
-            <a:off x="4784635" y="1699384"/>
+            <a:off x="6980210" y="1699384"/>
             <a:ext cx="469900" cy="469900"/>
           </a:xfrm>
           <a:prstGeom prst="rect">
@@ -5907,10 +5463,10 @@
       </p:pic>
       <p:sp>
         <p:nvSpPr>
-          <p:cNvPr id="80" name="TextBox 79">
-            <a:extLst>
-              <a:ext uri="{FF2B5EF4-FFF2-40B4-BE49-F238E27FC236}">
-                <a16:creationId xmlns:a16="http://schemas.microsoft.com/office/drawing/2014/main" id="{5515A940-6809-433A-9BE0-544D620D9C3D}"/>
+          <p:cNvPr id="16" name="TextBox 15">
+            <a:extLst>
+              <a:ext uri="{FF2B5EF4-FFF2-40B4-BE49-F238E27FC236}">
+                <a16:creationId xmlns:a16="http://schemas.microsoft.com/office/drawing/2014/main" id="{0A09D38D-CA78-40A5-9C77-1DE6DDE523D1}"/>
               </a:ext>
             </a:extLst>
           </p:cNvPr>
@@ -5919,82 +5475,7 @@
         </p:nvSpPr>
         <p:spPr>
           <a:xfrm>
-            <a:off x="6684338" y="2176790"/>
-            <a:ext cx="1035183" cy="261610"/>
-          </a:xfrm>
-          <a:prstGeom prst="rect">
-            <a:avLst/>
-          </a:prstGeom>
-          <a:noFill/>
-        </p:spPr>
-        <p:txBody>
-          <a:bodyPr wrap="square" rtlCol="0">
-            <a:spAutoFit/>
-          </a:bodyPr>
-          <a:lstStyle/>
-          <a:p>
-            <a:pPr algn="ctr"/>
-            <a:r>
-              <a:rPr lang="en-US" sz="1100" dirty="0">
-                <a:latin typeface="Arial" panose="020B0604020202020204" pitchFamily="34" charset="0"/>
-                <a:cs typeface="Arial" panose="020B0604020202020204" pitchFamily="34" charset="0"/>
-              </a:rPr>
-              <a:t>NAT gateway</a:t>
-            </a:r>
-          </a:p>
-        </p:txBody>
-      </p:sp>
-      <p:pic>
-        <p:nvPicPr>
-          <p:cNvPr id="81" name="Graphic 80">
-            <a:extLst>
-              <a:ext uri="{FF2B5EF4-FFF2-40B4-BE49-F238E27FC236}">
-                <a16:creationId xmlns:a16="http://schemas.microsoft.com/office/drawing/2014/main" id="{5852E716-28A7-454F-98A2-9A3AB55D885A}"/>
-              </a:ext>
-            </a:extLst>
-          </p:cNvPr>
-          <p:cNvPicPr>
-            <a:picLocks noChangeAspect="1"/>
-          </p:cNvPicPr>
-          <p:nvPr/>
-        </p:nvPicPr>
-        <p:blipFill>
-          <a:blip r:embed="rId14">
-            <a:extLst>
-              <a:ext uri="{96DAC541-7B7A-43D3-8B79-37D633B846F1}">
-                <asvg:svgBlip xmlns:asvg="http://schemas.microsoft.com/office/drawing/2016/SVG/main" r:embed="rId15"/>
-              </a:ext>
-            </a:extLst>
-          </a:blip>
-          <a:stretch>
-            <a:fillRect/>
-          </a:stretch>
-        </p:blipFill>
-        <p:spPr>
-          <a:xfrm>
-            <a:off x="6966979" y="1699384"/>
-            <a:ext cx="469900" cy="469900"/>
-          </a:xfrm>
-          <a:prstGeom prst="rect">
-            <a:avLst/>
-          </a:prstGeom>
-        </p:spPr>
-      </p:pic>
-      <p:sp>
-        <p:nvSpPr>
-          <p:cNvPr id="16" name="TextBox 15">
-            <a:extLst>
-              <a:ext uri="{FF2B5EF4-FFF2-40B4-BE49-F238E27FC236}">
-                <a16:creationId xmlns:a16="http://schemas.microsoft.com/office/drawing/2014/main" id="{0A09D38D-CA78-40A5-9C77-1DE6DDE523D1}"/>
-              </a:ext>
-            </a:extLst>
-          </p:cNvPr>
-          <p:cNvSpPr txBox="1"/>
-          <p:nvPr/>
-        </p:nvSpPr>
-        <p:spPr>
-          <a:xfrm>
-            <a:off x="2713774" y="4038600"/>
+            <a:off x="4802090" y="4038600"/>
             <a:ext cx="1361270" cy="646331"/>
           </a:xfrm>
           <a:prstGeom prst="rect">
@@ -6074,8 +5555,8 @@
         </p:nvSpPr>
         <p:spPr>
           <a:xfrm>
-            <a:off x="2871670" y="2842845"/>
-            <a:ext cx="1045479" cy="461665"/>
+            <a:off x="4734965" y="2842845"/>
+            <a:ext cx="1479893" cy="276999"/>
           </a:xfrm>
           <a:prstGeom prst="rect">
             <a:avLst/>
@@ -6097,26 +5578,7 @@
                 <a:latin typeface="Arial" panose="020B0604020202020204" pitchFamily="34" charset="0"/>
                 <a:cs typeface="Arial" panose="020B0604020202020204" pitchFamily="34" charset="0"/>
               </a:rPr>
-              <a:t>Auto Scaling</a:t>
-            </a:r>
-            <a:br>
-              <a:rPr lang="en-US" sz="1200" dirty="0">
-                <a:solidFill>
-                  <a:srgbClr val="D86613"/>
-                </a:solidFill>
-                <a:latin typeface="Arial" panose="020B0604020202020204" pitchFamily="34" charset="0"/>
-                <a:cs typeface="Arial" panose="020B0604020202020204" pitchFamily="34" charset="0"/>
-              </a:rPr>
-            </a:br>
-            <a:r>
-              <a:rPr lang="en-US" sz="1200" dirty="0">
-                <a:solidFill>
-                  <a:srgbClr val="D86613"/>
-                </a:solidFill>
-                <a:latin typeface="Arial" panose="020B0604020202020204" pitchFamily="34" charset="0"/>
-                <a:cs typeface="Arial" panose="020B0604020202020204" pitchFamily="34" charset="0"/>
-              </a:rPr>
-              <a:t>group</a:t>
+              <a:t>Auto Scaling group</a:t>
             </a:r>
           </a:p>
         </p:txBody>
@@ -6150,7 +5612,7 @@
         </p:blipFill>
         <p:spPr bwMode="auto">
           <a:xfrm>
-            <a:off x="8639093" y="2140929"/>
+            <a:off x="8771631" y="2474251"/>
             <a:ext cx="762000" cy="762000"/>
           </a:xfrm>
           <a:prstGeom prst="rect">
@@ -6210,7 +5672,7 @@
         </p:blipFill>
         <p:spPr bwMode="auto">
           <a:xfrm>
-            <a:off x="8639783" y="3358561"/>
+            <a:off x="8772321" y="3691883"/>
             <a:ext cx="762000" cy="762000"/>
           </a:xfrm>
           <a:prstGeom prst="rect">
@@ -6270,7 +5732,7 @@
         </p:blipFill>
         <p:spPr bwMode="auto">
           <a:xfrm>
-            <a:off x="8639783" y="4594174"/>
+            <a:off x="8772321" y="4927496"/>
             <a:ext cx="762000" cy="762000"/>
           </a:xfrm>
           <a:prstGeom prst="rect">
@@ -6315,8 +5777,8 @@
         </p:nvSpPr>
         <p:spPr>
           <a:xfrm rot="16200000" flipH="1">
-            <a:off x="2212490" y="4639841"/>
-            <a:ext cx="451063" cy="1388432"/>
+            <a:off x="4301483" y="4551262"/>
+            <a:ext cx="451066" cy="1565593"/>
           </a:xfrm>
           <a:custGeom>
             <a:avLst/>
@@ -6411,8 +5873,8 @@
         </p:nvSpPr>
         <p:spPr>
           <a:xfrm rot="16200000" flipH="1" flipV="1">
-            <a:off x="5234806" y="3588526"/>
-            <a:ext cx="451063" cy="3491063"/>
+            <a:off x="6245399" y="4622979"/>
+            <a:ext cx="451063" cy="1422164"/>
           </a:xfrm>
           <a:custGeom>
             <a:avLst/>
@@ -6493,6 +5955,3188 @@
           </a:p>
         </p:txBody>
       </p:sp>
+    </p:spTree>
+    <p:extLst>
+      <p:ext uri="{BB962C8B-B14F-4D97-AF65-F5344CB8AC3E}">
+        <p14:creationId xmlns:p14="http://schemas.microsoft.com/office/powerpoint/2010/main" val="1783241675"/>
+      </p:ext>
+    </p:extLst>
+  </p:cSld>
+  <p:clrMapOvr>
+    <a:masterClrMapping/>
+  </p:clrMapOvr>
+</p:sld>
+</file>
+
+<file path=ppt/slides/slide2.xml><?xml version="1.0" encoding="utf-8"?>
+<p:sld xmlns:a="http://schemas.openxmlformats.org/drawingml/2006/main" xmlns:r="http://schemas.openxmlformats.org/officeDocument/2006/relationships" xmlns:p="http://schemas.openxmlformats.org/presentationml/2006/main">
+  <p:cSld>
+    <p:spTree>
+      <p:nvGrpSpPr>
+        <p:cNvPr id="1" name=""/>
+        <p:cNvGrpSpPr/>
+        <p:nvPr/>
+      </p:nvGrpSpPr>
+      <p:grpSpPr>
+        <a:xfrm>
+          <a:off x="0" y="0"/>
+          <a:ext cx="0" cy="0"/>
+          <a:chOff x="0" y="0"/>
+          <a:chExt cx="0" cy="0"/>
+        </a:xfrm>
+      </p:grpSpPr>
+      <p:sp>
+        <p:nvSpPr>
+          <p:cNvPr id="30" name="Rectangle 29">
+            <a:extLst>
+              <a:ext uri="{FF2B5EF4-FFF2-40B4-BE49-F238E27FC236}">
+                <a16:creationId xmlns:a16="http://schemas.microsoft.com/office/drawing/2014/main" id="{C773603B-5798-7D4A-B1E4-2072ADA8AD70}"/>
+              </a:ext>
+            </a:extLst>
+          </p:cNvPr>
+          <p:cNvSpPr/>
+          <p:nvPr/>
+        </p:nvSpPr>
+        <p:spPr>
+          <a:xfrm>
+            <a:off x="4190023" y="1355882"/>
+            <a:ext cx="1627632" cy="2065388"/>
+          </a:xfrm>
+          <a:prstGeom prst="rect">
+            <a:avLst/>
+          </a:prstGeom>
+          <a:solidFill>
+            <a:srgbClr val="1D8900">
+              <a:alpha val="9804"/>
+            </a:srgbClr>
+          </a:solidFill>
+          <a:ln w="12700">
+            <a:noFill/>
+            <a:prstDash val="solid"/>
+          </a:ln>
+        </p:spPr>
+        <p:style>
+          <a:lnRef idx="2">
+            <a:schemeClr val="accent1">
+              <a:shade val="50000"/>
+            </a:schemeClr>
+          </a:lnRef>
+          <a:fillRef idx="1">
+            <a:schemeClr val="accent1"/>
+          </a:fillRef>
+          <a:effectRef idx="0">
+            <a:schemeClr val="accent1"/>
+          </a:effectRef>
+          <a:fontRef idx="minor">
+            <a:schemeClr val="lt1"/>
+          </a:fontRef>
+        </p:style>
+        <p:txBody>
+          <a:bodyPr rot="0" spcFirstLastPara="0" vertOverflow="overflow" horzOverflow="overflow" vert="horz" wrap="square" lIns="338328" tIns="45720" rIns="91440" bIns="45720" numCol="1" spcCol="0" rtlCol="0" fromWordArt="0" anchor="t" anchorCtr="0" forceAA="0" compatLnSpc="1">
+            <a:prstTxWarp prst="textNoShape">
+              <a:avLst/>
+            </a:prstTxWarp>
+            <a:noAutofit/>
+          </a:bodyPr>
+          <a:lstStyle/>
+          <a:p>
+            <a:pPr algn="l"/>
+            <a:r>
+              <a:rPr lang="en-US" sz="1200" dirty="0">
+                <a:solidFill>
+                  <a:srgbClr val="1E8900"/>
+                </a:solidFill>
+                <a:latin typeface="Arial" panose="020B0604020202020204" pitchFamily="34" charset="0"/>
+                <a:cs typeface="Arial" panose="020B0604020202020204" pitchFamily="34" charset="0"/>
+              </a:rPr>
+              <a:t>Public subnet</a:t>
+            </a:r>
+          </a:p>
+        </p:txBody>
+      </p:sp>
+      <p:pic>
+        <p:nvPicPr>
+          <p:cNvPr id="37" name="Graphic 36">
+            <a:extLst>
+              <a:ext uri="{FF2B5EF4-FFF2-40B4-BE49-F238E27FC236}">
+                <a16:creationId xmlns:a16="http://schemas.microsoft.com/office/drawing/2014/main" id="{756BA681-A93E-434D-B654-6440C1188B57}"/>
+              </a:ext>
+            </a:extLst>
+          </p:cNvPr>
+          <p:cNvPicPr>
+            <a:picLocks noChangeAspect="1"/>
+          </p:cNvPicPr>
+          <p:nvPr/>
+        </p:nvPicPr>
+        <p:blipFill>
+          <a:blip r:embed="rId2">
+            <a:extLst>
+              <a:ext uri="{BEBA8EAE-BF5A-486C-A8C5-ECC9F3942E4B}">
+                <a14:imgProps xmlns:a14="http://schemas.microsoft.com/office/drawing/2010/main">
+                  <a14:imgLayer r:embed="rId3">
+                    <a14:imgEffect>
+                      <a14:artisticBlur/>
+                    </a14:imgEffect>
+                  </a14:imgLayer>
+                </a14:imgProps>
+              </a:ext>
+            </a:extLst>
+          </a:blip>
+          <a:stretch>
+            <a:fillRect/>
+          </a:stretch>
+        </p:blipFill>
+        <p:spPr>
+          <a:xfrm>
+            <a:off x="4784635" y="2593812"/>
+            <a:ext cx="469900" cy="469900"/>
+          </a:xfrm>
+          <a:prstGeom prst="rect">
+            <a:avLst/>
+          </a:prstGeom>
+          <a:effectLst>
+            <a:softEdge rad="0"/>
+          </a:effectLst>
+        </p:spPr>
+      </p:pic>
+      <p:sp>
+        <p:nvSpPr>
+          <p:cNvPr id="40" name="TextBox 39">
+            <a:extLst>
+              <a:ext uri="{FF2B5EF4-FFF2-40B4-BE49-F238E27FC236}">
+                <a16:creationId xmlns:a16="http://schemas.microsoft.com/office/drawing/2014/main" id="{4394DFF6-5686-E64D-849D-B0B9A63801B0}"/>
+              </a:ext>
+            </a:extLst>
+          </p:cNvPr>
+          <p:cNvSpPr txBox="1"/>
+          <p:nvPr/>
+        </p:nvSpPr>
+        <p:spPr>
+          <a:xfrm>
+            <a:off x="4517513" y="3063413"/>
+            <a:ext cx="1004144" cy="261610"/>
+          </a:xfrm>
+          <a:prstGeom prst="rect">
+            <a:avLst/>
+          </a:prstGeom>
+          <a:noFill/>
+        </p:spPr>
+        <p:txBody>
+          <a:bodyPr wrap="square" rtlCol="0">
+            <a:spAutoFit/>
+          </a:bodyPr>
+          <a:lstStyle/>
+          <a:p>
+            <a:pPr algn="ctr"/>
+            <a:r>
+              <a:rPr lang="en-US" sz="1100" dirty="0">
+                <a:latin typeface="Arial" panose="020B0604020202020204" pitchFamily="34" charset="0"/>
+                <a:cs typeface="Arial" panose="020B0604020202020204" pitchFamily="34" charset="0"/>
+              </a:rPr>
+              <a:t>RD Gateway</a:t>
+            </a:r>
+          </a:p>
+        </p:txBody>
+      </p:sp>
+      <p:sp>
+        <p:nvSpPr>
+          <p:cNvPr id="10" name="Rectangle 9">
+            <a:extLst>
+              <a:ext uri="{FF2B5EF4-FFF2-40B4-BE49-F238E27FC236}">
+                <a16:creationId xmlns:a16="http://schemas.microsoft.com/office/drawing/2014/main" id="{97470CE0-BF03-6A48-90D5-E9FD99948C96}"/>
+              </a:ext>
+            </a:extLst>
+          </p:cNvPr>
+          <p:cNvSpPr/>
+          <p:nvPr/>
+        </p:nvSpPr>
+        <p:spPr>
+          <a:xfrm>
+            <a:off x="930848" y="1346092"/>
+            <a:ext cx="1625917" cy="2065388"/>
+          </a:xfrm>
+          <a:prstGeom prst="rect">
+            <a:avLst/>
+          </a:prstGeom>
+          <a:solidFill>
+            <a:srgbClr val="1D8900">
+              <a:alpha val="9804"/>
+            </a:srgbClr>
+          </a:solidFill>
+          <a:ln w="12700">
+            <a:noFill/>
+            <a:prstDash val="solid"/>
+          </a:ln>
+        </p:spPr>
+        <p:style>
+          <a:lnRef idx="2">
+            <a:schemeClr val="accent1">
+              <a:shade val="50000"/>
+            </a:schemeClr>
+          </a:lnRef>
+          <a:fillRef idx="1">
+            <a:schemeClr val="accent1"/>
+          </a:fillRef>
+          <a:effectRef idx="0">
+            <a:schemeClr val="accent1"/>
+          </a:effectRef>
+          <a:fontRef idx="minor">
+            <a:schemeClr val="lt1"/>
+          </a:fontRef>
+        </p:style>
+        <p:txBody>
+          <a:bodyPr rot="0" spcFirstLastPara="0" vertOverflow="overflow" horzOverflow="overflow" vert="horz" wrap="square" lIns="338328" tIns="45720" rIns="91440" bIns="45720" numCol="1" spcCol="0" rtlCol="0" fromWordArt="0" anchor="t" anchorCtr="0" forceAA="0" compatLnSpc="1">
+            <a:prstTxWarp prst="textNoShape">
+              <a:avLst/>
+            </a:prstTxWarp>
+            <a:noAutofit/>
+          </a:bodyPr>
+          <a:lstStyle/>
+          <a:p>
+            <a:pPr algn="l"/>
+            <a:r>
+              <a:rPr lang="en-US" sz="1200" dirty="0">
+                <a:solidFill>
+                  <a:srgbClr val="1E8900"/>
+                </a:solidFill>
+                <a:latin typeface="Arial" panose="020B0604020202020204" pitchFamily="34" charset="0"/>
+                <a:cs typeface="Arial" panose="020B0604020202020204" pitchFamily="34" charset="0"/>
+              </a:rPr>
+              <a:t>Public subnet</a:t>
+            </a:r>
+          </a:p>
+        </p:txBody>
+      </p:sp>
+      <p:sp>
+        <p:nvSpPr>
+          <p:cNvPr id="2" name="Rectangle 1">
+            <a:extLst>
+              <a:ext uri="{FF2B5EF4-FFF2-40B4-BE49-F238E27FC236}">
+                <a16:creationId xmlns:a16="http://schemas.microsoft.com/office/drawing/2014/main" id="{90D38B4F-D429-7841-A9AC-908EF32195EA}"/>
+              </a:ext>
+            </a:extLst>
+          </p:cNvPr>
+          <p:cNvSpPr/>
+          <p:nvPr/>
+        </p:nvSpPr>
+        <p:spPr>
+          <a:xfrm>
+            <a:off x="371797" y="978749"/>
+            <a:ext cx="7891745" cy="5218852"/>
+          </a:xfrm>
+          <a:prstGeom prst="rect">
+            <a:avLst/>
+          </a:prstGeom>
+          <a:noFill/>
+          <a:ln w="12700">
+            <a:solidFill>
+              <a:srgbClr val="1E8900"/>
+            </a:solidFill>
+          </a:ln>
+        </p:spPr>
+        <p:style>
+          <a:lnRef idx="2">
+            <a:schemeClr val="accent1">
+              <a:shade val="50000"/>
+            </a:schemeClr>
+          </a:lnRef>
+          <a:fillRef idx="1">
+            <a:schemeClr val="accent1"/>
+          </a:fillRef>
+          <a:effectRef idx="0">
+            <a:schemeClr val="accent1"/>
+          </a:effectRef>
+          <a:fontRef idx="minor">
+            <a:schemeClr val="lt1"/>
+          </a:fontRef>
+        </p:style>
+        <p:txBody>
+          <a:bodyPr rot="0" spcFirstLastPara="0" vertOverflow="overflow" horzOverflow="overflow" vert="horz" wrap="square" lIns="457200" tIns="91440" rIns="91440" bIns="45720" numCol="1" spcCol="0" rtlCol="0" fromWordArt="0" anchor="t" anchorCtr="0" forceAA="0" compatLnSpc="1">
+            <a:prstTxWarp prst="textNoShape">
+              <a:avLst/>
+            </a:prstTxWarp>
+            <a:noAutofit/>
+          </a:bodyPr>
+          <a:lstStyle/>
+          <a:p>
+            <a:pPr algn="l"/>
+            <a:r>
+              <a:rPr lang="en-US" sz="1200" dirty="0">
+                <a:ln w="0"/>
+                <a:solidFill>
+                  <a:srgbClr val="1E8900"/>
+                </a:solidFill>
+                <a:latin typeface="Arial" panose="020B0604020202020204" pitchFamily="34" charset="0"/>
+                <a:cs typeface="Arial" panose="020B0604020202020204" pitchFamily="34" charset="0"/>
+              </a:rPr>
+              <a:t>VPC</a:t>
+            </a:r>
+          </a:p>
+        </p:txBody>
+      </p:sp>
+      <p:sp>
+        <p:nvSpPr>
+          <p:cNvPr id="3" name="Rectangle 2">
+            <a:extLst>
+              <a:ext uri="{FF2B5EF4-FFF2-40B4-BE49-F238E27FC236}">
+                <a16:creationId xmlns:a16="http://schemas.microsoft.com/office/drawing/2014/main" id="{C2F65D24-7DB6-A147-BECA-9EA935B27F20}"/>
+              </a:ext>
+            </a:extLst>
+          </p:cNvPr>
+          <p:cNvSpPr/>
+          <p:nvPr/>
+        </p:nvSpPr>
+        <p:spPr>
+          <a:xfrm>
+            <a:off x="934551" y="3562086"/>
+            <a:ext cx="1627632" cy="1797904"/>
+          </a:xfrm>
+          <a:prstGeom prst="rect">
+            <a:avLst/>
+          </a:prstGeom>
+          <a:solidFill>
+            <a:srgbClr val="007CBC">
+              <a:alpha val="9804"/>
+            </a:srgbClr>
+          </a:solidFill>
+          <a:ln w="12700">
+            <a:noFill/>
+            <a:prstDash val="solid"/>
+          </a:ln>
+        </p:spPr>
+        <p:style>
+          <a:lnRef idx="2">
+            <a:schemeClr val="accent1">
+              <a:shade val="50000"/>
+            </a:schemeClr>
+          </a:lnRef>
+          <a:fillRef idx="1">
+            <a:schemeClr val="accent1"/>
+          </a:fillRef>
+          <a:effectRef idx="0">
+            <a:schemeClr val="accent1"/>
+          </a:effectRef>
+          <a:fontRef idx="minor">
+            <a:schemeClr val="lt1"/>
+          </a:fontRef>
+        </p:style>
+        <p:txBody>
+          <a:bodyPr rot="0" spcFirstLastPara="0" vertOverflow="overflow" horzOverflow="overflow" vert="horz" wrap="square" lIns="338328" tIns="45720" rIns="91440" bIns="45720" numCol="1" spcCol="0" rtlCol="0" fromWordArt="0" anchor="t" anchorCtr="0" forceAA="0" compatLnSpc="1">
+            <a:prstTxWarp prst="textNoShape">
+              <a:avLst/>
+            </a:prstTxWarp>
+            <a:noAutofit/>
+          </a:bodyPr>
+          <a:lstStyle/>
+          <a:p>
+            <a:pPr algn="l"/>
+            <a:r>
+              <a:rPr lang="en-US" sz="1200" dirty="0">
+                <a:solidFill>
+                  <a:srgbClr val="007DBC"/>
+                </a:solidFill>
+                <a:latin typeface="Arial" panose="020B0604020202020204" pitchFamily="34" charset="0"/>
+                <a:cs typeface="Arial" panose="020B0604020202020204" pitchFamily="34" charset="0"/>
+              </a:rPr>
+              <a:t>Private subnet</a:t>
+            </a:r>
+          </a:p>
+        </p:txBody>
+      </p:sp>
+      <p:sp>
+        <p:nvSpPr>
+          <p:cNvPr id="4" name="Rectangle 3">
+            <a:extLst>
+              <a:ext uri="{FF2B5EF4-FFF2-40B4-BE49-F238E27FC236}">
+                <a16:creationId xmlns:a16="http://schemas.microsoft.com/office/drawing/2014/main" id="{A89417FC-56D4-E941-8CC3-E9F8FACFB63F}"/>
+              </a:ext>
+            </a:extLst>
+          </p:cNvPr>
+          <p:cNvSpPr/>
+          <p:nvPr/>
+        </p:nvSpPr>
+        <p:spPr>
+          <a:xfrm>
+            <a:off x="184010" y="172373"/>
+            <a:ext cx="9588166" cy="6236894"/>
+          </a:xfrm>
+          <a:prstGeom prst="rect">
+            <a:avLst/>
+          </a:prstGeom>
+          <a:noFill/>
+          <a:ln w="12700">
+            <a:solidFill>
+              <a:schemeClr val="tx1"/>
+            </a:solidFill>
+          </a:ln>
+        </p:spPr>
+        <p:style>
+          <a:lnRef idx="2">
+            <a:schemeClr val="accent1">
+              <a:shade val="50000"/>
+            </a:schemeClr>
+          </a:lnRef>
+          <a:fillRef idx="1">
+            <a:schemeClr val="accent1"/>
+          </a:fillRef>
+          <a:effectRef idx="0">
+            <a:schemeClr val="accent1"/>
+          </a:effectRef>
+          <a:fontRef idx="minor">
+            <a:schemeClr val="lt1"/>
+          </a:fontRef>
+        </p:style>
+        <p:txBody>
+          <a:bodyPr rot="0" spcFirstLastPara="0" vertOverflow="overflow" horzOverflow="overflow" vert="horz" wrap="square" lIns="457200" tIns="91440" rIns="91440" bIns="45720" numCol="1" spcCol="0" rtlCol="0" fromWordArt="0" anchor="t" anchorCtr="0" forceAA="0" compatLnSpc="1">
+            <a:prstTxWarp prst="textNoShape">
+              <a:avLst/>
+            </a:prstTxWarp>
+            <a:noAutofit/>
+          </a:bodyPr>
+          <a:lstStyle/>
+          <a:p>
+            <a:pPr algn="l"/>
+            <a:r>
+              <a:rPr lang="en-US" sz="1200" dirty="0">
+                <a:solidFill>
+                  <a:sysClr val="windowText" lastClr="000000"/>
+                </a:solidFill>
+                <a:latin typeface="Arial" panose="020B0604020202020204" pitchFamily="34" charset="0"/>
+                <a:cs typeface="Arial" panose="020B0604020202020204" pitchFamily="34" charset="0"/>
+              </a:rPr>
+              <a:t>AWS Cloud</a:t>
+            </a:r>
+          </a:p>
+        </p:txBody>
+      </p:sp>
+      <p:sp>
+        <p:nvSpPr>
+          <p:cNvPr id="5" name="Rectangle 4">
+            <a:extLst>
+              <a:ext uri="{FF2B5EF4-FFF2-40B4-BE49-F238E27FC236}">
+                <a16:creationId xmlns:a16="http://schemas.microsoft.com/office/drawing/2014/main" id="{36F59100-3334-F144-A4DB-28B6FDAB4FFC}"/>
+              </a:ext>
+            </a:extLst>
+          </p:cNvPr>
+          <p:cNvSpPr/>
+          <p:nvPr/>
+        </p:nvSpPr>
+        <p:spPr>
+          <a:xfrm>
+            <a:off x="779424" y="619973"/>
+            <a:ext cx="1938438" cy="5694838"/>
+          </a:xfrm>
+          <a:prstGeom prst="rect">
+            <a:avLst/>
+          </a:prstGeom>
+          <a:noFill/>
+          <a:ln w="12700">
+            <a:solidFill>
+              <a:srgbClr val="007DBC"/>
+            </a:solidFill>
+            <a:prstDash val="dash"/>
+          </a:ln>
+        </p:spPr>
+        <p:style>
+          <a:lnRef idx="2">
+            <a:schemeClr val="accent1">
+              <a:shade val="50000"/>
+            </a:schemeClr>
+          </a:lnRef>
+          <a:fillRef idx="1">
+            <a:schemeClr val="accent1"/>
+          </a:fillRef>
+          <a:effectRef idx="0">
+            <a:schemeClr val="accent1"/>
+          </a:effectRef>
+          <a:fontRef idx="minor">
+            <a:schemeClr val="lt1"/>
+          </a:fontRef>
+        </p:style>
+        <p:txBody>
+          <a:bodyPr rot="0" spcFirstLastPara="0" vertOverflow="overflow" horzOverflow="overflow" vert="horz" wrap="square" lIns="91440" tIns="91440" rIns="91440" bIns="45720" numCol="1" spcCol="0" rtlCol="0" fromWordArt="0" anchor="t" anchorCtr="0" forceAA="0" compatLnSpc="1">
+            <a:prstTxWarp prst="textNoShape">
+              <a:avLst/>
+            </a:prstTxWarp>
+            <a:noAutofit/>
+          </a:bodyPr>
+          <a:lstStyle/>
+          <a:p>
+            <a:pPr algn="ctr"/>
+            <a:r>
+              <a:rPr lang="en-US" sz="1200" dirty="0">
+                <a:solidFill>
+                  <a:srgbClr val="007DBC"/>
+                </a:solidFill>
+                <a:latin typeface="Arial" panose="020B0604020202020204" pitchFamily="34" charset="0"/>
+                <a:cs typeface="Arial" panose="020B0604020202020204" pitchFamily="34" charset="0"/>
+              </a:rPr>
+              <a:t>Availability Zone 1</a:t>
+            </a:r>
+          </a:p>
+        </p:txBody>
+      </p:sp>
+      <p:pic>
+        <p:nvPicPr>
+          <p:cNvPr id="7" name="Graphic 6">
+            <a:extLst>
+              <a:ext uri="{FF2B5EF4-FFF2-40B4-BE49-F238E27FC236}">
+                <a16:creationId xmlns:a16="http://schemas.microsoft.com/office/drawing/2014/main" id="{F87736BC-EF01-454C-A88E-546607A59719}"/>
+              </a:ext>
+            </a:extLst>
+          </p:cNvPr>
+          <p:cNvPicPr>
+            <a:picLocks noChangeAspect="1"/>
+          </p:cNvPicPr>
+          <p:nvPr/>
+        </p:nvPicPr>
+        <p:blipFill>
+          <a:blip r:embed="rId4">
+            <a:extLst>
+              <a:ext uri="{96DAC541-7B7A-43D3-8B79-37D633B846F1}">
+                <asvg:svgBlip xmlns:asvg="http://schemas.microsoft.com/office/drawing/2016/SVG/main" r:embed="rId5"/>
+              </a:ext>
+            </a:extLst>
+          </a:blip>
+          <a:stretch>
+            <a:fillRect/>
+          </a:stretch>
+        </p:blipFill>
+        <p:spPr>
+          <a:xfrm>
+            <a:off x="3229309" y="2503942"/>
+            <a:ext cx="330200" cy="330200"/>
+          </a:xfrm>
+          <a:prstGeom prst="rect">
+            <a:avLst/>
+          </a:prstGeom>
+        </p:spPr>
+      </p:pic>
+      <p:pic>
+        <p:nvPicPr>
+          <p:cNvPr id="8" name="Graphic 7">
+            <a:extLst>
+              <a:ext uri="{FF2B5EF4-FFF2-40B4-BE49-F238E27FC236}">
+                <a16:creationId xmlns:a16="http://schemas.microsoft.com/office/drawing/2014/main" id="{8C52EDEC-608A-7244-9C8E-3B1D5D0558B6}"/>
+              </a:ext>
+            </a:extLst>
+          </p:cNvPr>
+          <p:cNvPicPr>
+            <a:picLocks noChangeAspect="1"/>
+          </p:cNvPicPr>
+          <p:nvPr/>
+        </p:nvPicPr>
+        <p:blipFill>
+          <a:blip r:embed="rId6">
+            <a:extLst>
+              <a:ext uri="{96DAC541-7B7A-43D3-8B79-37D633B846F1}">
+                <asvg:svgBlip xmlns:asvg="http://schemas.microsoft.com/office/drawing/2016/SVG/main" r:embed="rId7"/>
+              </a:ext>
+            </a:extLst>
+          </a:blip>
+          <a:stretch>
+            <a:fillRect/>
+          </a:stretch>
+        </p:blipFill>
+        <p:spPr>
+          <a:xfrm>
+            <a:off x="184011" y="172373"/>
+            <a:ext cx="330200" cy="330200"/>
+          </a:xfrm>
+          <a:prstGeom prst="rect">
+            <a:avLst/>
+          </a:prstGeom>
+        </p:spPr>
+      </p:pic>
+      <p:pic>
+        <p:nvPicPr>
+          <p:cNvPr id="9" name="Graphic 8">
+            <a:extLst>
+              <a:ext uri="{FF2B5EF4-FFF2-40B4-BE49-F238E27FC236}">
+                <a16:creationId xmlns:a16="http://schemas.microsoft.com/office/drawing/2014/main" id="{011BCAE1-B92B-7840-9563-921CE65285D8}"/>
+              </a:ext>
+            </a:extLst>
+          </p:cNvPr>
+          <p:cNvPicPr>
+            <a:picLocks noChangeAspect="1"/>
+          </p:cNvPicPr>
+          <p:nvPr/>
+        </p:nvPicPr>
+        <p:blipFill>
+          <a:blip r:embed="rId8">
+            <a:extLst>
+              <a:ext uri="{96DAC541-7B7A-43D3-8B79-37D633B846F1}">
+                <asvg:svgBlip xmlns:asvg="http://schemas.microsoft.com/office/drawing/2016/SVG/main" r:embed="rId9"/>
+              </a:ext>
+            </a:extLst>
+          </a:blip>
+          <a:stretch>
+            <a:fillRect/>
+          </a:stretch>
+        </p:blipFill>
+        <p:spPr>
+          <a:xfrm>
+            <a:off x="371796" y="980233"/>
+            <a:ext cx="330200" cy="330200"/>
+          </a:xfrm>
+          <a:prstGeom prst="rect">
+            <a:avLst/>
+          </a:prstGeom>
+        </p:spPr>
+      </p:pic>
+      <p:pic>
+        <p:nvPicPr>
+          <p:cNvPr id="11" name="Graphic 10">
+            <a:extLst>
+              <a:ext uri="{FF2B5EF4-FFF2-40B4-BE49-F238E27FC236}">
+                <a16:creationId xmlns:a16="http://schemas.microsoft.com/office/drawing/2014/main" id="{A27495A7-D781-034C-BC9D-AE77455948A6}"/>
+              </a:ext>
+            </a:extLst>
+          </p:cNvPr>
+          <p:cNvPicPr>
+            <a:picLocks noChangeAspect="1"/>
+          </p:cNvPicPr>
+          <p:nvPr/>
+        </p:nvPicPr>
+        <p:blipFill>
+          <a:blip r:embed="rId10">
+            <a:extLst>
+              <a:ext uri="{96DAC541-7B7A-43D3-8B79-37D633B846F1}">
+                <asvg:svgBlip xmlns:asvg="http://schemas.microsoft.com/office/drawing/2016/SVG/main" r:embed="rId11"/>
+              </a:ext>
+            </a:extLst>
+          </a:blip>
+          <a:stretch>
+            <a:fillRect/>
+          </a:stretch>
+        </p:blipFill>
+        <p:spPr>
+          <a:xfrm>
+            <a:off x="930848" y="1343733"/>
+            <a:ext cx="274320" cy="274320"/>
+          </a:xfrm>
+          <a:prstGeom prst="rect">
+            <a:avLst/>
+          </a:prstGeom>
+        </p:spPr>
+      </p:pic>
+      <p:pic>
+        <p:nvPicPr>
+          <p:cNvPr id="12" name="Graphic 11">
+            <a:extLst>
+              <a:ext uri="{FF2B5EF4-FFF2-40B4-BE49-F238E27FC236}">
+                <a16:creationId xmlns:a16="http://schemas.microsoft.com/office/drawing/2014/main" id="{6DF2F2BD-5D9A-8046-A860-3517B0AB2957}"/>
+              </a:ext>
+            </a:extLst>
+          </p:cNvPr>
+          <p:cNvPicPr>
+            <a:picLocks noChangeAspect="1"/>
+          </p:cNvPicPr>
+          <p:nvPr/>
+        </p:nvPicPr>
+        <p:blipFill>
+          <a:blip r:embed="rId12">
+            <a:extLst>
+              <a:ext uri="{96DAC541-7B7A-43D3-8B79-37D633B846F1}">
+                <asvg:svgBlip xmlns:asvg="http://schemas.microsoft.com/office/drawing/2016/SVG/main" r:embed="rId13"/>
+              </a:ext>
+            </a:extLst>
+          </a:blip>
+          <a:stretch>
+            <a:fillRect/>
+          </a:stretch>
+        </p:blipFill>
+        <p:spPr>
+          <a:xfrm>
+            <a:off x="934552" y="3571820"/>
+            <a:ext cx="274320" cy="274320"/>
+          </a:xfrm>
+          <a:prstGeom prst="rect">
+            <a:avLst/>
+          </a:prstGeom>
+        </p:spPr>
+      </p:pic>
+      <p:sp>
+        <p:nvSpPr>
+          <p:cNvPr id="13" name="TextBox 12">
+            <a:extLst>
+              <a:ext uri="{FF2B5EF4-FFF2-40B4-BE49-F238E27FC236}">
+                <a16:creationId xmlns:a16="http://schemas.microsoft.com/office/drawing/2014/main" id="{D4EA7CF5-5EB1-1445-865B-A3E5D58F02AD}"/>
+              </a:ext>
+            </a:extLst>
+          </p:cNvPr>
+          <p:cNvSpPr txBox="1"/>
+          <p:nvPr/>
+        </p:nvSpPr>
+        <p:spPr>
+          <a:xfrm>
+            <a:off x="1244761" y="2173684"/>
+            <a:ext cx="1035183" cy="261610"/>
+          </a:xfrm>
+          <a:prstGeom prst="rect">
+            <a:avLst/>
+          </a:prstGeom>
+          <a:noFill/>
+        </p:spPr>
+        <p:txBody>
+          <a:bodyPr wrap="square" rtlCol="0">
+            <a:spAutoFit/>
+          </a:bodyPr>
+          <a:lstStyle/>
+          <a:p>
+            <a:pPr algn="ctr"/>
+            <a:r>
+              <a:rPr lang="en-US" sz="1100" dirty="0">
+                <a:latin typeface="Arial" panose="020B0604020202020204" pitchFamily="34" charset="0"/>
+                <a:cs typeface="Arial" panose="020B0604020202020204" pitchFamily="34" charset="0"/>
+              </a:rPr>
+              <a:t>NAT gateway</a:t>
+            </a:r>
+          </a:p>
+        </p:txBody>
+      </p:sp>
+      <p:pic>
+        <p:nvPicPr>
+          <p:cNvPr id="14" name="Graphic 13">
+            <a:extLst>
+              <a:ext uri="{FF2B5EF4-FFF2-40B4-BE49-F238E27FC236}">
+                <a16:creationId xmlns:a16="http://schemas.microsoft.com/office/drawing/2014/main" id="{6027A170-9F7D-154D-9BDC-7C83139E50CF}"/>
+              </a:ext>
+            </a:extLst>
+          </p:cNvPr>
+          <p:cNvPicPr>
+            <a:picLocks noChangeAspect="1"/>
+          </p:cNvPicPr>
+          <p:nvPr/>
+        </p:nvPicPr>
+        <p:blipFill>
+          <a:blip r:embed="rId14">
+            <a:extLst>
+              <a:ext uri="{96DAC541-7B7A-43D3-8B79-37D633B846F1}">
+                <asvg:svgBlip xmlns:asvg="http://schemas.microsoft.com/office/drawing/2016/SVG/main" r:embed="rId15"/>
+              </a:ext>
+            </a:extLst>
+          </a:blip>
+          <a:stretch>
+            <a:fillRect/>
+          </a:stretch>
+        </p:blipFill>
+        <p:spPr>
+          <a:xfrm>
+            <a:off x="1527402" y="1696278"/>
+            <a:ext cx="469900" cy="469900"/>
+          </a:xfrm>
+          <a:prstGeom prst="rect">
+            <a:avLst/>
+          </a:prstGeom>
+        </p:spPr>
+      </p:pic>
+      <p:pic>
+        <p:nvPicPr>
+          <p:cNvPr id="15" name="Graphic 14">
+            <a:extLst>
+              <a:ext uri="{FF2B5EF4-FFF2-40B4-BE49-F238E27FC236}">
+                <a16:creationId xmlns:a16="http://schemas.microsoft.com/office/drawing/2014/main" id="{C286F45A-451D-824E-ACAD-79A90C040B73}"/>
+              </a:ext>
+            </a:extLst>
+          </p:cNvPr>
+          <p:cNvPicPr>
+            <a:picLocks noChangeAspect="1"/>
+          </p:cNvPicPr>
+          <p:nvPr/>
+        </p:nvPicPr>
+        <p:blipFill>
+          <a:blip r:embed="rId16">
+            <a:extLst>
+              <a:ext uri="{96DAC541-7B7A-43D3-8B79-37D633B846F1}">
+                <asvg:svgBlip xmlns:asvg="http://schemas.microsoft.com/office/drawing/2016/SVG/main" r:embed="rId17"/>
+              </a:ext>
+            </a:extLst>
+          </a:blip>
+          <a:stretch>
+            <a:fillRect/>
+          </a:stretch>
+        </p:blipFill>
+        <p:spPr>
+          <a:xfrm>
+            <a:off x="1527402" y="2593812"/>
+            <a:ext cx="469900" cy="469900"/>
+          </a:xfrm>
+          <a:prstGeom prst="rect">
+            <a:avLst/>
+          </a:prstGeom>
+        </p:spPr>
+      </p:pic>
+      <p:sp>
+        <p:nvSpPr>
+          <p:cNvPr id="18" name="TextBox 17">
+            <a:extLst>
+              <a:ext uri="{FF2B5EF4-FFF2-40B4-BE49-F238E27FC236}">
+                <a16:creationId xmlns:a16="http://schemas.microsoft.com/office/drawing/2014/main" id="{E86B4EF8-8467-EA40-B547-0B08490E5C82}"/>
+              </a:ext>
+            </a:extLst>
+          </p:cNvPr>
+          <p:cNvSpPr txBox="1"/>
+          <p:nvPr/>
+        </p:nvSpPr>
+        <p:spPr>
+          <a:xfrm>
+            <a:off x="1205168" y="3063413"/>
+            <a:ext cx="1140092" cy="266180"/>
+          </a:xfrm>
+          <a:prstGeom prst="rect">
+            <a:avLst/>
+          </a:prstGeom>
+          <a:noFill/>
+        </p:spPr>
+        <p:txBody>
+          <a:bodyPr wrap="square" rtlCol="0">
+            <a:spAutoFit/>
+          </a:bodyPr>
+          <a:lstStyle/>
+          <a:p>
+            <a:pPr algn="ctr"/>
+            <a:r>
+              <a:rPr lang="en-US" sz="1100" dirty="0">
+                <a:latin typeface="Arial" panose="020B0604020202020204" pitchFamily="34" charset="0"/>
+                <a:cs typeface="Arial" panose="020B0604020202020204" pitchFamily="34" charset="0"/>
+              </a:rPr>
+              <a:t>RD Gateway</a:t>
+            </a:r>
+          </a:p>
+        </p:txBody>
+      </p:sp>
+      <p:sp>
+        <p:nvSpPr>
+          <p:cNvPr id="31" name="Rectangle 30">
+            <a:extLst>
+              <a:ext uri="{FF2B5EF4-FFF2-40B4-BE49-F238E27FC236}">
+                <a16:creationId xmlns:a16="http://schemas.microsoft.com/office/drawing/2014/main" id="{C9AB2DA7-DA00-5D4A-9698-2A7EF6E082FE}"/>
+              </a:ext>
+            </a:extLst>
+          </p:cNvPr>
+          <p:cNvSpPr/>
+          <p:nvPr/>
+        </p:nvSpPr>
+        <p:spPr>
+          <a:xfrm>
+            <a:off x="4193727" y="3571875"/>
+            <a:ext cx="1627632" cy="1787525"/>
+          </a:xfrm>
+          <a:prstGeom prst="rect">
+            <a:avLst/>
+          </a:prstGeom>
+          <a:solidFill>
+            <a:srgbClr val="007CBC">
+              <a:alpha val="9804"/>
+            </a:srgbClr>
+          </a:solidFill>
+          <a:ln w="12700">
+            <a:noFill/>
+            <a:prstDash val="solid"/>
+          </a:ln>
+        </p:spPr>
+        <p:style>
+          <a:lnRef idx="2">
+            <a:schemeClr val="accent1">
+              <a:shade val="50000"/>
+            </a:schemeClr>
+          </a:lnRef>
+          <a:fillRef idx="1">
+            <a:schemeClr val="accent1"/>
+          </a:fillRef>
+          <a:effectRef idx="0">
+            <a:schemeClr val="accent1"/>
+          </a:effectRef>
+          <a:fontRef idx="minor">
+            <a:schemeClr val="lt1"/>
+          </a:fontRef>
+        </p:style>
+        <p:txBody>
+          <a:bodyPr rot="0" spcFirstLastPara="0" vertOverflow="overflow" horzOverflow="overflow" vert="horz" wrap="square" lIns="338328" tIns="45720" rIns="91440" bIns="45720" numCol="1" spcCol="0" rtlCol="0" fromWordArt="0" anchor="t" anchorCtr="0" forceAA="0" compatLnSpc="1">
+            <a:prstTxWarp prst="textNoShape">
+              <a:avLst/>
+            </a:prstTxWarp>
+            <a:noAutofit/>
+          </a:bodyPr>
+          <a:lstStyle/>
+          <a:p>
+            <a:pPr algn="l"/>
+            <a:r>
+              <a:rPr lang="en-US" sz="1200" dirty="0">
+                <a:solidFill>
+                  <a:srgbClr val="007DBC"/>
+                </a:solidFill>
+                <a:latin typeface="Arial" panose="020B0604020202020204" pitchFamily="34" charset="0"/>
+                <a:cs typeface="Arial" panose="020B0604020202020204" pitchFamily="34" charset="0"/>
+              </a:rPr>
+              <a:t>Private subnet</a:t>
+            </a:r>
+          </a:p>
+        </p:txBody>
+      </p:sp>
+      <p:sp>
+        <p:nvSpPr>
+          <p:cNvPr id="32" name="Rectangle 31">
+            <a:extLst>
+              <a:ext uri="{FF2B5EF4-FFF2-40B4-BE49-F238E27FC236}">
+                <a16:creationId xmlns:a16="http://schemas.microsoft.com/office/drawing/2014/main" id="{7096E968-AD7E-1745-89D5-3B7F86F5DD97}"/>
+              </a:ext>
+            </a:extLst>
+          </p:cNvPr>
+          <p:cNvSpPr/>
+          <p:nvPr/>
+        </p:nvSpPr>
+        <p:spPr>
+          <a:xfrm>
+            <a:off x="4038600" y="629763"/>
+            <a:ext cx="1938438" cy="5694838"/>
+          </a:xfrm>
+          <a:prstGeom prst="rect">
+            <a:avLst/>
+          </a:prstGeom>
+          <a:noFill/>
+          <a:ln w="12700">
+            <a:solidFill>
+              <a:srgbClr val="007DBC"/>
+            </a:solidFill>
+            <a:prstDash val="dash"/>
+          </a:ln>
+        </p:spPr>
+        <p:style>
+          <a:lnRef idx="2">
+            <a:schemeClr val="accent1">
+              <a:shade val="50000"/>
+            </a:schemeClr>
+          </a:lnRef>
+          <a:fillRef idx="1">
+            <a:schemeClr val="accent1"/>
+          </a:fillRef>
+          <a:effectRef idx="0">
+            <a:schemeClr val="accent1"/>
+          </a:effectRef>
+          <a:fontRef idx="minor">
+            <a:schemeClr val="lt1"/>
+          </a:fontRef>
+        </p:style>
+        <p:txBody>
+          <a:bodyPr rot="0" spcFirstLastPara="0" vertOverflow="overflow" horzOverflow="overflow" vert="horz" wrap="square" lIns="91440" tIns="91440" rIns="91440" bIns="45720" numCol="1" spcCol="0" rtlCol="0" fromWordArt="0" anchor="t" anchorCtr="0" forceAA="0" compatLnSpc="1">
+            <a:prstTxWarp prst="textNoShape">
+              <a:avLst/>
+            </a:prstTxWarp>
+            <a:noAutofit/>
+          </a:bodyPr>
+          <a:lstStyle/>
+          <a:p>
+            <a:pPr algn="ctr"/>
+            <a:r>
+              <a:rPr lang="en-US" sz="1200" dirty="0">
+                <a:solidFill>
+                  <a:srgbClr val="007DBC"/>
+                </a:solidFill>
+                <a:latin typeface="Arial" panose="020B0604020202020204" pitchFamily="34" charset="0"/>
+                <a:cs typeface="Arial" panose="020B0604020202020204" pitchFamily="34" charset="0"/>
+              </a:rPr>
+              <a:t>Availability Zone 2</a:t>
+            </a:r>
+          </a:p>
+        </p:txBody>
+      </p:sp>
+      <p:pic>
+        <p:nvPicPr>
+          <p:cNvPr id="33" name="Graphic 32">
+            <a:extLst>
+              <a:ext uri="{FF2B5EF4-FFF2-40B4-BE49-F238E27FC236}">
+                <a16:creationId xmlns:a16="http://schemas.microsoft.com/office/drawing/2014/main" id="{350585F2-7B67-FB44-A7D1-88EBE25B2918}"/>
+              </a:ext>
+            </a:extLst>
+          </p:cNvPr>
+          <p:cNvPicPr>
+            <a:picLocks noChangeAspect="1"/>
+          </p:cNvPicPr>
+          <p:nvPr/>
+        </p:nvPicPr>
+        <p:blipFill>
+          <a:blip r:embed="rId10">
+            <a:extLst>
+              <a:ext uri="{96DAC541-7B7A-43D3-8B79-37D633B846F1}">
+                <asvg:svgBlip xmlns:asvg="http://schemas.microsoft.com/office/drawing/2016/SVG/main" r:embed="rId11"/>
+              </a:ext>
+            </a:extLst>
+          </a:blip>
+          <a:stretch>
+            <a:fillRect/>
+          </a:stretch>
+        </p:blipFill>
+        <p:spPr>
+          <a:xfrm>
+            <a:off x="4190024" y="1353523"/>
+            <a:ext cx="274320" cy="274320"/>
+          </a:xfrm>
+          <a:prstGeom prst="rect">
+            <a:avLst/>
+          </a:prstGeom>
+        </p:spPr>
+      </p:pic>
+      <p:pic>
+        <p:nvPicPr>
+          <p:cNvPr id="34" name="Graphic 33">
+            <a:extLst>
+              <a:ext uri="{FF2B5EF4-FFF2-40B4-BE49-F238E27FC236}">
+                <a16:creationId xmlns:a16="http://schemas.microsoft.com/office/drawing/2014/main" id="{C776ABA9-5E64-204C-B51D-F2AB180851BE}"/>
+              </a:ext>
+            </a:extLst>
+          </p:cNvPr>
+          <p:cNvPicPr>
+            <a:picLocks noChangeAspect="1"/>
+          </p:cNvPicPr>
+          <p:nvPr/>
+        </p:nvPicPr>
+        <p:blipFill>
+          <a:blip r:embed="rId12">
+            <a:extLst>
+              <a:ext uri="{96DAC541-7B7A-43D3-8B79-37D633B846F1}">
+                <asvg:svgBlip xmlns:asvg="http://schemas.microsoft.com/office/drawing/2016/SVG/main" r:embed="rId13"/>
+              </a:ext>
+            </a:extLst>
+          </a:blip>
+          <a:stretch>
+            <a:fillRect/>
+          </a:stretch>
+        </p:blipFill>
+        <p:spPr>
+          <a:xfrm>
+            <a:off x="4193728" y="3581610"/>
+            <a:ext cx="274320" cy="274320"/>
+          </a:xfrm>
+          <a:prstGeom prst="rect">
+            <a:avLst/>
+          </a:prstGeom>
+        </p:spPr>
+      </p:pic>
+      <p:sp>
+        <p:nvSpPr>
+          <p:cNvPr id="45" name="Rectangle 44">
+            <a:extLst>
+              <a:ext uri="{FF2B5EF4-FFF2-40B4-BE49-F238E27FC236}">
+                <a16:creationId xmlns:a16="http://schemas.microsoft.com/office/drawing/2014/main" id="{20690DAB-75D7-F04A-AF99-72F7BEC7812F}"/>
+              </a:ext>
+            </a:extLst>
+          </p:cNvPr>
+          <p:cNvSpPr/>
+          <p:nvPr/>
+        </p:nvSpPr>
+        <p:spPr>
+          <a:xfrm>
+            <a:off x="1016000" y="2503942"/>
+            <a:ext cx="6908799" cy="835458"/>
+          </a:xfrm>
+          <a:prstGeom prst="rect">
+            <a:avLst/>
+          </a:prstGeom>
+          <a:noFill/>
+          <a:ln w="12700">
+            <a:solidFill>
+              <a:srgbClr val="D86613"/>
+            </a:solidFill>
+            <a:prstDash val="dash"/>
+          </a:ln>
+        </p:spPr>
+        <p:style>
+          <a:lnRef idx="2">
+            <a:schemeClr val="accent1">
+              <a:shade val="50000"/>
+            </a:schemeClr>
+          </a:lnRef>
+          <a:fillRef idx="1">
+            <a:schemeClr val="accent1"/>
+          </a:fillRef>
+          <a:effectRef idx="0">
+            <a:schemeClr val="accent1"/>
+          </a:effectRef>
+          <a:fontRef idx="minor">
+            <a:schemeClr val="lt1"/>
+          </a:fontRef>
+        </p:style>
+        <p:txBody>
+          <a:bodyPr rot="0" spcFirstLastPara="0" vertOverflow="overflow" horzOverflow="overflow" vert="horz" wrap="square" lIns="91440" tIns="91440" rIns="91440" bIns="45720" numCol="1" spcCol="0" rtlCol="0" fromWordArt="0" anchor="t" anchorCtr="0" forceAA="0" compatLnSpc="1">
+            <a:prstTxWarp prst="textNoShape">
+              <a:avLst/>
+            </a:prstTxWarp>
+            <a:noAutofit/>
+          </a:bodyPr>
+          <a:lstStyle/>
+          <a:p>
+            <a:pPr algn="ctr"/>
+            <a:endParaRPr lang="en-US" sz="1200" dirty="0">
+              <a:solidFill>
+                <a:srgbClr val="D86613"/>
+              </a:solidFill>
+              <a:latin typeface="Arial" panose="020B0604020202020204" pitchFamily="34" charset="0"/>
+              <a:cs typeface="Arial" panose="020B0604020202020204" pitchFamily="34" charset="0"/>
+            </a:endParaRPr>
+          </a:p>
+        </p:txBody>
+      </p:sp>
+      <p:sp>
+        <p:nvSpPr>
+          <p:cNvPr id="46" name="Rectangle 45">
+            <a:extLst>
+              <a:ext uri="{FF2B5EF4-FFF2-40B4-BE49-F238E27FC236}">
+                <a16:creationId xmlns:a16="http://schemas.microsoft.com/office/drawing/2014/main" id="{3D17EDEE-CE65-4447-A2E3-63BB12023B47}"/>
+              </a:ext>
+            </a:extLst>
+          </p:cNvPr>
+          <p:cNvSpPr/>
+          <p:nvPr/>
+        </p:nvSpPr>
+        <p:spPr>
+          <a:xfrm>
+            <a:off x="1016000" y="4020455"/>
+            <a:ext cx="6908800" cy="1225667"/>
+          </a:xfrm>
+          <a:prstGeom prst="rect">
+            <a:avLst/>
+          </a:prstGeom>
+          <a:noFill/>
+          <a:ln w="12700">
+            <a:solidFill>
+              <a:srgbClr val="5A6B86"/>
+            </a:solidFill>
+            <a:prstDash val="dash"/>
+          </a:ln>
+        </p:spPr>
+        <p:style>
+          <a:lnRef idx="2">
+            <a:schemeClr val="accent1">
+              <a:shade val="50000"/>
+            </a:schemeClr>
+          </a:lnRef>
+          <a:fillRef idx="1">
+            <a:schemeClr val="accent1"/>
+          </a:fillRef>
+          <a:effectRef idx="0">
+            <a:schemeClr val="accent1"/>
+          </a:effectRef>
+          <a:fontRef idx="minor">
+            <a:schemeClr val="lt1"/>
+          </a:fontRef>
+        </p:style>
+        <p:txBody>
+          <a:bodyPr rot="0" spcFirstLastPara="0" vertOverflow="overflow" horzOverflow="overflow" vert="horz" wrap="square" lIns="1828800" tIns="91440" rIns="91440" bIns="45720" numCol="1" spcCol="0" rtlCol="0" fromWordArt="0" anchor="t" anchorCtr="0" forceAA="0" compatLnSpc="1">
+            <a:prstTxWarp prst="textNoShape">
+              <a:avLst/>
+            </a:prstTxWarp>
+            <a:noAutofit/>
+          </a:bodyPr>
+          <a:lstStyle/>
+          <a:p>
+            <a:endParaRPr lang="en-US" sz="1200" dirty="0">
+              <a:solidFill>
+                <a:srgbClr val="5A6B86"/>
+              </a:solidFill>
+              <a:latin typeface="Arial" panose="020B0604020202020204" pitchFamily="34" charset="0"/>
+              <a:cs typeface="Arial" panose="020B0604020202020204" pitchFamily="34" charset="0"/>
+            </a:endParaRPr>
+          </a:p>
+        </p:txBody>
+      </p:sp>
+      <p:pic>
+        <p:nvPicPr>
+          <p:cNvPr id="50" name="Graphic 49">
+            <a:extLst>
+              <a:ext uri="{FF2B5EF4-FFF2-40B4-BE49-F238E27FC236}">
+                <a16:creationId xmlns:a16="http://schemas.microsoft.com/office/drawing/2014/main" id="{10123651-17B0-2A44-8CA4-B77BD7B2FA57}"/>
+              </a:ext>
+            </a:extLst>
+          </p:cNvPr>
+          <p:cNvPicPr>
+            <a:picLocks noChangeAspect="1"/>
+          </p:cNvPicPr>
+          <p:nvPr/>
+        </p:nvPicPr>
+        <p:blipFill>
+          <a:blip r:embed="rId18">
+            <a:extLst>
+              <a:ext uri="{96DAC541-7B7A-43D3-8B79-37D633B846F1}">
+                <asvg:svgBlip xmlns:asvg="http://schemas.microsoft.com/office/drawing/2016/SVG/main" r:embed="rId19"/>
+              </a:ext>
+            </a:extLst>
+          </a:blip>
+          <a:stretch>
+            <a:fillRect/>
+          </a:stretch>
+        </p:blipFill>
+        <p:spPr>
+          <a:xfrm>
+            <a:off x="1475481" y="4112134"/>
+            <a:ext cx="573743" cy="573743"/>
+          </a:xfrm>
+          <a:prstGeom prst="rect">
+            <a:avLst/>
+          </a:prstGeom>
+        </p:spPr>
+      </p:pic>
+      <p:pic>
+        <p:nvPicPr>
+          <p:cNvPr id="51" name="Graphic 50">
+            <a:extLst>
+              <a:ext uri="{FF2B5EF4-FFF2-40B4-BE49-F238E27FC236}">
+                <a16:creationId xmlns:a16="http://schemas.microsoft.com/office/drawing/2014/main" id="{9E199607-7A71-D842-BF36-F0C99179EC26}"/>
+              </a:ext>
+            </a:extLst>
+          </p:cNvPr>
+          <p:cNvPicPr>
+            <a:picLocks noChangeAspect="1"/>
+          </p:cNvPicPr>
+          <p:nvPr/>
+        </p:nvPicPr>
+        <p:blipFill>
+          <a:blip r:embed="rId18">
+            <a:extLst>
+              <a:ext uri="{96DAC541-7B7A-43D3-8B79-37D633B846F1}">
+                <asvg:svgBlip xmlns:asvg="http://schemas.microsoft.com/office/drawing/2016/SVG/main" r:embed="rId19"/>
+              </a:ext>
+            </a:extLst>
+          </a:blip>
+          <a:stretch>
+            <a:fillRect/>
+          </a:stretch>
+        </p:blipFill>
+        <p:spPr>
+          <a:xfrm>
+            <a:off x="4732714" y="4112134"/>
+            <a:ext cx="573743" cy="573743"/>
+          </a:xfrm>
+          <a:prstGeom prst="rect">
+            <a:avLst/>
+          </a:prstGeom>
+        </p:spPr>
+      </p:pic>
+      <p:sp>
+        <p:nvSpPr>
+          <p:cNvPr id="52" name="TextBox 51">
+            <a:extLst>
+              <a:ext uri="{FF2B5EF4-FFF2-40B4-BE49-F238E27FC236}">
+                <a16:creationId xmlns:a16="http://schemas.microsoft.com/office/drawing/2014/main" id="{D1302C80-B7EB-D248-900A-0DDAF4CD099C}"/>
+              </a:ext>
+            </a:extLst>
+          </p:cNvPr>
+          <p:cNvSpPr txBox="1"/>
+          <p:nvPr/>
+        </p:nvSpPr>
+        <p:spPr>
+          <a:xfrm>
+            <a:off x="986972" y="4691390"/>
+            <a:ext cx="1519549" cy="430887"/>
+          </a:xfrm>
+          <a:prstGeom prst="rect">
+            <a:avLst/>
+          </a:prstGeom>
+          <a:noFill/>
+        </p:spPr>
+        <p:txBody>
+          <a:bodyPr wrap="square" rtlCol="0">
+            <a:spAutoFit/>
+          </a:bodyPr>
+          <a:lstStyle/>
+          <a:p>
+            <a:pPr algn="ctr"/>
+            <a:r>
+              <a:rPr lang="en-US" sz="1100" dirty="0">
+                <a:latin typeface="Arial" panose="020B0604020202020204" pitchFamily="34" charset="0"/>
+                <a:cs typeface="Arial" panose="020B0604020202020204" pitchFamily="34" charset="0"/>
+              </a:rPr>
+              <a:t>SQL Server node 1 </a:t>
+            </a:r>
+            <a:br>
+              <a:rPr lang="en-US" sz="1100" dirty="0">
+                <a:latin typeface="Arial" panose="020B0604020202020204" pitchFamily="34" charset="0"/>
+                <a:cs typeface="Arial" panose="020B0604020202020204" pitchFamily="34" charset="0"/>
+              </a:rPr>
+            </a:br>
+            <a:r>
+              <a:rPr lang="en-US" sz="1100" dirty="0">
+                <a:latin typeface="Arial" panose="020B0604020202020204" pitchFamily="34" charset="0"/>
+                <a:cs typeface="Arial" panose="020B0604020202020204" pitchFamily="34" charset="0"/>
+              </a:rPr>
+              <a:t>with replica</a:t>
+            </a:r>
+          </a:p>
+        </p:txBody>
+      </p:sp>
+      <p:sp>
+        <p:nvSpPr>
+          <p:cNvPr id="53" name="TextBox 52">
+            <a:extLst>
+              <a:ext uri="{FF2B5EF4-FFF2-40B4-BE49-F238E27FC236}">
+                <a16:creationId xmlns:a16="http://schemas.microsoft.com/office/drawing/2014/main" id="{50219184-E6D6-5740-B4EF-30598FA614EA}"/>
+              </a:ext>
+            </a:extLst>
+          </p:cNvPr>
+          <p:cNvSpPr txBox="1"/>
+          <p:nvPr/>
+        </p:nvSpPr>
+        <p:spPr>
+          <a:xfrm>
+            <a:off x="4210418" y="4691390"/>
+            <a:ext cx="1589803" cy="430887"/>
+          </a:xfrm>
+          <a:prstGeom prst="rect">
+            <a:avLst/>
+          </a:prstGeom>
+          <a:noFill/>
+        </p:spPr>
+        <p:txBody>
+          <a:bodyPr wrap="square" rtlCol="0">
+            <a:spAutoFit/>
+          </a:bodyPr>
+          <a:lstStyle/>
+          <a:p>
+            <a:pPr algn="ctr"/>
+            <a:r>
+              <a:rPr lang="en-US" sz="1100" dirty="0">
+                <a:latin typeface="Arial" panose="020B0604020202020204" pitchFamily="34" charset="0"/>
+                <a:cs typeface="Arial" panose="020B0604020202020204" pitchFamily="34" charset="0"/>
+              </a:rPr>
+              <a:t>SQL Server node 2</a:t>
+            </a:r>
+            <a:br>
+              <a:rPr lang="en-US" sz="1100" dirty="0">
+                <a:latin typeface="Arial" panose="020B0604020202020204" pitchFamily="34" charset="0"/>
+                <a:cs typeface="Arial" panose="020B0604020202020204" pitchFamily="34" charset="0"/>
+              </a:rPr>
+            </a:br>
+            <a:r>
+              <a:rPr lang="en-US" sz="1100" dirty="0">
+                <a:latin typeface="Arial" panose="020B0604020202020204" pitchFamily="34" charset="0"/>
+                <a:cs typeface="Arial" panose="020B0604020202020204" pitchFamily="34" charset="0"/>
+              </a:rPr>
+              <a:t>with replica</a:t>
+            </a:r>
+          </a:p>
+        </p:txBody>
+      </p:sp>
+      <p:sp>
+        <p:nvSpPr>
+          <p:cNvPr id="39" name="Rectangle 38">
+            <a:extLst>
+              <a:ext uri="{FF2B5EF4-FFF2-40B4-BE49-F238E27FC236}">
+                <a16:creationId xmlns:a16="http://schemas.microsoft.com/office/drawing/2014/main" id="{D6FCA288-1691-2540-8A79-AEB6BC4CAB60}"/>
+              </a:ext>
+            </a:extLst>
+          </p:cNvPr>
+          <p:cNvSpPr/>
+          <p:nvPr/>
+        </p:nvSpPr>
+        <p:spPr>
+          <a:xfrm>
+            <a:off x="6387644" y="1355882"/>
+            <a:ext cx="1627632" cy="2065388"/>
+          </a:xfrm>
+          <a:prstGeom prst="rect">
+            <a:avLst/>
+          </a:prstGeom>
+          <a:solidFill>
+            <a:srgbClr val="1D8900">
+              <a:alpha val="9804"/>
+            </a:srgbClr>
+          </a:solidFill>
+          <a:ln w="12700">
+            <a:noFill/>
+            <a:prstDash val="solid"/>
+          </a:ln>
+        </p:spPr>
+        <p:style>
+          <a:lnRef idx="2">
+            <a:schemeClr val="accent1">
+              <a:shade val="50000"/>
+            </a:schemeClr>
+          </a:lnRef>
+          <a:fillRef idx="1">
+            <a:schemeClr val="accent1"/>
+          </a:fillRef>
+          <a:effectRef idx="0">
+            <a:schemeClr val="accent1"/>
+          </a:effectRef>
+          <a:fontRef idx="minor">
+            <a:schemeClr val="lt1"/>
+          </a:fontRef>
+        </p:style>
+        <p:txBody>
+          <a:bodyPr rot="0" spcFirstLastPara="0" vertOverflow="overflow" horzOverflow="overflow" vert="horz" wrap="square" lIns="338328" tIns="45720" rIns="91440" bIns="45720" numCol="1" spcCol="0" rtlCol="0" fromWordArt="0" anchor="t" anchorCtr="0" forceAA="0" compatLnSpc="1">
+            <a:prstTxWarp prst="textNoShape">
+              <a:avLst/>
+            </a:prstTxWarp>
+            <a:noAutofit/>
+          </a:bodyPr>
+          <a:lstStyle/>
+          <a:p>
+            <a:pPr algn="l"/>
+            <a:r>
+              <a:rPr lang="en-US" sz="1200" dirty="0">
+                <a:solidFill>
+                  <a:srgbClr val="1E8900"/>
+                </a:solidFill>
+                <a:latin typeface="Arial" panose="020B0604020202020204" pitchFamily="34" charset="0"/>
+                <a:cs typeface="Arial" panose="020B0604020202020204" pitchFamily="34" charset="0"/>
+              </a:rPr>
+              <a:t>Public subnet</a:t>
+            </a:r>
+          </a:p>
+        </p:txBody>
+      </p:sp>
+      <p:pic>
+        <p:nvPicPr>
+          <p:cNvPr id="43" name="Graphic 36">
+            <a:extLst>
+              <a:ext uri="{FF2B5EF4-FFF2-40B4-BE49-F238E27FC236}">
+                <a16:creationId xmlns:a16="http://schemas.microsoft.com/office/drawing/2014/main" id="{C4E4C284-FAB9-4B44-9F8C-32E1EAC8F019}"/>
+              </a:ext>
+            </a:extLst>
+          </p:cNvPr>
+          <p:cNvPicPr>
+            <a:picLocks noChangeAspect="1"/>
+          </p:cNvPicPr>
+          <p:nvPr/>
+        </p:nvPicPr>
+        <p:blipFill>
+          <a:blip r:embed="rId2">
+            <a:extLst>
+              <a:ext uri="{BEBA8EAE-BF5A-486C-A8C5-ECC9F3942E4B}">
+                <a14:imgProps xmlns:a14="http://schemas.microsoft.com/office/drawing/2010/main">
+                  <a14:imgLayer r:embed="rId3">
+                    <a14:imgEffect>
+                      <a14:artisticBlur/>
+                    </a14:imgEffect>
+                  </a14:imgLayer>
+                </a14:imgProps>
+              </a:ext>
+            </a:extLst>
+          </a:blip>
+          <a:stretch>
+            <a:fillRect/>
+          </a:stretch>
+        </p:blipFill>
+        <p:spPr>
+          <a:xfrm>
+            <a:off x="6966979" y="2593812"/>
+            <a:ext cx="469900" cy="469900"/>
+          </a:xfrm>
+          <a:prstGeom prst="rect">
+            <a:avLst/>
+          </a:prstGeom>
+          <a:effectLst>
+            <a:softEdge rad="0"/>
+          </a:effectLst>
+        </p:spPr>
+      </p:pic>
+      <p:sp>
+        <p:nvSpPr>
+          <p:cNvPr id="44" name="Rectangle 43">
+            <a:extLst>
+              <a:ext uri="{FF2B5EF4-FFF2-40B4-BE49-F238E27FC236}">
+                <a16:creationId xmlns:a16="http://schemas.microsoft.com/office/drawing/2014/main" id="{EAFEF44D-1B41-8042-A64F-D11FF8EC880D}"/>
+              </a:ext>
+            </a:extLst>
+          </p:cNvPr>
+          <p:cNvSpPr/>
+          <p:nvPr/>
+        </p:nvSpPr>
+        <p:spPr>
+          <a:xfrm>
+            <a:off x="6391347" y="3571875"/>
+            <a:ext cx="1627632" cy="1787525"/>
+          </a:xfrm>
+          <a:prstGeom prst="rect">
+            <a:avLst/>
+          </a:prstGeom>
+          <a:solidFill>
+            <a:srgbClr val="007CBC">
+              <a:alpha val="9804"/>
+            </a:srgbClr>
+          </a:solidFill>
+          <a:ln w="12700">
+            <a:noFill/>
+            <a:prstDash val="solid"/>
+          </a:ln>
+        </p:spPr>
+        <p:style>
+          <a:lnRef idx="2">
+            <a:schemeClr val="accent1">
+              <a:shade val="50000"/>
+            </a:schemeClr>
+          </a:lnRef>
+          <a:fillRef idx="1">
+            <a:schemeClr val="accent1"/>
+          </a:fillRef>
+          <a:effectRef idx="0">
+            <a:schemeClr val="accent1"/>
+          </a:effectRef>
+          <a:fontRef idx="minor">
+            <a:schemeClr val="lt1"/>
+          </a:fontRef>
+        </p:style>
+        <p:txBody>
+          <a:bodyPr rot="0" spcFirstLastPara="0" vertOverflow="overflow" horzOverflow="overflow" vert="horz" wrap="square" lIns="338328" tIns="45720" rIns="91440" bIns="45720" numCol="1" spcCol="0" rtlCol="0" fromWordArt="0" anchor="t" anchorCtr="0" forceAA="0" compatLnSpc="1">
+            <a:prstTxWarp prst="textNoShape">
+              <a:avLst/>
+            </a:prstTxWarp>
+            <a:noAutofit/>
+          </a:bodyPr>
+          <a:lstStyle/>
+          <a:p>
+            <a:pPr algn="l"/>
+            <a:r>
+              <a:rPr lang="en-US" sz="1200" dirty="0">
+                <a:solidFill>
+                  <a:srgbClr val="007DBC"/>
+                </a:solidFill>
+                <a:latin typeface="Arial" panose="020B0604020202020204" pitchFamily="34" charset="0"/>
+                <a:cs typeface="Arial" panose="020B0604020202020204" pitchFamily="34" charset="0"/>
+              </a:rPr>
+              <a:t>Private subnet</a:t>
+            </a:r>
+          </a:p>
+        </p:txBody>
+      </p:sp>
+      <p:sp>
+        <p:nvSpPr>
+          <p:cNvPr id="47" name="Rectangle 46">
+            <a:extLst>
+              <a:ext uri="{FF2B5EF4-FFF2-40B4-BE49-F238E27FC236}">
+                <a16:creationId xmlns:a16="http://schemas.microsoft.com/office/drawing/2014/main" id="{DBB90A93-5A97-BD4E-9960-C5CD5DF3ACA4}"/>
+              </a:ext>
+            </a:extLst>
+          </p:cNvPr>
+          <p:cNvSpPr/>
+          <p:nvPr/>
+        </p:nvSpPr>
+        <p:spPr>
+          <a:xfrm>
+            <a:off x="6236220" y="629763"/>
+            <a:ext cx="1933746" cy="5694838"/>
+          </a:xfrm>
+          <a:prstGeom prst="rect">
+            <a:avLst/>
+          </a:prstGeom>
+          <a:noFill/>
+          <a:ln w="12700">
+            <a:solidFill>
+              <a:srgbClr val="007DBC"/>
+            </a:solidFill>
+            <a:prstDash val="dash"/>
+          </a:ln>
+        </p:spPr>
+        <p:style>
+          <a:lnRef idx="2">
+            <a:schemeClr val="accent1">
+              <a:shade val="50000"/>
+            </a:schemeClr>
+          </a:lnRef>
+          <a:fillRef idx="1">
+            <a:schemeClr val="accent1"/>
+          </a:fillRef>
+          <a:effectRef idx="0">
+            <a:schemeClr val="accent1"/>
+          </a:effectRef>
+          <a:fontRef idx="minor">
+            <a:schemeClr val="lt1"/>
+          </a:fontRef>
+        </p:style>
+        <p:txBody>
+          <a:bodyPr rot="0" spcFirstLastPara="0" vertOverflow="overflow" horzOverflow="overflow" vert="horz" wrap="square" lIns="91440" tIns="91440" rIns="91440" bIns="45720" numCol="1" spcCol="0" rtlCol="0" fromWordArt="0" anchor="t" anchorCtr="0" forceAA="0" compatLnSpc="1">
+            <a:prstTxWarp prst="textNoShape">
+              <a:avLst/>
+            </a:prstTxWarp>
+            <a:noAutofit/>
+          </a:bodyPr>
+          <a:lstStyle/>
+          <a:p>
+            <a:pPr algn="ctr"/>
+            <a:r>
+              <a:rPr lang="en-US" sz="1200" dirty="0">
+                <a:solidFill>
+                  <a:srgbClr val="007DBC"/>
+                </a:solidFill>
+                <a:latin typeface="Arial" panose="020B0604020202020204" pitchFamily="34" charset="0"/>
+                <a:cs typeface="Arial" panose="020B0604020202020204" pitchFamily="34" charset="0"/>
+              </a:rPr>
+              <a:t>Availability Zone 3</a:t>
+            </a:r>
+          </a:p>
+        </p:txBody>
+      </p:sp>
+      <p:pic>
+        <p:nvPicPr>
+          <p:cNvPr id="48" name="Graphic 47">
+            <a:extLst>
+              <a:ext uri="{FF2B5EF4-FFF2-40B4-BE49-F238E27FC236}">
+                <a16:creationId xmlns:a16="http://schemas.microsoft.com/office/drawing/2014/main" id="{80C740EE-E304-EB4F-8F4F-655107822FCD}"/>
+              </a:ext>
+            </a:extLst>
+          </p:cNvPr>
+          <p:cNvPicPr>
+            <a:picLocks noChangeAspect="1"/>
+          </p:cNvPicPr>
+          <p:nvPr/>
+        </p:nvPicPr>
+        <p:blipFill>
+          <a:blip r:embed="rId10">
+            <a:extLst>
+              <a:ext uri="{96DAC541-7B7A-43D3-8B79-37D633B846F1}">
+                <asvg:svgBlip xmlns:asvg="http://schemas.microsoft.com/office/drawing/2016/SVG/main" r:embed="rId11"/>
+              </a:ext>
+            </a:extLst>
+          </a:blip>
+          <a:stretch>
+            <a:fillRect/>
+          </a:stretch>
+        </p:blipFill>
+        <p:spPr>
+          <a:xfrm>
+            <a:off x="6387644" y="1353523"/>
+            <a:ext cx="274320" cy="274320"/>
+          </a:xfrm>
+          <a:prstGeom prst="rect">
+            <a:avLst/>
+          </a:prstGeom>
+        </p:spPr>
+      </p:pic>
+      <p:pic>
+        <p:nvPicPr>
+          <p:cNvPr id="57" name="Graphic 56">
+            <a:extLst>
+              <a:ext uri="{FF2B5EF4-FFF2-40B4-BE49-F238E27FC236}">
+                <a16:creationId xmlns:a16="http://schemas.microsoft.com/office/drawing/2014/main" id="{6756DE6B-8CEF-3C4D-A926-0B3C425D64AD}"/>
+              </a:ext>
+            </a:extLst>
+          </p:cNvPr>
+          <p:cNvPicPr>
+            <a:picLocks noChangeAspect="1"/>
+          </p:cNvPicPr>
+          <p:nvPr/>
+        </p:nvPicPr>
+        <p:blipFill>
+          <a:blip r:embed="rId12">
+            <a:extLst>
+              <a:ext uri="{96DAC541-7B7A-43D3-8B79-37D633B846F1}">
+                <asvg:svgBlip xmlns:asvg="http://schemas.microsoft.com/office/drawing/2016/SVG/main" r:embed="rId13"/>
+              </a:ext>
+            </a:extLst>
+          </a:blip>
+          <a:stretch>
+            <a:fillRect/>
+          </a:stretch>
+        </p:blipFill>
+        <p:spPr>
+          <a:xfrm>
+            <a:off x="6391348" y="3581610"/>
+            <a:ext cx="274320" cy="274320"/>
+          </a:xfrm>
+          <a:prstGeom prst="rect">
+            <a:avLst/>
+          </a:prstGeom>
+        </p:spPr>
+      </p:pic>
+      <p:pic>
+        <p:nvPicPr>
+          <p:cNvPr id="62" name="Graphic 61">
+            <a:extLst>
+              <a:ext uri="{FF2B5EF4-FFF2-40B4-BE49-F238E27FC236}">
+                <a16:creationId xmlns:a16="http://schemas.microsoft.com/office/drawing/2014/main" id="{5C134F55-C14C-494E-9720-DA08A9B04B6E}"/>
+              </a:ext>
+            </a:extLst>
+          </p:cNvPr>
+          <p:cNvPicPr>
+            <a:picLocks noChangeAspect="1"/>
+          </p:cNvPicPr>
+          <p:nvPr/>
+        </p:nvPicPr>
+        <p:blipFill>
+          <a:blip r:embed="rId18">
+            <a:extLst>
+              <a:ext uri="{96DAC541-7B7A-43D3-8B79-37D633B846F1}">
+                <asvg:svgBlip xmlns:asvg="http://schemas.microsoft.com/office/drawing/2016/SVG/main" r:embed="rId19"/>
+              </a:ext>
+            </a:extLst>
+          </a:blip>
+          <a:stretch>
+            <a:fillRect/>
+          </a:stretch>
+        </p:blipFill>
+        <p:spPr>
+          <a:xfrm>
+            <a:off x="6915058" y="4112134"/>
+            <a:ext cx="573743" cy="573743"/>
+          </a:xfrm>
+          <a:prstGeom prst="rect">
+            <a:avLst/>
+          </a:prstGeom>
+          <a:effectLst>
+            <a:softEdge rad="0"/>
+          </a:effectLst>
+        </p:spPr>
+      </p:pic>
+      <p:sp>
+        <p:nvSpPr>
+          <p:cNvPr id="64" name="TextBox 63">
+            <a:extLst>
+              <a:ext uri="{FF2B5EF4-FFF2-40B4-BE49-F238E27FC236}">
+                <a16:creationId xmlns:a16="http://schemas.microsoft.com/office/drawing/2014/main" id="{A376846E-941B-D04E-A9D1-6BB5A5ADC4A9}"/>
+              </a:ext>
+            </a:extLst>
+          </p:cNvPr>
+          <p:cNvSpPr txBox="1"/>
+          <p:nvPr/>
+        </p:nvSpPr>
+        <p:spPr>
+          <a:xfrm>
+            <a:off x="6679531" y="3119735"/>
+            <a:ext cx="1044797" cy="446276"/>
+          </a:xfrm>
+          <a:prstGeom prst="rect">
+            <a:avLst/>
+          </a:prstGeom>
+          <a:noFill/>
+        </p:spPr>
+        <p:txBody>
+          <a:bodyPr wrap="square" rtlCol="0">
+            <a:spAutoFit/>
+          </a:bodyPr>
+          <a:lstStyle/>
+          <a:p>
+            <a:pPr algn="ctr"/>
+            <a:r>
+              <a:rPr lang="en-US" sz="1100" dirty="0">
+                <a:latin typeface="Arial" panose="020B0604020202020204" pitchFamily="34" charset="0"/>
+                <a:cs typeface="Arial" panose="020B0604020202020204" pitchFamily="34" charset="0"/>
+              </a:rPr>
+              <a:t>RD Gateway</a:t>
+            </a:r>
+          </a:p>
+          <a:p>
+            <a:pPr algn="ctr"/>
+            <a:endParaRPr lang="en-US" sz="1200" dirty="0">
+              <a:latin typeface="Arial" panose="020B0604020202020204" pitchFamily="34" charset="0"/>
+              <a:cs typeface="Arial" panose="020B0604020202020204" pitchFamily="34" charset="0"/>
+            </a:endParaRPr>
+          </a:p>
+        </p:txBody>
+      </p:sp>
+      <p:sp>
+        <p:nvSpPr>
+          <p:cNvPr id="65" name="TextBox 64">
+            <a:extLst>
+              <a:ext uri="{FF2B5EF4-FFF2-40B4-BE49-F238E27FC236}">
+                <a16:creationId xmlns:a16="http://schemas.microsoft.com/office/drawing/2014/main" id="{C52451FD-4DDC-6948-AC78-4DF42DD371A7}"/>
+              </a:ext>
+            </a:extLst>
+          </p:cNvPr>
+          <p:cNvSpPr txBox="1"/>
+          <p:nvPr/>
+        </p:nvSpPr>
+        <p:spPr>
+          <a:xfrm>
+            <a:off x="6470470" y="4691390"/>
+            <a:ext cx="1430883" cy="430887"/>
+          </a:xfrm>
+          <a:prstGeom prst="rect">
+            <a:avLst/>
+          </a:prstGeom>
+          <a:noFill/>
+        </p:spPr>
+        <p:txBody>
+          <a:bodyPr wrap="square" rtlCol="0">
+            <a:spAutoFit/>
+          </a:bodyPr>
+          <a:lstStyle/>
+          <a:p>
+            <a:pPr algn="ctr"/>
+            <a:r>
+              <a:rPr lang="en-US" sz="1100" dirty="0">
+                <a:latin typeface="Arial" panose="020B0604020202020204" pitchFamily="34" charset="0"/>
+                <a:cs typeface="Arial" panose="020B0604020202020204" pitchFamily="34" charset="0"/>
+              </a:rPr>
+              <a:t>SQL Server node 3 with replica</a:t>
+            </a:r>
+          </a:p>
+        </p:txBody>
+      </p:sp>
+      <p:sp>
+        <p:nvSpPr>
+          <p:cNvPr id="67" name="TextBox 66">
+            <a:extLst>
+              <a:ext uri="{FF2B5EF4-FFF2-40B4-BE49-F238E27FC236}">
+                <a16:creationId xmlns:a16="http://schemas.microsoft.com/office/drawing/2014/main" id="{201108FB-9F50-0548-AD17-7568A51E46F2}"/>
+              </a:ext>
+            </a:extLst>
+          </p:cNvPr>
+          <p:cNvSpPr txBox="1"/>
+          <p:nvPr/>
+        </p:nvSpPr>
+        <p:spPr>
+          <a:xfrm>
+            <a:off x="8268010" y="5361801"/>
+            <a:ext cx="1504166" cy="276999"/>
+          </a:xfrm>
+          <a:prstGeom prst="rect">
+            <a:avLst/>
+          </a:prstGeom>
+          <a:noFill/>
+        </p:spPr>
+        <p:txBody>
+          <a:bodyPr wrap="square" rtlCol="0">
+            <a:spAutoFit/>
+          </a:bodyPr>
+          <a:lstStyle/>
+          <a:p>
+            <a:pPr algn="ctr"/>
+            <a:r>
+              <a:rPr lang="en-US" sz="1200" dirty="0">
+                <a:latin typeface="Arial" panose="020B0604020202020204" pitchFamily="34" charset="0"/>
+                <a:cs typeface="Arial" panose="020B0604020202020204" pitchFamily="34" charset="0"/>
+              </a:rPr>
+              <a:t>Systems Manager</a:t>
+            </a:r>
+          </a:p>
+        </p:txBody>
+      </p:sp>
+      <p:sp>
+        <p:nvSpPr>
+          <p:cNvPr id="69" name="TextBox 68">
+            <a:extLst>
+              <a:ext uri="{FF2B5EF4-FFF2-40B4-BE49-F238E27FC236}">
+                <a16:creationId xmlns:a16="http://schemas.microsoft.com/office/drawing/2014/main" id="{DC75AA82-F7C7-4B40-A009-A58E49642607}"/>
+              </a:ext>
+            </a:extLst>
+          </p:cNvPr>
+          <p:cNvSpPr txBox="1"/>
+          <p:nvPr/>
+        </p:nvSpPr>
+        <p:spPr>
+          <a:xfrm>
+            <a:off x="8348056" y="4126035"/>
+            <a:ext cx="1344074" cy="276999"/>
+          </a:xfrm>
+          <a:prstGeom prst="rect">
+            <a:avLst/>
+          </a:prstGeom>
+          <a:noFill/>
+        </p:spPr>
+        <p:txBody>
+          <a:bodyPr wrap="square" rtlCol="0">
+            <a:spAutoFit/>
+          </a:bodyPr>
+          <a:lstStyle/>
+          <a:p>
+            <a:pPr algn="ctr"/>
+            <a:r>
+              <a:rPr lang="en-US" sz="1200" dirty="0">
+                <a:latin typeface="Arial" panose="020B0604020202020204" pitchFamily="34" charset="0"/>
+                <a:cs typeface="Arial" panose="020B0604020202020204" pitchFamily="34" charset="0"/>
+              </a:rPr>
+              <a:t>Secrets Manager</a:t>
+            </a:r>
+          </a:p>
+        </p:txBody>
+      </p:sp>
+      <p:sp>
+        <p:nvSpPr>
+          <p:cNvPr id="77" name="TextBox 9">
+            <a:extLst>
+              <a:ext uri="{FF2B5EF4-FFF2-40B4-BE49-F238E27FC236}">
+                <a16:creationId xmlns:a16="http://schemas.microsoft.com/office/drawing/2014/main" id="{B0B2D327-5291-4292-BC6C-E36B405F78F2}"/>
+              </a:ext>
+            </a:extLst>
+          </p:cNvPr>
+          <p:cNvSpPr txBox="1">
+            <a:spLocks noChangeArrowheads="1"/>
+          </p:cNvSpPr>
+          <p:nvPr/>
+        </p:nvSpPr>
+        <p:spPr bwMode="auto">
+          <a:xfrm>
+            <a:off x="8348056" y="2894880"/>
+            <a:ext cx="1344074" cy="276999"/>
+          </a:xfrm>
+          <a:prstGeom prst="rect">
+            <a:avLst/>
+          </a:prstGeom>
+          <a:noFill/>
+          <a:ln>
+            <a:noFill/>
+          </a:ln>
+          <a:extLst>
+            <a:ext uri="{909E8E84-426E-40DD-AFC4-6F175D3DCCD1}">
+              <a14:hiddenFill xmlns:a14="http://schemas.microsoft.com/office/drawing/2010/main">
+                <a:solidFill>
+                  <a:srgbClr val="FFFFFF"/>
+                </a:solidFill>
+              </a14:hiddenFill>
+            </a:ext>
+            <a:ext uri="{91240B29-F687-4F45-9708-019B960494DF}">
+              <a14:hiddenLine xmlns:a14="http://schemas.microsoft.com/office/drawing/2010/main" w="9525">
+                <a:solidFill>
+                  <a:srgbClr val="000000"/>
+                </a:solidFill>
+                <a:miter lim="800000"/>
+                <a:headEnd/>
+                <a:tailEnd/>
+              </a14:hiddenLine>
+            </a:ext>
+          </a:extLst>
+        </p:spPr>
+        <p:txBody>
+          <a:bodyPr wrap="square">
+            <a:spAutoFit/>
+          </a:bodyPr>
+          <a:lstStyle>
+            <a:lvl1pPr>
+              <a:defRPr>
+                <a:solidFill>
+                  <a:schemeClr val="tx1"/>
+                </a:solidFill>
+                <a:latin typeface="Calibri" panose="020F0502020204030204" pitchFamily="34" charset="0"/>
+              </a:defRPr>
+            </a:lvl1pPr>
+            <a:lvl2pPr marL="742950" indent="-285750">
+              <a:defRPr>
+                <a:solidFill>
+                  <a:schemeClr val="tx1"/>
+                </a:solidFill>
+                <a:latin typeface="Calibri" panose="020F0502020204030204" pitchFamily="34" charset="0"/>
+              </a:defRPr>
+            </a:lvl2pPr>
+            <a:lvl3pPr marL="1143000" indent="-228600">
+              <a:defRPr>
+                <a:solidFill>
+                  <a:schemeClr val="tx1"/>
+                </a:solidFill>
+                <a:latin typeface="Calibri" panose="020F0502020204030204" pitchFamily="34" charset="0"/>
+              </a:defRPr>
+            </a:lvl3pPr>
+            <a:lvl4pPr marL="1600200" indent="-228600">
+              <a:defRPr>
+                <a:solidFill>
+                  <a:schemeClr val="tx1"/>
+                </a:solidFill>
+                <a:latin typeface="Calibri" panose="020F0502020204030204" pitchFamily="34" charset="0"/>
+              </a:defRPr>
+            </a:lvl4pPr>
+            <a:lvl5pPr marL="2057400" indent="-228600">
+              <a:defRPr>
+                <a:solidFill>
+                  <a:schemeClr val="tx1"/>
+                </a:solidFill>
+                <a:latin typeface="Calibri" panose="020F0502020204030204" pitchFamily="34" charset="0"/>
+              </a:defRPr>
+            </a:lvl5pPr>
+            <a:lvl6pPr marL="2514600" indent="-228600" eaLnBrk="0" fontAlgn="base" hangingPunct="0">
+              <a:spcBef>
+                <a:spcPct val="0"/>
+              </a:spcBef>
+              <a:spcAft>
+                <a:spcPct val="0"/>
+              </a:spcAft>
+              <a:defRPr>
+                <a:solidFill>
+                  <a:schemeClr val="tx1"/>
+                </a:solidFill>
+                <a:latin typeface="Calibri" panose="020F0502020204030204" pitchFamily="34" charset="0"/>
+              </a:defRPr>
+            </a:lvl6pPr>
+            <a:lvl7pPr marL="2971800" indent="-228600" eaLnBrk="0" fontAlgn="base" hangingPunct="0">
+              <a:spcBef>
+                <a:spcPct val="0"/>
+              </a:spcBef>
+              <a:spcAft>
+                <a:spcPct val="0"/>
+              </a:spcAft>
+              <a:defRPr>
+                <a:solidFill>
+                  <a:schemeClr val="tx1"/>
+                </a:solidFill>
+                <a:latin typeface="Calibri" panose="020F0502020204030204" pitchFamily="34" charset="0"/>
+              </a:defRPr>
+            </a:lvl7pPr>
+            <a:lvl8pPr marL="3429000" indent="-228600" eaLnBrk="0" fontAlgn="base" hangingPunct="0">
+              <a:spcBef>
+                <a:spcPct val="0"/>
+              </a:spcBef>
+              <a:spcAft>
+                <a:spcPct val="0"/>
+              </a:spcAft>
+              <a:defRPr>
+                <a:solidFill>
+                  <a:schemeClr val="tx1"/>
+                </a:solidFill>
+                <a:latin typeface="Calibri" panose="020F0502020204030204" pitchFamily="34" charset="0"/>
+              </a:defRPr>
+            </a:lvl8pPr>
+            <a:lvl9pPr marL="3886200" indent="-228600" eaLnBrk="0" fontAlgn="base" hangingPunct="0">
+              <a:spcBef>
+                <a:spcPct val="0"/>
+              </a:spcBef>
+              <a:spcAft>
+                <a:spcPct val="0"/>
+              </a:spcAft>
+              <a:defRPr>
+                <a:solidFill>
+                  <a:schemeClr val="tx1"/>
+                </a:solidFill>
+                <a:latin typeface="Calibri" panose="020F0502020204030204" pitchFamily="34" charset="0"/>
+              </a:defRPr>
+            </a:lvl9pPr>
+          </a:lstStyle>
+          <a:p>
+            <a:pPr algn="ctr" eaLnBrk="1" hangingPunct="1"/>
+            <a:r>
+              <a:rPr lang="en-US" altLang="en-US" sz="1200" dirty="0">
+                <a:latin typeface="Arial" panose="020B0604020202020204" pitchFamily="34" charset="0"/>
+                <a:ea typeface="Amazon Ember" panose="020B0603020204020204" pitchFamily="34" charset="0"/>
+                <a:cs typeface="Arial" panose="020B0604020202020204" pitchFamily="34" charset="0"/>
+              </a:rPr>
+              <a:t>Directory Service</a:t>
+            </a:r>
+          </a:p>
+        </p:txBody>
+      </p:sp>
+      <p:pic>
+        <p:nvPicPr>
+          <p:cNvPr id="55" name="Graphic 18">
+            <a:extLst>
+              <a:ext uri="{FF2B5EF4-FFF2-40B4-BE49-F238E27FC236}">
+                <a16:creationId xmlns:a16="http://schemas.microsoft.com/office/drawing/2014/main" id="{A2DE0125-7EDE-4BDD-93E9-E6C5A549E8D5}"/>
+              </a:ext>
+            </a:extLst>
+          </p:cNvPr>
+          <p:cNvPicPr>
+            <a:picLocks noChangeAspect="1" noChangeArrowheads="1"/>
+          </p:cNvPicPr>
+          <p:nvPr/>
+        </p:nvPicPr>
+        <p:blipFill>
+          <a:blip r:embed="rId20">
+            <a:extLst>
+              <a:ext uri="{28A0092B-C50C-407E-A947-70E740481C1C}">
+                <a14:useLocalDpi xmlns:a14="http://schemas.microsoft.com/office/drawing/2010/main" val="0"/>
+              </a:ext>
+            </a:extLst>
+          </a:blip>
+          <a:srcRect/>
+          <a:stretch>
+            <a:fillRect/>
+          </a:stretch>
+        </p:blipFill>
+        <p:spPr bwMode="auto">
+          <a:xfrm>
+            <a:off x="8639093" y="733478"/>
+            <a:ext cx="762000" cy="762000"/>
+          </a:xfrm>
+          <a:prstGeom prst="rect">
+            <a:avLst/>
+          </a:prstGeom>
+          <a:noFill/>
+          <a:ln>
+            <a:noFill/>
+          </a:ln>
+          <a:extLst>
+            <a:ext uri="{909E8E84-426E-40DD-AFC4-6F175D3DCCD1}">
+              <a14:hiddenFill xmlns:a14="http://schemas.microsoft.com/office/drawing/2010/main">
+                <a:solidFill>
+                  <a:srgbClr val="FFFFFF"/>
+                </a:solidFill>
+              </a14:hiddenFill>
+            </a:ext>
+            <a:ext uri="{91240B29-F687-4F45-9708-019B960494DF}">
+              <a14:hiddenLine xmlns:a14="http://schemas.microsoft.com/office/drawing/2010/main" w="9525">
+                <a:solidFill>
+                  <a:srgbClr val="000000"/>
+                </a:solidFill>
+                <a:miter lim="800000"/>
+                <a:headEnd/>
+                <a:tailEnd/>
+              </a14:hiddenLine>
+            </a:ext>
+          </a:extLst>
+        </p:spPr>
+      </p:pic>
+      <p:sp>
+        <p:nvSpPr>
+          <p:cNvPr id="56" name="TextBox 12">
+            <a:extLst>
+              <a:ext uri="{FF2B5EF4-FFF2-40B4-BE49-F238E27FC236}">
+                <a16:creationId xmlns:a16="http://schemas.microsoft.com/office/drawing/2014/main" id="{705339A6-6C76-4254-8424-7054EA906E69}"/>
+              </a:ext>
+            </a:extLst>
+          </p:cNvPr>
+          <p:cNvSpPr txBox="1">
+            <a:spLocks noChangeArrowheads="1"/>
+          </p:cNvSpPr>
+          <p:nvPr/>
+        </p:nvSpPr>
+        <p:spPr bwMode="auto">
+          <a:xfrm>
+            <a:off x="8229600" y="1497065"/>
+            <a:ext cx="1580987" cy="461665"/>
+          </a:xfrm>
+          <a:prstGeom prst="rect">
+            <a:avLst/>
+          </a:prstGeom>
+          <a:noFill/>
+          <a:ln>
+            <a:noFill/>
+          </a:ln>
+          <a:extLst>
+            <a:ext uri="{909E8E84-426E-40DD-AFC4-6F175D3DCCD1}">
+              <a14:hiddenFill xmlns:a14="http://schemas.microsoft.com/office/drawing/2010/main">
+                <a:solidFill>
+                  <a:srgbClr val="FFFFFF"/>
+                </a:solidFill>
+              </a14:hiddenFill>
+            </a:ext>
+            <a:ext uri="{91240B29-F687-4F45-9708-019B960494DF}">
+              <a14:hiddenLine xmlns:a14="http://schemas.microsoft.com/office/drawing/2010/main" w="9525">
+                <a:solidFill>
+                  <a:srgbClr val="000000"/>
+                </a:solidFill>
+                <a:miter lim="800000"/>
+                <a:headEnd/>
+                <a:tailEnd/>
+              </a14:hiddenLine>
+            </a:ext>
+          </a:extLst>
+        </p:spPr>
+        <p:txBody>
+          <a:bodyPr wrap="square">
+            <a:spAutoFit/>
+          </a:bodyPr>
+          <a:lstStyle>
+            <a:lvl1pPr>
+              <a:defRPr>
+                <a:solidFill>
+                  <a:schemeClr val="tx1"/>
+                </a:solidFill>
+                <a:latin typeface="Calibri" panose="020F0502020204030204" pitchFamily="34" charset="0"/>
+              </a:defRPr>
+            </a:lvl1pPr>
+            <a:lvl2pPr marL="742950" indent="-285750">
+              <a:defRPr>
+                <a:solidFill>
+                  <a:schemeClr val="tx1"/>
+                </a:solidFill>
+                <a:latin typeface="Calibri" panose="020F0502020204030204" pitchFamily="34" charset="0"/>
+              </a:defRPr>
+            </a:lvl2pPr>
+            <a:lvl3pPr marL="1143000" indent="-228600">
+              <a:defRPr>
+                <a:solidFill>
+                  <a:schemeClr val="tx1"/>
+                </a:solidFill>
+                <a:latin typeface="Calibri" panose="020F0502020204030204" pitchFamily="34" charset="0"/>
+              </a:defRPr>
+            </a:lvl3pPr>
+            <a:lvl4pPr marL="1600200" indent="-228600">
+              <a:defRPr>
+                <a:solidFill>
+                  <a:schemeClr val="tx1"/>
+                </a:solidFill>
+                <a:latin typeface="Calibri" panose="020F0502020204030204" pitchFamily="34" charset="0"/>
+              </a:defRPr>
+            </a:lvl4pPr>
+            <a:lvl5pPr marL="2057400" indent="-228600">
+              <a:defRPr>
+                <a:solidFill>
+                  <a:schemeClr val="tx1"/>
+                </a:solidFill>
+                <a:latin typeface="Calibri" panose="020F0502020204030204" pitchFamily="34" charset="0"/>
+              </a:defRPr>
+            </a:lvl5pPr>
+            <a:lvl6pPr marL="2514600" indent="-228600" eaLnBrk="0" fontAlgn="base" hangingPunct="0">
+              <a:spcBef>
+                <a:spcPct val="0"/>
+              </a:spcBef>
+              <a:spcAft>
+                <a:spcPct val="0"/>
+              </a:spcAft>
+              <a:defRPr>
+                <a:solidFill>
+                  <a:schemeClr val="tx1"/>
+                </a:solidFill>
+                <a:latin typeface="Calibri" panose="020F0502020204030204" pitchFamily="34" charset="0"/>
+              </a:defRPr>
+            </a:lvl6pPr>
+            <a:lvl7pPr marL="2971800" indent="-228600" eaLnBrk="0" fontAlgn="base" hangingPunct="0">
+              <a:spcBef>
+                <a:spcPct val="0"/>
+              </a:spcBef>
+              <a:spcAft>
+                <a:spcPct val="0"/>
+              </a:spcAft>
+              <a:defRPr>
+                <a:solidFill>
+                  <a:schemeClr val="tx1"/>
+                </a:solidFill>
+                <a:latin typeface="Calibri" panose="020F0502020204030204" pitchFamily="34" charset="0"/>
+              </a:defRPr>
+            </a:lvl7pPr>
+            <a:lvl8pPr marL="3429000" indent="-228600" eaLnBrk="0" fontAlgn="base" hangingPunct="0">
+              <a:spcBef>
+                <a:spcPct val="0"/>
+              </a:spcBef>
+              <a:spcAft>
+                <a:spcPct val="0"/>
+              </a:spcAft>
+              <a:defRPr>
+                <a:solidFill>
+                  <a:schemeClr val="tx1"/>
+                </a:solidFill>
+                <a:latin typeface="Calibri" panose="020F0502020204030204" pitchFamily="34" charset="0"/>
+              </a:defRPr>
+            </a:lvl8pPr>
+            <a:lvl9pPr marL="3886200" indent="-228600" eaLnBrk="0" fontAlgn="base" hangingPunct="0">
+              <a:spcBef>
+                <a:spcPct val="0"/>
+              </a:spcBef>
+              <a:spcAft>
+                <a:spcPct val="0"/>
+              </a:spcAft>
+              <a:defRPr>
+                <a:solidFill>
+                  <a:schemeClr val="tx1"/>
+                </a:solidFill>
+                <a:latin typeface="Calibri" panose="020F0502020204030204" pitchFamily="34" charset="0"/>
+              </a:defRPr>
+            </a:lvl9pPr>
+          </a:lstStyle>
+          <a:p>
+            <a:pPr algn="ctr" eaLnBrk="1" hangingPunct="1"/>
+            <a:r>
+              <a:rPr lang="en-US" altLang="en-US" sz="1200" dirty="0">
+                <a:latin typeface="Arial" panose="020B0604020202020204" pitchFamily="34" charset="0"/>
+                <a:ea typeface="Amazon Ember" panose="020B0603020204020204" pitchFamily="34" charset="0"/>
+                <a:cs typeface="Arial" panose="020B0604020202020204" pitchFamily="34" charset="0"/>
+              </a:rPr>
+              <a:t>Amazon FSx for</a:t>
+            </a:r>
+            <a:br>
+              <a:rPr lang="en-US" altLang="en-US" sz="1200" dirty="0">
+                <a:latin typeface="Arial" panose="020B0604020202020204" pitchFamily="34" charset="0"/>
+                <a:ea typeface="Amazon Ember" panose="020B0603020204020204" pitchFamily="34" charset="0"/>
+                <a:cs typeface="Arial" panose="020B0604020202020204" pitchFamily="34" charset="0"/>
+              </a:rPr>
+            </a:br>
+            <a:r>
+              <a:rPr lang="en-US" altLang="en-US" sz="1200" dirty="0">
+                <a:latin typeface="Arial" panose="020B0604020202020204" pitchFamily="34" charset="0"/>
+                <a:ea typeface="Amazon Ember" panose="020B0603020204020204" pitchFamily="34" charset="0"/>
+                <a:cs typeface="Arial" panose="020B0604020202020204" pitchFamily="34" charset="0"/>
+              </a:rPr>
+              <a:t>Windows File Server</a:t>
+            </a:r>
+          </a:p>
+        </p:txBody>
+      </p:sp>
+      <p:sp>
+        <p:nvSpPr>
+          <p:cNvPr id="60" name="TextBox 16">
+            <a:extLst>
+              <a:ext uri="{FF2B5EF4-FFF2-40B4-BE49-F238E27FC236}">
+                <a16:creationId xmlns:a16="http://schemas.microsoft.com/office/drawing/2014/main" id="{1051FD55-0DC9-49FE-9122-ABE2EF0A26F4}"/>
+              </a:ext>
+            </a:extLst>
+          </p:cNvPr>
+          <p:cNvSpPr txBox="1">
+            <a:spLocks noChangeArrowheads="1"/>
+          </p:cNvSpPr>
+          <p:nvPr/>
+        </p:nvSpPr>
+        <p:spPr bwMode="auto">
+          <a:xfrm>
+            <a:off x="2743200" y="5741316"/>
+            <a:ext cx="1255644" cy="430887"/>
+          </a:xfrm>
+          <a:prstGeom prst="rect">
+            <a:avLst/>
+          </a:prstGeom>
+          <a:noFill/>
+          <a:ln>
+            <a:noFill/>
+          </a:ln>
+          <a:extLst>
+            <a:ext uri="{909E8E84-426E-40DD-AFC4-6F175D3DCCD1}">
+              <a14:hiddenFill xmlns:a14="http://schemas.microsoft.com/office/drawing/2010/main">
+                <a:solidFill>
+                  <a:srgbClr val="FFFFFF"/>
+                </a:solidFill>
+              </a14:hiddenFill>
+            </a:ext>
+            <a:ext uri="{91240B29-F687-4F45-9708-019B960494DF}">
+              <a14:hiddenLine xmlns:a14="http://schemas.microsoft.com/office/drawing/2010/main" w="9525">
+                <a:solidFill>
+                  <a:srgbClr val="000000"/>
+                </a:solidFill>
+                <a:miter lim="800000"/>
+                <a:headEnd/>
+                <a:tailEnd/>
+              </a14:hiddenLine>
+            </a:ext>
+          </a:extLst>
+        </p:spPr>
+        <p:txBody>
+          <a:bodyPr wrap="square">
+            <a:spAutoFit/>
+          </a:bodyPr>
+          <a:lstStyle>
+            <a:lvl1pPr>
+              <a:defRPr>
+                <a:solidFill>
+                  <a:schemeClr val="tx1"/>
+                </a:solidFill>
+                <a:latin typeface="Calibri" panose="020F0502020204030204" pitchFamily="34" charset="0"/>
+              </a:defRPr>
+            </a:lvl1pPr>
+            <a:lvl2pPr marL="742950" indent="-285750">
+              <a:defRPr>
+                <a:solidFill>
+                  <a:schemeClr val="tx1"/>
+                </a:solidFill>
+                <a:latin typeface="Calibri" panose="020F0502020204030204" pitchFamily="34" charset="0"/>
+              </a:defRPr>
+            </a:lvl2pPr>
+            <a:lvl3pPr marL="1143000" indent="-228600">
+              <a:defRPr>
+                <a:solidFill>
+                  <a:schemeClr val="tx1"/>
+                </a:solidFill>
+                <a:latin typeface="Calibri" panose="020F0502020204030204" pitchFamily="34" charset="0"/>
+              </a:defRPr>
+            </a:lvl3pPr>
+            <a:lvl4pPr marL="1600200" indent="-228600">
+              <a:defRPr>
+                <a:solidFill>
+                  <a:schemeClr val="tx1"/>
+                </a:solidFill>
+                <a:latin typeface="Calibri" panose="020F0502020204030204" pitchFamily="34" charset="0"/>
+              </a:defRPr>
+            </a:lvl4pPr>
+            <a:lvl5pPr marL="2057400" indent="-228600">
+              <a:defRPr>
+                <a:solidFill>
+                  <a:schemeClr val="tx1"/>
+                </a:solidFill>
+                <a:latin typeface="Calibri" panose="020F0502020204030204" pitchFamily="34" charset="0"/>
+              </a:defRPr>
+            </a:lvl5pPr>
+            <a:lvl6pPr marL="2514600" indent="-228600" eaLnBrk="0" fontAlgn="base" hangingPunct="0">
+              <a:spcBef>
+                <a:spcPct val="0"/>
+              </a:spcBef>
+              <a:spcAft>
+                <a:spcPct val="0"/>
+              </a:spcAft>
+              <a:defRPr>
+                <a:solidFill>
+                  <a:schemeClr val="tx1"/>
+                </a:solidFill>
+                <a:latin typeface="Calibri" panose="020F0502020204030204" pitchFamily="34" charset="0"/>
+              </a:defRPr>
+            </a:lvl6pPr>
+            <a:lvl7pPr marL="2971800" indent="-228600" eaLnBrk="0" fontAlgn="base" hangingPunct="0">
+              <a:spcBef>
+                <a:spcPct val="0"/>
+              </a:spcBef>
+              <a:spcAft>
+                <a:spcPct val="0"/>
+              </a:spcAft>
+              <a:defRPr>
+                <a:solidFill>
+                  <a:schemeClr val="tx1"/>
+                </a:solidFill>
+                <a:latin typeface="Calibri" panose="020F0502020204030204" pitchFamily="34" charset="0"/>
+              </a:defRPr>
+            </a:lvl7pPr>
+            <a:lvl8pPr marL="3429000" indent="-228600" eaLnBrk="0" fontAlgn="base" hangingPunct="0">
+              <a:spcBef>
+                <a:spcPct val="0"/>
+              </a:spcBef>
+              <a:spcAft>
+                <a:spcPct val="0"/>
+              </a:spcAft>
+              <a:defRPr>
+                <a:solidFill>
+                  <a:schemeClr val="tx1"/>
+                </a:solidFill>
+                <a:latin typeface="Calibri" panose="020F0502020204030204" pitchFamily="34" charset="0"/>
+              </a:defRPr>
+            </a:lvl8pPr>
+            <a:lvl9pPr marL="3886200" indent="-228600" eaLnBrk="0" fontAlgn="base" hangingPunct="0">
+              <a:spcBef>
+                <a:spcPct val="0"/>
+              </a:spcBef>
+              <a:spcAft>
+                <a:spcPct val="0"/>
+              </a:spcAft>
+              <a:defRPr>
+                <a:solidFill>
+                  <a:schemeClr val="tx1"/>
+                </a:solidFill>
+                <a:latin typeface="Calibri" panose="020F0502020204030204" pitchFamily="34" charset="0"/>
+              </a:defRPr>
+            </a:lvl9pPr>
+          </a:lstStyle>
+          <a:p>
+            <a:pPr algn="ctr" eaLnBrk="1" hangingPunct="1"/>
+            <a:r>
+              <a:rPr lang="en-US" altLang="en-US" sz="1100" dirty="0">
+                <a:latin typeface="Arial" panose="020B0604020202020204" pitchFamily="34" charset="0"/>
+                <a:ea typeface="Amazon Ember" panose="020B0603020204020204" pitchFamily="34" charset="0"/>
+                <a:cs typeface="Arial" panose="020B0604020202020204" pitchFamily="34" charset="0"/>
+              </a:rPr>
+              <a:t>Amazon FSx </a:t>
+            </a:r>
+            <a:br>
+              <a:rPr lang="en-US" altLang="en-US" sz="1100" dirty="0">
+                <a:latin typeface="Arial" panose="020B0604020202020204" pitchFamily="34" charset="0"/>
+                <a:ea typeface="Amazon Ember" panose="020B0603020204020204" pitchFamily="34" charset="0"/>
+                <a:cs typeface="Arial" panose="020B0604020202020204" pitchFamily="34" charset="0"/>
+              </a:rPr>
+            </a:br>
+            <a:r>
+              <a:rPr lang="en-US" altLang="en-US" sz="1100" dirty="0">
+                <a:latin typeface="Arial" panose="020B0604020202020204" pitchFamily="34" charset="0"/>
+                <a:ea typeface="Amazon Ember" panose="020B0603020204020204" pitchFamily="34" charset="0"/>
+                <a:cs typeface="Arial" panose="020B0604020202020204" pitchFamily="34" charset="0"/>
+              </a:rPr>
+              <a:t>file system</a:t>
+            </a:r>
+          </a:p>
+        </p:txBody>
+      </p:sp>
+      <p:pic>
+        <p:nvPicPr>
+          <p:cNvPr id="61" name="Graphic 17">
+            <a:extLst>
+              <a:ext uri="{FF2B5EF4-FFF2-40B4-BE49-F238E27FC236}">
+                <a16:creationId xmlns:a16="http://schemas.microsoft.com/office/drawing/2014/main" id="{1B7245A7-0A4F-4D16-9D52-454FF84C2EB1}"/>
+              </a:ext>
+            </a:extLst>
+          </p:cNvPr>
+          <p:cNvPicPr>
+            <a:picLocks noChangeAspect="1" noChangeArrowheads="1"/>
+          </p:cNvPicPr>
+          <p:nvPr/>
+        </p:nvPicPr>
+        <p:blipFill>
+          <a:blip r:embed="rId21">
+            <a:extLst>
+              <a:ext uri="{28A0092B-C50C-407E-A947-70E740481C1C}">
+                <a14:useLocalDpi xmlns:a14="http://schemas.microsoft.com/office/drawing/2010/main" val="0"/>
+              </a:ext>
+            </a:extLst>
+          </a:blip>
+          <a:srcRect/>
+          <a:stretch>
+            <a:fillRect/>
+          </a:stretch>
+        </p:blipFill>
+        <p:spPr bwMode="auto">
+          <a:xfrm>
+            <a:off x="3170650" y="5284116"/>
+            <a:ext cx="457200" cy="457200"/>
+          </a:xfrm>
+          <a:prstGeom prst="rect">
+            <a:avLst/>
+          </a:prstGeom>
+          <a:noFill/>
+          <a:ln>
+            <a:noFill/>
+          </a:ln>
+          <a:extLst>
+            <a:ext uri="{909E8E84-426E-40DD-AFC4-6F175D3DCCD1}">
+              <a14:hiddenFill xmlns:a14="http://schemas.microsoft.com/office/drawing/2010/main">
+                <a:solidFill>
+                  <a:srgbClr val="FFFFFF"/>
+                </a:solidFill>
+              </a14:hiddenFill>
+            </a:ext>
+            <a:ext uri="{91240B29-F687-4F45-9708-019B960494DF}">
+              <a14:hiddenLine xmlns:a14="http://schemas.microsoft.com/office/drawing/2010/main" w="9525">
+                <a:solidFill>
+                  <a:srgbClr val="000000"/>
+                </a:solidFill>
+                <a:miter lim="800000"/>
+                <a:headEnd/>
+                <a:tailEnd/>
+              </a14:hiddenLine>
+            </a:ext>
+          </a:extLst>
+        </p:spPr>
+      </p:pic>
+      <p:sp>
+        <p:nvSpPr>
+          <p:cNvPr id="78" name="TextBox 77">
+            <a:extLst>
+              <a:ext uri="{FF2B5EF4-FFF2-40B4-BE49-F238E27FC236}">
+                <a16:creationId xmlns:a16="http://schemas.microsoft.com/office/drawing/2014/main" id="{66D07B82-BF92-4D3D-8A4E-F9CC401EB97F}"/>
+              </a:ext>
+            </a:extLst>
+          </p:cNvPr>
+          <p:cNvSpPr txBox="1"/>
+          <p:nvPr/>
+        </p:nvSpPr>
+        <p:spPr>
+          <a:xfrm>
+            <a:off x="4501994" y="2176790"/>
+            <a:ext cx="1035183" cy="261610"/>
+          </a:xfrm>
+          <a:prstGeom prst="rect">
+            <a:avLst/>
+          </a:prstGeom>
+          <a:noFill/>
+        </p:spPr>
+        <p:txBody>
+          <a:bodyPr wrap="square" rtlCol="0">
+            <a:spAutoFit/>
+          </a:bodyPr>
+          <a:lstStyle/>
+          <a:p>
+            <a:pPr algn="ctr"/>
+            <a:r>
+              <a:rPr lang="en-US" sz="1100" dirty="0">
+                <a:latin typeface="Arial" panose="020B0604020202020204" pitchFamily="34" charset="0"/>
+                <a:cs typeface="Arial" panose="020B0604020202020204" pitchFamily="34" charset="0"/>
+              </a:rPr>
+              <a:t>NAT gateway</a:t>
+            </a:r>
+          </a:p>
+        </p:txBody>
+      </p:sp>
+      <p:pic>
+        <p:nvPicPr>
+          <p:cNvPr id="79" name="Graphic 78">
+            <a:extLst>
+              <a:ext uri="{FF2B5EF4-FFF2-40B4-BE49-F238E27FC236}">
+                <a16:creationId xmlns:a16="http://schemas.microsoft.com/office/drawing/2014/main" id="{8714B8CC-C0A3-4852-919A-A34F5F2A50DD}"/>
+              </a:ext>
+            </a:extLst>
+          </p:cNvPr>
+          <p:cNvPicPr>
+            <a:picLocks noChangeAspect="1"/>
+          </p:cNvPicPr>
+          <p:nvPr/>
+        </p:nvPicPr>
+        <p:blipFill>
+          <a:blip r:embed="rId14">
+            <a:extLst>
+              <a:ext uri="{96DAC541-7B7A-43D3-8B79-37D633B846F1}">
+                <asvg:svgBlip xmlns:asvg="http://schemas.microsoft.com/office/drawing/2016/SVG/main" r:embed="rId15"/>
+              </a:ext>
+            </a:extLst>
+          </a:blip>
+          <a:stretch>
+            <a:fillRect/>
+          </a:stretch>
+        </p:blipFill>
+        <p:spPr>
+          <a:xfrm>
+            <a:off x="4784635" y="1699384"/>
+            <a:ext cx="469900" cy="469900"/>
+          </a:xfrm>
+          <a:prstGeom prst="rect">
+            <a:avLst/>
+          </a:prstGeom>
+        </p:spPr>
+      </p:pic>
+      <p:sp>
+        <p:nvSpPr>
+          <p:cNvPr id="80" name="TextBox 79">
+            <a:extLst>
+              <a:ext uri="{FF2B5EF4-FFF2-40B4-BE49-F238E27FC236}">
+                <a16:creationId xmlns:a16="http://schemas.microsoft.com/office/drawing/2014/main" id="{5515A940-6809-433A-9BE0-544D620D9C3D}"/>
+              </a:ext>
+            </a:extLst>
+          </p:cNvPr>
+          <p:cNvSpPr txBox="1"/>
+          <p:nvPr/>
+        </p:nvSpPr>
+        <p:spPr>
+          <a:xfrm>
+            <a:off x="6684338" y="2176790"/>
+            <a:ext cx="1035183" cy="261610"/>
+          </a:xfrm>
+          <a:prstGeom prst="rect">
+            <a:avLst/>
+          </a:prstGeom>
+          <a:noFill/>
+        </p:spPr>
+        <p:txBody>
+          <a:bodyPr wrap="square" rtlCol="0">
+            <a:spAutoFit/>
+          </a:bodyPr>
+          <a:lstStyle/>
+          <a:p>
+            <a:pPr algn="ctr"/>
+            <a:r>
+              <a:rPr lang="en-US" sz="1100" dirty="0">
+                <a:latin typeface="Arial" panose="020B0604020202020204" pitchFamily="34" charset="0"/>
+                <a:cs typeface="Arial" panose="020B0604020202020204" pitchFamily="34" charset="0"/>
+              </a:rPr>
+              <a:t>NAT gateway</a:t>
+            </a:r>
+          </a:p>
+        </p:txBody>
+      </p:sp>
+      <p:pic>
+        <p:nvPicPr>
+          <p:cNvPr id="81" name="Graphic 80">
+            <a:extLst>
+              <a:ext uri="{FF2B5EF4-FFF2-40B4-BE49-F238E27FC236}">
+                <a16:creationId xmlns:a16="http://schemas.microsoft.com/office/drawing/2014/main" id="{5852E716-28A7-454F-98A2-9A3AB55D885A}"/>
+              </a:ext>
+            </a:extLst>
+          </p:cNvPr>
+          <p:cNvPicPr>
+            <a:picLocks noChangeAspect="1"/>
+          </p:cNvPicPr>
+          <p:nvPr/>
+        </p:nvPicPr>
+        <p:blipFill>
+          <a:blip r:embed="rId14">
+            <a:extLst>
+              <a:ext uri="{96DAC541-7B7A-43D3-8B79-37D633B846F1}">
+                <asvg:svgBlip xmlns:asvg="http://schemas.microsoft.com/office/drawing/2016/SVG/main" r:embed="rId15"/>
+              </a:ext>
+            </a:extLst>
+          </a:blip>
+          <a:stretch>
+            <a:fillRect/>
+          </a:stretch>
+        </p:blipFill>
+        <p:spPr>
+          <a:xfrm>
+            <a:off x="6966979" y="1699384"/>
+            <a:ext cx="469900" cy="469900"/>
+          </a:xfrm>
+          <a:prstGeom prst="rect">
+            <a:avLst/>
+          </a:prstGeom>
+        </p:spPr>
+      </p:pic>
+      <p:sp>
+        <p:nvSpPr>
+          <p:cNvPr id="16" name="TextBox 15">
+            <a:extLst>
+              <a:ext uri="{FF2B5EF4-FFF2-40B4-BE49-F238E27FC236}">
+                <a16:creationId xmlns:a16="http://schemas.microsoft.com/office/drawing/2014/main" id="{0A09D38D-CA78-40A5-9C77-1DE6DDE523D1}"/>
+              </a:ext>
+            </a:extLst>
+          </p:cNvPr>
+          <p:cNvSpPr txBox="1"/>
+          <p:nvPr/>
+        </p:nvSpPr>
+        <p:spPr>
+          <a:xfrm>
+            <a:off x="2713774" y="4038600"/>
+            <a:ext cx="1361270" cy="646331"/>
+          </a:xfrm>
+          <a:prstGeom prst="rect">
+            <a:avLst/>
+          </a:prstGeom>
+          <a:noFill/>
+        </p:spPr>
+        <p:txBody>
+          <a:bodyPr wrap="none" rtlCol="0">
+            <a:spAutoFit/>
+          </a:bodyPr>
+          <a:lstStyle/>
+          <a:p>
+            <a:pPr algn="ctr"/>
+            <a:r>
+              <a:rPr lang="en-US" sz="1200" dirty="0">
+                <a:solidFill>
+                  <a:srgbClr val="5A6B86"/>
+                </a:solidFill>
+                <a:latin typeface="Arial" panose="020B0604020202020204" pitchFamily="34" charset="0"/>
+                <a:cs typeface="Arial" panose="020B0604020202020204" pitchFamily="34" charset="0"/>
+              </a:rPr>
+              <a:t>WSFC cluster </a:t>
+            </a:r>
+            <a:br>
+              <a:rPr lang="en-US" sz="1200" dirty="0">
+                <a:solidFill>
+                  <a:srgbClr val="5A6B86"/>
+                </a:solidFill>
+                <a:latin typeface="Arial" panose="020B0604020202020204" pitchFamily="34" charset="0"/>
+                <a:cs typeface="Arial" panose="020B0604020202020204" pitchFamily="34" charset="0"/>
+              </a:rPr>
+            </a:br>
+            <a:r>
+              <a:rPr lang="en-US" sz="1200" dirty="0">
+                <a:solidFill>
+                  <a:srgbClr val="5A6B86"/>
+                </a:solidFill>
+                <a:latin typeface="Arial" panose="020B0604020202020204" pitchFamily="34" charset="0"/>
+                <a:cs typeface="Arial" panose="020B0604020202020204" pitchFamily="34" charset="0"/>
+              </a:rPr>
+              <a:t>with DataKeeper </a:t>
+            </a:r>
+            <a:br>
+              <a:rPr lang="en-US" sz="1200" dirty="0">
+                <a:solidFill>
+                  <a:srgbClr val="5A6B86"/>
+                </a:solidFill>
+                <a:latin typeface="Arial" panose="020B0604020202020204" pitchFamily="34" charset="0"/>
+                <a:cs typeface="Arial" panose="020B0604020202020204" pitchFamily="34" charset="0"/>
+              </a:rPr>
+            </a:br>
+            <a:r>
+              <a:rPr lang="en-US" sz="1200" dirty="0">
+                <a:solidFill>
+                  <a:srgbClr val="5A6B86"/>
+                </a:solidFill>
+                <a:latin typeface="Arial" panose="020B0604020202020204" pitchFamily="34" charset="0"/>
+                <a:cs typeface="Arial" panose="020B0604020202020204" pitchFamily="34" charset="0"/>
+              </a:rPr>
+              <a:t>replication</a:t>
+            </a:r>
+          </a:p>
+        </p:txBody>
+      </p:sp>
+      <p:sp>
+        <p:nvSpPr>
+          <p:cNvPr id="17" name="TextBox 16">
+            <a:extLst>
+              <a:ext uri="{FF2B5EF4-FFF2-40B4-BE49-F238E27FC236}">
+                <a16:creationId xmlns:a16="http://schemas.microsoft.com/office/drawing/2014/main" id="{E039C0DB-5BD2-4B93-90B1-56B29CA87234}"/>
+              </a:ext>
+            </a:extLst>
+          </p:cNvPr>
+          <p:cNvSpPr txBox="1"/>
+          <p:nvPr/>
+        </p:nvSpPr>
+        <p:spPr>
+          <a:xfrm>
+            <a:off x="2871670" y="2842845"/>
+            <a:ext cx="1045479" cy="461665"/>
+          </a:xfrm>
+          <a:prstGeom prst="rect">
+            <a:avLst/>
+          </a:prstGeom>
+          <a:noFill/>
+        </p:spPr>
+        <p:txBody>
+          <a:bodyPr wrap="none" rtlCol="0">
+            <a:spAutoFit/>
+          </a:bodyPr>
+          <a:lstStyle/>
+          <a:p>
+            <a:pPr algn="ctr"/>
+            <a:r>
+              <a:rPr lang="en-US" sz="1200" dirty="0">
+                <a:solidFill>
+                  <a:srgbClr val="D86613"/>
+                </a:solidFill>
+                <a:latin typeface="Arial" panose="020B0604020202020204" pitchFamily="34" charset="0"/>
+                <a:cs typeface="Arial" panose="020B0604020202020204" pitchFamily="34" charset="0"/>
+              </a:rPr>
+              <a:t>Auto Scaling</a:t>
+            </a:r>
+            <a:br>
+              <a:rPr lang="en-US" sz="1200" dirty="0">
+                <a:solidFill>
+                  <a:srgbClr val="D86613"/>
+                </a:solidFill>
+                <a:latin typeface="Arial" panose="020B0604020202020204" pitchFamily="34" charset="0"/>
+                <a:cs typeface="Arial" panose="020B0604020202020204" pitchFamily="34" charset="0"/>
+              </a:rPr>
+            </a:br>
+            <a:r>
+              <a:rPr lang="en-US" sz="1200" dirty="0">
+                <a:solidFill>
+                  <a:srgbClr val="D86613"/>
+                </a:solidFill>
+                <a:latin typeface="Arial" panose="020B0604020202020204" pitchFamily="34" charset="0"/>
+                <a:cs typeface="Arial" panose="020B0604020202020204" pitchFamily="34" charset="0"/>
+              </a:rPr>
+              <a:t>group</a:t>
+            </a:r>
+          </a:p>
+        </p:txBody>
+      </p:sp>
+      <p:pic>
+        <p:nvPicPr>
+          <p:cNvPr id="82" name="Graphic 7">
+            <a:extLst>
+              <a:ext uri="{FF2B5EF4-FFF2-40B4-BE49-F238E27FC236}">
+                <a16:creationId xmlns:a16="http://schemas.microsoft.com/office/drawing/2014/main" id="{A9115010-8240-494D-980B-1EE5BBF0A8EB}"/>
+              </a:ext>
+            </a:extLst>
+          </p:cNvPr>
+          <p:cNvPicPr>
+            <a:picLocks noChangeAspect="1" noChangeArrowheads="1"/>
+          </p:cNvPicPr>
+          <p:nvPr/>
+        </p:nvPicPr>
+        <p:blipFill>
+          <a:blip r:embed="rId22">
+            <a:extLst>
+              <a:ext uri="{28A0092B-C50C-407E-A947-70E740481C1C}">
+                <a14:useLocalDpi xmlns:a14="http://schemas.microsoft.com/office/drawing/2010/main" val="0"/>
+              </a:ext>
+            </a:extLst>
+          </a:blip>
+          <a:srcRect/>
+          <a:stretch>
+            <a:fillRect/>
+          </a:stretch>
+        </p:blipFill>
+        <p:spPr bwMode="auto">
+          <a:xfrm>
+            <a:off x="8639093" y="2140929"/>
+            <a:ext cx="762000" cy="762000"/>
+          </a:xfrm>
+          <a:prstGeom prst="rect">
+            <a:avLst/>
+          </a:prstGeom>
+          <a:noFill/>
+          <a:ln>
+            <a:noFill/>
+          </a:ln>
+          <a:extLst>
+            <a:ext uri="{909E8E84-426E-40DD-AFC4-6F175D3DCCD1}">
+              <a14:hiddenFill xmlns:a14="http://schemas.microsoft.com/office/drawing/2010/main">
+                <a:solidFill>
+                  <a:srgbClr val="FFFFFF"/>
+                </a:solidFill>
+              </a14:hiddenFill>
+            </a:ext>
+            <a:ext uri="{91240B29-F687-4F45-9708-019B960494DF}">
+              <a14:hiddenLine xmlns:a14="http://schemas.microsoft.com/office/drawing/2010/main" w="9525">
+                <a:solidFill>
+                  <a:srgbClr val="000000"/>
+                </a:solidFill>
+                <a:miter lim="800000"/>
+                <a:headEnd/>
+                <a:tailEnd/>
+              </a14:hiddenLine>
+            </a:ext>
+          </a:extLst>
+        </p:spPr>
+      </p:pic>
+      <p:pic>
+        <p:nvPicPr>
+          <p:cNvPr id="83" name="Graphic 17">
+            <a:extLst>
+              <a:ext uri="{FF2B5EF4-FFF2-40B4-BE49-F238E27FC236}">
+                <a16:creationId xmlns:a16="http://schemas.microsoft.com/office/drawing/2014/main" id="{51C9771A-2065-4A13-B54A-643932293459}"/>
+              </a:ext>
+            </a:extLst>
+          </p:cNvPr>
+          <p:cNvPicPr>
+            <a:picLocks noChangeAspect="1" noChangeArrowheads="1"/>
+          </p:cNvPicPr>
+          <p:nvPr/>
+        </p:nvPicPr>
+        <p:blipFill>
+          <a:blip r:embed="rId23">
+            <a:extLst>
+              <a:ext uri="{28A0092B-C50C-407E-A947-70E740481C1C}">
+                <a14:useLocalDpi xmlns:a14="http://schemas.microsoft.com/office/drawing/2010/main" val="0"/>
+              </a:ext>
+            </a:extLst>
+          </a:blip>
+          <a:srcRect/>
+          <a:stretch>
+            <a:fillRect/>
+          </a:stretch>
+        </p:blipFill>
+        <p:spPr bwMode="auto">
+          <a:xfrm>
+            <a:off x="8639783" y="3358561"/>
+            <a:ext cx="762000" cy="762000"/>
+          </a:xfrm>
+          <a:prstGeom prst="rect">
+            <a:avLst/>
+          </a:prstGeom>
+          <a:noFill/>
+          <a:ln>
+            <a:noFill/>
+          </a:ln>
+          <a:extLst>
+            <a:ext uri="{909E8E84-426E-40DD-AFC4-6F175D3DCCD1}">
+              <a14:hiddenFill xmlns:a14="http://schemas.microsoft.com/office/drawing/2010/main">
+                <a:solidFill>
+                  <a:srgbClr val="FFFFFF"/>
+                </a:solidFill>
+              </a14:hiddenFill>
+            </a:ext>
+            <a:ext uri="{91240B29-F687-4F45-9708-019B960494DF}">
+              <a14:hiddenLine xmlns:a14="http://schemas.microsoft.com/office/drawing/2010/main" w="9525">
+                <a:solidFill>
+                  <a:srgbClr val="000000"/>
+                </a:solidFill>
+                <a:miter lim="800000"/>
+                <a:headEnd/>
+                <a:tailEnd/>
+              </a14:hiddenLine>
+            </a:ext>
+          </a:extLst>
+        </p:spPr>
+      </p:pic>
+      <p:pic>
+        <p:nvPicPr>
+          <p:cNvPr id="84" name="Graphic 15">
+            <a:extLst>
+              <a:ext uri="{FF2B5EF4-FFF2-40B4-BE49-F238E27FC236}">
+                <a16:creationId xmlns:a16="http://schemas.microsoft.com/office/drawing/2014/main" id="{139329F1-A3F5-4F0B-B056-DE8A61EA5D02}"/>
+              </a:ext>
+            </a:extLst>
+          </p:cNvPr>
+          <p:cNvPicPr>
+            <a:picLocks noChangeAspect="1" noChangeArrowheads="1"/>
+          </p:cNvPicPr>
+          <p:nvPr/>
+        </p:nvPicPr>
+        <p:blipFill>
+          <a:blip r:embed="rId24">
+            <a:extLst>
+              <a:ext uri="{28A0092B-C50C-407E-A947-70E740481C1C}">
+                <a14:useLocalDpi xmlns:a14="http://schemas.microsoft.com/office/drawing/2010/main" val="0"/>
+              </a:ext>
+            </a:extLst>
+          </a:blip>
+          <a:srcRect/>
+          <a:stretch>
+            <a:fillRect/>
+          </a:stretch>
+        </p:blipFill>
+        <p:spPr bwMode="auto">
+          <a:xfrm>
+            <a:off x="8639783" y="4594174"/>
+            <a:ext cx="762000" cy="762000"/>
+          </a:xfrm>
+          <a:prstGeom prst="rect">
+            <a:avLst/>
+          </a:prstGeom>
+          <a:noFill/>
+          <a:ln>
+            <a:noFill/>
+          </a:ln>
+          <a:extLst>
+            <a:ext uri="{909E8E84-426E-40DD-AFC4-6F175D3DCCD1}">
+              <a14:hiddenFill xmlns:a14="http://schemas.microsoft.com/office/drawing/2010/main">
+                <a:solidFill>
+                  <a:srgbClr val="FFFFFF"/>
+                </a:solidFill>
+              </a14:hiddenFill>
+            </a:ext>
+            <a:ext uri="{91240B29-F687-4F45-9708-019B960494DF}">
+              <a14:hiddenLine xmlns:a14="http://schemas.microsoft.com/office/drawing/2010/main" w="9525">
+                <a:solidFill>
+                  <a:srgbClr val="000000"/>
+                </a:solidFill>
+                <a:miter lim="800000"/>
+                <a:headEnd/>
+                <a:tailEnd/>
+              </a14:hiddenLine>
+            </a:ext>
+          </a:extLst>
+        </p:spPr>
+      </p:pic>
+      <p:sp>
+        <p:nvSpPr>
+          <p:cNvPr id="85" name="Freeform 36">
+            <a:extLst>
+              <a:ext uri="{FF2B5EF4-FFF2-40B4-BE49-F238E27FC236}">
+                <a16:creationId xmlns:a16="http://schemas.microsoft.com/office/drawing/2014/main" id="{1DF04EE1-5C7B-4403-8532-5E4810BB8E43}"/>
+              </a:ext>
+            </a:extLst>
+          </p:cNvPr>
+          <p:cNvSpPr/>
+          <p:nvPr/>
+        </p:nvSpPr>
+        <p:spPr>
+          <a:xfrm rot="16200000" flipH="1">
+            <a:off x="2212490" y="4639841"/>
+            <a:ext cx="451063" cy="1388432"/>
+          </a:xfrm>
+          <a:custGeom>
+            <a:avLst/>
+            <a:gdLst>
+              <a:gd name="connsiteX0" fmla="*/ 1371600 w 1371600"/>
+              <a:gd name="connsiteY0" fmla="*/ 711200 h 711200"/>
+              <a:gd name="connsiteX1" fmla="*/ 1371600 w 1371600"/>
+              <a:gd name="connsiteY1" fmla="*/ 0 h 711200"/>
+              <a:gd name="connsiteX2" fmla="*/ 0 w 1371600"/>
+              <a:gd name="connsiteY2" fmla="*/ 0 h 711200"/>
+            </a:gdLst>
+            <a:ahLst/>
+            <a:cxnLst>
+              <a:cxn ang="0">
+                <a:pos x="connsiteX0" y="connsiteY0"/>
+              </a:cxn>
+              <a:cxn ang="0">
+                <a:pos x="connsiteX1" y="connsiteY1"/>
+              </a:cxn>
+              <a:cxn ang="0">
+                <a:pos x="connsiteX2" y="connsiteY2"/>
+              </a:cxn>
+            </a:cxnLst>
+            <a:rect l="l" t="t" r="r" b="b"/>
+            <a:pathLst>
+              <a:path w="1371600" h="711200">
+                <a:moveTo>
+                  <a:pt x="1371600" y="711200"/>
+                </a:moveTo>
+                <a:lnTo>
+                  <a:pt x="1371600" y="0"/>
+                </a:lnTo>
+                <a:lnTo>
+                  <a:pt x="0" y="0"/>
+                </a:lnTo>
+              </a:path>
+            </a:pathLst>
+          </a:custGeom>
+          <a:noFill/>
+          <a:ln w="12700">
+            <a:solidFill>
+              <a:schemeClr val="tx2"/>
+            </a:solidFill>
+            <a:headEnd type="arrow" w="med" len="sm"/>
+            <a:tailEnd type="arrow" w="med" len="sm"/>
+          </a:ln>
+        </p:spPr>
+        <p:style>
+          <a:lnRef idx="2">
+            <a:schemeClr val="accent1">
+              <a:shade val="50000"/>
+            </a:schemeClr>
+          </a:lnRef>
+          <a:fillRef idx="1">
+            <a:schemeClr val="accent1"/>
+          </a:fillRef>
+          <a:effectRef idx="0">
+            <a:schemeClr val="accent1"/>
+          </a:effectRef>
+          <a:fontRef idx="minor">
+            <a:schemeClr val="lt1"/>
+          </a:fontRef>
+        </p:style>
+        <p:txBody>
+          <a:bodyPr anchor="ctr"/>
+          <a:lstStyle/>
+          <a:p>
+            <a:pPr algn="ctr" eaLnBrk="1" fontAlgn="auto" hangingPunct="1">
+              <a:spcBef>
+                <a:spcPts val="0"/>
+              </a:spcBef>
+              <a:spcAft>
+                <a:spcPts val="0"/>
+              </a:spcAft>
+              <a:defRPr/>
+            </a:pPr>
+            <a:endParaRPr lang="en-US" dirty="0"/>
+          </a:p>
+        </p:txBody>
+      </p:sp>
+      <p:sp>
+        <p:nvSpPr>
+          <p:cNvPr id="86" name="Freeform 36">
+            <a:extLst>
+              <a:ext uri="{FF2B5EF4-FFF2-40B4-BE49-F238E27FC236}">
+                <a16:creationId xmlns:a16="http://schemas.microsoft.com/office/drawing/2014/main" id="{0C2B24B6-9E55-4495-A61F-8E12C8C7E840}"/>
+              </a:ext>
+            </a:extLst>
+          </p:cNvPr>
+          <p:cNvSpPr/>
+          <p:nvPr/>
+        </p:nvSpPr>
+        <p:spPr>
+          <a:xfrm rot="16200000" flipH="1" flipV="1">
+            <a:off x="5234806" y="3588526"/>
+            <a:ext cx="451063" cy="3491063"/>
+          </a:xfrm>
+          <a:custGeom>
+            <a:avLst/>
+            <a:gdLst>
+              <a:gd name="connsiteX0" fmla="*/ 1371600 w 1371600"/>
+              <a:gd name="connsiteY0" fmla="*/ 711200 h 711200"/>
+              <a:gd name="connsiteX1" fmla="*/ 1371600 w 1371600"/>
+              <a:gd name="connsiteY1" fmla="*/ 0 h 711200"/>
+              <a:gd name="connsiteX2" fmla="*/ 0 w 1371600"/>
+              <a:gd name="connsiteY2" fmla="*/ 0 h 711200"/>
+            </a:gdLst>
+            <a:ahLst/>
+            <a:cxnLst>
+              <a:cxn ang="0">
+                <a:pos x="connsiteX0" y="connsiteY0"/>
+              </a:cxn>
+              <a:cxn ang="0">
+                <a:pos x="connsiteX1" y="connsiteY1"/>
+              </a:cxn>
+              <a:cxn ang="0">
+                <a:pos x="connsiteX2" y="connsiteY2"/>
+              </a:cxn>
+            </a:cxnLst>
+            <a:rect l="l" t="t" r="r" b="b"/>
+            <a:pathLst>
+              <a:path w="1371600" h="711200">
+                <a:moveTo>
+                  <a:pt x="1371600" y="711200"/>
+                </a:moveTo>
+                <a:lnTo>
+                  <a:pt x="1371600" y="0"/>
+                </a:lnTo>
+                <a:lnTo>
+                  <a:pt x="0" y="0"/>
+                </a:lnTo>
+              </a:path>
+            </a:pathLst>
+          </a:custGeom>
+          <a:noFill/>
+          <a:ln w="12700">
+            <a:solidFill>
+              <a:schemeClr val="tx2"/>
+            </a:solidFill>
+            <a:headEnd type="arrow" w="med" len="sm"/>
+            <a:tailEnd type="arrow" w="med" len="sm"/>
+          </a:ln>
+        </p:spPr>
+        <p:style>
+          <a:lnRef idx="2">
+            <a:schemeClr val="accent1">
+              <a:shade val="50000"/>
+            </a:schemeClr>
+          </a:lnRef>
+          <a:fillRef idx="1">
+            <a:schemeClr val="accent1"/>
+          </a:fillRef>
+          <a:effectRef idx="0">
+            <a:schemeClr val="accent1"/>
+          </a:effectRef>
+          <a:fontRef idx="minor">
+            <a:schemeClr val="lt1"/>
+          </a:fontRef>
+        </p:style>
+        <p:txBody>
+          <a:bodyPr anchor="ctr"/>
+          <a:lstStyle/>
+          <a:p>
+            <a:pPr algn="ctr" eaLnBrk="1" fontAlgn="auto" hangingPunct="1">
+              <a:spcBef>
+                <a:spcPts val="0"/>
+              </a:spcBef>
+              <a:spcAft>
+                <a:spcPts val="0"/>
+              </a:spcAft>
+              <a:defRPr/>
+            </a:pPr>
+            <a:endParaRPr lang="en-US" dirty="0"/>
+          </a:p>
+        </p:txBody>
+      </p:sp>
       <p:cxnSp>
         <p:nvCxnSpPr>
           <p:cNvPr id="87" name="Straight Arrow Connector 86">
@@ -6522,6 +9166,262 @@
             <a:headEnd type="none" w="med" len="sm"/>
             <a:tailEnd type="arrow" w="med" len="sm"/>
           </a:ln>
+        </p:spPr>
+        <p:style>
+          <a:lnRef idx="1">
+            <a:schemeClr val="accent1"/>
+          </a:lnRef>
+          <a:fillRef idx="0">
+            <a:schemeClr val="accent1"/>
+          </a:fillRef>
+          <a:effectRef idx="0">
+            <a:schemeClr val="accent1"/>
+          </a:effectRef>
+          <a:fontRef idx="minor">
+            <a:schemeClr val="tx1"/>
+          </a:fontRef>
+        </p:style>
+      </p:cxnSp>
+      <p:sp>
+        <p:nvSpPr>
+          <p:cNvPr id="58" name="TextBox 12">
+            <a:extLst>
+              <a:ext uri="{FF2B5EF4-FFF2-40B4-BE49-F238E27FC236}">
+                <a16:creationId xmlns:a16="http://schemas.microsoft.com/office/drawing/2014/main" id="{D79D8339-65E7-46C8-8331-BCF6FC0208E8}"/>
+              </a:ext>
+            </a:extLst>
+          </p:cNvPr>
+          <p:cNvSpPr txBox="1">
+            <a:spLocks noChangeArrowheads="1"/>
+          </p:cNvSpPr>
+          <p:nvPr/>
+        </p:nvSpPr>
+        <p:spPr bwMode="auto">
+          <a:xfrm>
+            <a:off x="10136100" y="1642068"/>
+            <a:ext cx="1871890" cy="1384995"/>
+          </a:xfrm>
+          <a:prstGeom prst="rect">
+            <a:avLst/>
+          </a:prstGeom>
+          <a:noFill/>
+          <a:ln>
+            <a:noFill/>
+          </a:ln>
+          <a:extLst>
+            <a:ext uri="{909E8E84-426E-40DD-AFC4-6F175D3DCCD1}">
+              <a14:hiddenFill xmlns:a14="http://schemas.microsoft.com/office/drawing/2010/main">
+                <a:solidFill>
+                  <a:srgbClr val="FFFFFF"/>
+                </a:solidFill>
+              </a14:hiddenFill>
+            </a:ext>
+            <a:ext uri="{91240B29-F687-4F45-9708-019B960494DF}">
+              <a14:hiddenLine xmlns:a14="http://schemas.microsoft.com/office/drawing/2010/main" w="9525">
+                <a:solidFill>
+                  <a:srgbClr val="000000"/>
+                </a:solidFill>
+                <a:miter lim="800000"/>
+                <a:headEnd/>
+                <a:tailEnd/>
+              </a14:hiddenLine>
+            </a:ext>
+          </a:extLst>
+        </p:spPr>
+        <p:txBody>
+          <a:bodyPr wrap="square">
+            <a:spAutoFit/>
+          </a:bodyPr>
+          <a:lstStyle>
+            <a:lvl1pPr>
+              <a:defRPr>
+                <a:solidFill>
+                  <a:schemeClr val="tx1"/>
+                </a:solidFill>
+                <a:latin typeface="Calibri" panose="020F0502020204030204" pitchFamily="34" charset="0"/>
+              </a:defRPr>
+            </a:lvl1pPr>
+            <a:lvl2pPr marL="742950" indent="-285750">
+              <a:defRPr>
+                <a:solidFill>
+                  <a:schemeClr val="tx1"/>
+                </a:solidFill>
+                <a:latin typeface="Calibri" panose="020F0502020204030204" pitchFamily="34" charset="0"/>
+              </a:defRPr>
+            </a:lvl2pPr>
+            <a:lvl3pPr marL="1143000" indent="-228600">
+              <a:defRPr>
+                <a:solidFill>
+                  <a:schemeClr val="tx1"/>
+                </a:solidFill>
+                <a:latin typeface="Calibri" panose="020F0502020204030204" pitchFamily="34" charset="0"/>
+              </a:defRPr>
+            </a:lvl3pPr>
+            <a:lvl4pPr marL="1600200" indent="-228600">
+              <a:defRPr>
+                <a:solidFill>
+                  <a:schemeClr val="tx1"/>
+                </a:solidFill>
+                <a:latin typeface="Calibri" panose="020F0502020204030204" pitchFamily="34" charset="0"/>
+              </a:defRPr>
+            </a:lvl4pPr>
+            <a:lvl5pPr marL="2057400" indent="-228600">
+              <a:defRPr>
+                <a:solidFill>
+                  <a:schemeClr val="tx1"/>
+                </a:solidFill>
+                <a:latin typeface="Calibri" panose="020F0502020204030204" pitchFamily="34" charset="0"/>
+              </a:defRPr>
+            </a:lvl5pPr>
+            <a:lvl6pPr marL="2514600" indent="-228600" eaLnBrk="0" fontAlgn="base" hangingPunct="0">
+              <a:spcBef>
+                <a:spcPct val="0"/>
+              </a:spcBef>
+              <a:spcAft>
+                <a:spcPct val="0"/>
+              </a:spcAft>
+              <a:defRPr>
+                <a:solidFill>
+                  <a:schemeClr val="tx1"/>
+                </a:solidFill>
+                <a:latin typeface="Calibri" panose="020F0502020204030204" pitchFamily="34" charset="0"/>
+              </a:defRPr>
+            </a:lvl6pPr>
+            <a:lvl7pPr marL="2971800" indent="-228600" eaLnBrk="0" fontAlgn="base" hangingPunct="0">
+              <a:spcBef>
+                <a:spcPct val="0"/>
+              </a:spcBef>
+              <a:spcAft>
+                <a:spcPct val="0"/>
+              </a:spcAft>
+              <a:defRPr>
+                <a:solidFill>
+                  <a:schemeClr val="tx1"/>
+                </a:solidFill>
+                <a:latin typeface="Calibri" panose="020F0502020204030204" pitchFamily="34" charset="0"/>
+              </a:defRPr>
+            </a:lvl7pPr>
+            <a:lvl8pPr marL="3429000" indent="-228600" eaLnBrk="0" fontAlgn="base" hangingPunct="0">
+              <a:spcBef>
+                <a:spcPct val="0"/>
+              </a:spcBef>
+              <a:spcAft>
+                <a:spcPct val="0"/>
+              </a:spcAft>
+              <a:defRPr>
+                <a:solidFill>
+                  <a:schemeClr val="tx1"/>
+                </a:solidFill>
+                <a:latin typeface="Calibri" panose="020F0502020204030204" pitchFamily="34" charset="0"/>
+              </a:defRPr>
+            </a:lvl8pPr>
+            <a:lvl9pPr marL="3886200" indent="-228600" eaLnBrk="0" fontAlgn="base" hangingPunct="0">
+              <a:spcBef>
+                <a:spcPct val="0"/>
+              </a:spcBef>
+              <a:spcAft>
+                <a:spcPct val="0"/>
+              </a:spcAft>
+              <a:defRPr>
+                <a:solidFill>
+                  <a:schemeClr val="tx1"/>
+                </a:solidFill>
+                <a:latin typeface="Calibri" panose="020F0502020204030204" pitchFamily="34" charset="0"/>
+              </a:defRPr>
+            </a:lvl9pPr>
+          </a:lstStyle>
+          <a:p>
+            <a:pPr eaLnBrk="1" hangingPunct="1"/>
+            <a:r>
+              <a:rPr lang="en-US" altLang="en-US" sz="1200" dirty="0">
+                <a:latin typeface="Arial" panose="020B0604020202020204" pitchFamily="34" charset="0"/>
+                <a:ea typeface="Amazon Ember" panose="020B0603020204020204" pitchFamily="34" charset="0"/>
+                <a:cs typeface="Arial" panose="020B0604020202020204" pitchFamily="34" charset="0"/>
+              </a:rPr>
+              <a:t>This diagram shows the third Availability Zone, which I’m deleting for publication since it’s optional.</a:t>
+            </a:r>
+          </a:p>
+          <a:p>
+            <a:pPr eaLnBrk="1" hangingPunct="1"/>
+            <a:endParaRPr lang="en-US" altLang="en-US" sz="1200" dirty="0">
+              <a:latin typeface="Arial" panose="020B0604020202020204" pitchFamily="34" charset="0"/>
+              <a:ea typeface="Amazon Ember" panose="020B0603020204020204" pitchFamily="34" charset="0"/>
+              <a:cs typeface="Arial" panose="020B0604020202020204" pitchFamily="34" charset="0"/>
+            </a:endParaRPr>
+          </a:p>
+          <a:p>
+            <a:pPr eaLnBrk="1" hangingPunct="1"/>
+            <a:r>
+              <a:rPr lang="en-US" altLang="en-US" sz="1200" dirty="0">
+                <a:latin typeface="Arial" panose="020B0604020202020204" pitchFamily="34" charset="0"/>
+                <a:ea typeface="Amazon Ember" panose="020B0603020204020204" pitchFamily="34" charset="0"/>
+                <a:cs typeface="Arial" panose="020B0604020202020204" pitchFamily="34" charset="0"/>
+              </a:rPr>
+              <a:t>—Marcia</a:t>
+            </a:r>
+          </a:p>
+        </p:txBody>
+      </p:sp>
+      <p:cxnSp>
+        <p:nvCxnSpPr>
+          <p:cNvPr id="19" name="Straight Connector 18">
+            <a:extLst>
+              <a:ext uri="{FF2B5EF4-FFF2-40B4-BE49-F238E27FC236}">
+                <a16:creationId xmlns:a16="http://schemas.microsoft.com/office/drawing/2014/main" id="{6EAC783E-9493-4862-93DA-929EEF4F9EEF}"/>
+              </a:ext>
+            </a:extLst>
+          </p:cNvPr>
+          <p:cNvCxnSpPr>
+            <a:cxnSpLocks/>
+          </p:cNvCxnSpPr>
+          <p:nvPr/>
+        </p:nvCxnSpPr>
+        <p:spPr>
+          <a:xfrm>
+            <a:off x="6067343" y="296333"/>
+            <a:ext cx="2437577" cy="6389294"/>
+          </a:xfrm>
+          <a:prstGeom prst="line">
+            <a:avLst/>
+          </a:prstGeom>
+        </p:spPr>
+        <p:style>
+          <a:lnRef idx="1">
+            <a:schemeClr val="accent1"/>
+          </a:lnRef>
+          <a:fillRef idx="0">
+            <a:schemeClr val="accent1"/>
+          </a:fillRef>
+          <a:effectRef idx="0">
+            <a:schemeClr val="accent1"/>
+          </a:effectRef>
+          <a:fontRef idx="minor">
+            <a:schemeClr val="tx1"/>
+          </a:fontRef>
+        </p:style>
+      </p:cxnSp>
+      <p:cxnSp>
+        <p:nvCxnSpPr>
+          <p:cNvPr id="63" name="Straight Connector 62">
+            <a:extLst>
+              <a:ext uri="{FF2B5EF4-FFF2-40B4-BE49-F238E27FC236}">
+                <a16:creationId xmlns:a16="http://schemas.microsoft.com/office/drawing/2014/main" id="{6E13388F-D134-4FF6-A498-2F721590F764}"/>
+              </a:ext>
+            </a:extLst>
+          </p:cNvPr>
+          <p:cNvCxnSpPr>
+            <a:cxnSpLocks/>
+          </p:cNvCxnSpPr>
+          <p:nvPr/>
+        </p:nvCxnSpPr>
+        <p:spPr>
+          <a:xfrm flipH="1">
+            <a:off x="6132165" y="324773"/>
+            <a:ext cx="2220084" cy="6236894"/>
+          </a:xfrm>
+          <a:prstGeom prst="line">
+            <a:avLst/>
+          </a:prstGeom>
         </p:spPr>
         <p:style>
           <a:lnRef idx="1">
@@ -6541,7 +9441,7 @@
     </p:spTree>
     <p:extLst>
       <p:ext uri="{BB962C8B-B14F-4D97-AF65-F5344CB8AC3E}">
-        <p14:creationId xmlns:p14="http://schemas.microsoft.com/office/powerpoint/2010/main" val="1783241675"/>
+        <p14:creationId xmlns:p14="http://schemas.microsoft.com/office/powerpoint/2010/main" val="3659613559"/>
       </p:ext>
     </p:extLst>
   </p:cSld>
@@ -6551,7 +9451,7 @@
 </p:sld>
 </file>
 
-<file path=ppt/slides/slide2.xml><?xml version="1.0" encoding="utf-8"?>
+<file path=ppt/slides/slide3.xml><?xml version="1.0" encoding="utf-8"?>
 <p:sld xmlns:a="http://schemas.openxmlformats.org/drawingml/2006/main" xmlns:r="http://schemas.openxmlformats.org/officeDocument/2006/relationships" xmlns:p="http://schemas.openxmlformats.org/presentationml/2006/main">
   <p:cSld>
     <p:spTree>

</xml_diff>